<commit_message>
Added a new image for section 4.4
</commit_message>
<xml_diff>
--- a/materials/images/GitKit-Text-Soure-Images.pptx
+++ b/materials/images/GitKit-Text-Soure-Images.pptx
@@ -5,7 +5,7 @@
     <p:sldMasterId id="2147484099" r:id="rId1"/>
   </p:sldMasterIdLst>
   <p:notesMasterIdLst>
-    <p:notesMasterId r:id="rId23"/>
+    <p:notesMasterId r:id="rId24"/>
   </p:notesMasterIdLst>
   <p:sldIdLst>
     <p:sldId id="258" r:id="rId2"/>
@@ -24,11 +24,12 @@
     <p:sldId id="267" r:id="rId15"/>
     <p:sldId id="268" r:id="rId16"/>
     <p:sldId id="269" r:id="rId17"/>
-    <p:sldId id="270" r:id="rId18"/>
-    <p:sldId id="272" r:id="rId19"/>
-    <p:sldId id="273" r:id="rId20"/>
-    <p:sldId id="274" r:id="rId21"/>
-    <p:sldId id="275" r:id="rId22"/>
+    <p:sldId id="278" r:id="rId18"/>
+    <p:sldId id="270" r:id="rId19"/>
+    <p:sldId id="272" r:id="rId20"/>
+    <p:sldId id="273" r:id="rId21"/>
+    <p:sldId id="274" r:id="rId22"/>
+    <p:sldId id="275" r:id="rId23"/>
   </p:sldIdLst>
   <p:sldSz cx="12192000" cy="6858000"/>
   <p:notesSz cx="6858000" cy="9144000"/>
@@ -217,7 +218,7 @@
           <a:p>
             <a:fld id="{54450688-851B-C844-9616-D91E312B1884}" type="datetimeFigureOut">
               <a:rPr lang="en-US" smtClean="0"/>
-              <a:t>7/27/24</a:t>
+              <a:t>1/16/2025</a:t>
             </a:fld>
             <a:endParaRPr lang="en-US"/>
           </a:p>
@@ -767,7 +768,7 @@
           <a:p>
             <a:fld id="{7A82D7F2-23D8-094A-BC7F-45020389E464}" type="datetimeFigureOut">
               <a:rPr lang="en-US" smtClean="0"/>
-              <a:t>7/27/24</a:t>
+              <a:t>1/16/2025</a:t>
             </a:fld>
             <a:endParaRPr lang="en-US"/>
           </a:p>
@@ -964,7 +965,7 @@
           <a:p>
             <a:fld id="{7A82D7F2-23D8-094A-BC7F-45020389E464}" type="datetimeFigureOut">
               <a:rPr lang="en-US" smtClean="0"/>
-              <a:t>7/27/24</a:t>
+              <a:t>1/16/2025</a:t>
             </a:fld>
             <a:endParaRPr lang="en-US"/>
           </a:p>
@@ -1238,7 +1239,7 @@
           <a:p>
             <a:fld id="{7A82D7F2-23D8-094A-BC7F-45020389E464}" type="datetimeFigureOut">
               <a:rPr lang="en-US" smtClean="0"/>
-              <a:t>7/27/24</a:t>
+              <a:t>1/16/2025</a:t>
             </a:fld>
             <a:endParaRPr lang="en-US"/>
           </a:p>
@@ -1422,7 +1423,7 @@
           <a:p>
             <a:fld id="{7A82D7F2-23D8-094A-BC7F-45020389E464}" type="datetimeFigureOut">
               <a:rPr lang="en-US" smtClean="0"/>
-              <a:t>7/27/24</a:t>
+              <a:t>1/16/2025</a:t>
             </a:fld>
             <a:endParaRPr lang="en-US"/>
           </a:p>
@@ -1626,7 +1627,7 @@
           <a:p>
             <a:fld id="{7A82D7F2-23D8-094A-BC7F-45020389E464}" type="datetimeFigureOut">
               <a:rPr lang="en-US" smtClean="0"/>
-              <a:t>7/27/24</a:t>
+              <a:t>1/16/2025</a:t>
             </a:fld>
             <a:endParaRPr lang="en-US"/>
           </a:p>
@@ -1873,7 +1874,7 @@
           <a:p>
             <a:fld id="{7A82D7F2-23D8-094A-BC7F-45020389E464}" type="datetimeFigureOut">
               <a:rPr lang="en-US" smtClean="0"/>
-              <a:t>7/27/24</a:t>
+              <a:t>1/16/2025</a:t>
             </a:fld>
             <a:endParaRPr lang="en-US"/>
           </a:p>
@@ -2201,7 +2202,7 @@
           <a:p>
             <a:fld id="{7A82D7F2-23D8-094A-BC7F-45020389E464}" type="datetimeFigureOut">
               <a:rPr lang="en-US" smtClean="0"/>
-              <a:t>7/27/24</a:t>
+              <a:t>1/16/2025</a:t>
             </a:fld>
             <a:endParaRPr lang="en-US"/>
           </a:p>
@@ -2504,7 +2505,7 @@
           <a:p>
             <a:fld id="{7A82D7F2-23D8-094A-BC7F-45020389E464}" type="datetimeFigureOut">
               <a:rPr lang="en-US" smtClean="0"/>
-              <a:t>7/27/24</a:t>
+              <a:t>1/16/2025</a:t>
             </a:fld>
             <a:endParaRPr lang="en-US"/>
           </a:p>
@@ -2965,7 +2966,7 @@
           <a:p>
             <a:fld id="{7A82D7F2-23D8-094A-BC7F-45020389E464}" type="datetimeFigureOut">
               <a:rPr lang="en-US" smtClean="0"/>
-              <a:t>7/27/24</a:t>
+              <a:t>1/16/2025</a:t>
             </a:fld>
             <a:endParaRPr lang="en-US"/>
           </a:p>
@@ -3083,7 +3084,7 @@
           <a:p>
             <a:fld id="{7A82D7F2-23D8-094A-BC7F-45020389E464}" type="datetimeFigureOut">
               <a:rPr lang="en-US" smtClean="0"/>
-              <a:t>7/27/24</a:t>
+              <a:t>1/16/2025</a:t>
             </a:fld>
             <a:endParaRPr lang="en-US"/>
           </a:p>
@@ -3178,7 +3179,7 @@
           <a:p>
             <a:fld id="{7A82D7F2-23D8-094A-BC7F-45020389E464}" type="datetimeFigureOut">
               <a:rPr lang="en-US" smtClean="0"/>
-              <a:t>7/27/24</a:t>
+              <a:t>1/16/2025</a:t>
             </a:fld>
             <a:endParaRPr lang="en-US"/>
           </a:p>
@@ -3465,7 +3466,7 @@
           <a:p>
             <a:fld id="{7A82D7F2-23D8-094A-BC7F-45020389E464}" type="datetimeFigureOut">
               <a:rPr lang="en-US" smtClean="0"/>
-              <a:t>7/27/24</a:t>
+              <a:t>1/16/2025</a:t>
             </a:fld>
             <a:endParaRPr lang="en-US"/>
           </a:p>
@@ -3679,7 +3680,7 @@
           <a:p>
             <a:fld id="{7A82D7F2-23D8-094A-BC7F-45020389E464}" type="datetimeFigureOut">
               <a:rPr lang="en-US" smtClean="0"/>
-              <a:t>7/27/24</a:t>
+              <a:t>1/16/2025</a:t>
             </a:fld>
             <a:endParaRPr lang="en-US"/>
           </a:p>
@@ -17543,6 +17544,2783 @@
   <p:cSld>
     <p:spTree>
       <p:nvGrpSpPr>
+        <p:cNvPr id="1" name="">
+          <a:extLst>
+            <a:ext uri="{FF2B5EF4-FFF2-40B4-BE49-F238E27FC236}">
+              <a16:creationId xmlns:a16="http://schemas.microsoft.com/office/drawing/2014/main" id="{5C65A320-052D-64C9-16C5-218C0D26B977}"/>
+            </a:ext>
+          </a:extLst>
+        </p:cNvPr>
+        <p:cNvGrpSpPr/>
+        <p:nvPr/>
+      </p:nvGrpSpPr>
+      <p:grpSpPr>
+        <a:xfrm>
+          <a:off x="0" y="0"/>
+          <a:ext cx="0" cy="0"/>
+          <a:chOff x="0" y="0"/>
+          <a:chExt cx="0" cy="0"/>
+        </a:xfrm>
+      </p:grpSpPr>
+      <p:sp>
+        <p:nvSpPr>
+          <p:cNvPr id="2" name="Can 1">
+            <a:extLst>
+              <a:ext uri="{FF2B5EF4-FFF2-40B4-BE49-F238E27FC236}">
+                <a16:creationId xmlns:a16="http://schemas.microsoft.com/office/drawing/2014/main" id="{A54D951C-F04E-17EE-E791-6B5875B0FE36}"/>
+              </a:ext>
+            </a:extLst>
+          </p:cNvPr>
+          <p:cNvSpPr/>
+          <p:nvPr/>
+        </p:nvSpPr>
+        <p:spPr>
+          <a:xfrm>
+            <a:off x="3719762" y="4219267"/>
+            <a:ext cx="1426477" cy="1679170"/>
+          </a:xfrm>
+          <a:prstGeom prst="can">
+            <a:avLst/>
+          </a:prstGeom>
+        </p:spPr>
+        <p:style>
+          <a:lnRef idx="2">
+            <a:schemeClr val="accent1">
+              <a:shade val="50000"/>
+            </a:schemeClr>
+          </a:lnRef>
+          <a:fillRef idx="1">
+            <a:schemeClr val="accent1"/>
+          </a:fillRef>
+          <a:effectRef idx="0">
+            <a:schemeClr val="accent1"/>
+          </a:effectRef>
+          <a:fontRef idx="minor">
+            <a:schemeClr val="lt1"/>
+          </a:fontRef>
+        </p:style>
+        <p:txBody>
+          <a:bodyPr rtlCol="0" anchor="ctr"/>
+          <a:lstStyle/>
+          <a:p>
+            <a:pPr algn="ctr"/>
+            <a:br>
+              <a:rPr lang="en-US" sz="2000" dirty="0"/>
+            </a:br>
+            <a:endParaRPr lang="en-US" sz="2000" dirty="0"/>
+          </a:p>
+        </p:txBody>
+      </p:sp>
+      <p:cxnSp>
+        <p:nvCxnSpPr>
+          <p:cNvPr id="3" name="Straight Connector 2">
+            <a:extLst>
+              <a:ext uri="{FF2B5EF4-FFF2-40B4-BE49-F238E27FC236}">
+                <a16:creationId xmlns:a16="http://schemas.microsoft.com/office/drawing/2014/main" id="{23D63D21-81B1-58D4-01EA-6BB65CCFDD9C}"/>
+              </a:ext>
+            </a:extLst>
+          </p:cNvPr>
+          <p:cNvCxnSpPr/>
+          <p:nvPr/>
+        </p:nvCxnSpPr>
+        <p:spPr>
+          <a:xfrm>
+            <a:off x="2516533" y="3799594"/>
+            <a:ext cx="5903596" cy="0"/>
+          </a:xfrm>
+          <a:prstGeom prst="line">
+            <a:avLst/>
+          </a:prstGeom>
+          <a:ln w="76200" cmpd="sng">
+            <a:solidFill>
+              <a:srgbClr val="76C5EF"/>
+            </a:solidFill>
+          </a:ln>
+        </p:spPr>
+        <p:style>
+          <a:lnRef idx="2">
+            <a:schemeClr val="accent1"/>
+          </a:lnRef>
+          <a:fillRef idx="0">
+            <a:schemeClr val="accent1"/>
+          </a:fillRef>
+          <a:effectRef idx="1">
+            <a:schemeClr val="accent1"/>
+          </a:effectRef>
+          <a:fontRef idx="minor">
+            <a:schemeClr val="tx1"/>
+          </a:fontRef>
+        </p:style>
+      </p:cxnSp>
+      <p:grpSp>
+        <p:nvGrpSpPr>
+          <p:cNvPr id="4" name="Group 3">
+            <a:extLst>
+              <a:ext uri="{FF2B5EF4-FFF2-40B4-BE49-F238E27FC236}">
+                <a16:creationId xmlns:a16="http://schemas.microsoft.com/office/drawing/2014/main" id="{EA4C2A24-BD8F-B6C3-0944-07B17C9ED9CB}"/>
+              </a:ext>
+            </a:extLst>
+          </p:cNvPr>
+          <p:cNvGrpSpPr/>
+          <p:nvPr/>
+        </p:nvGrpSpPr>
+        <p:grpSpPr>
+          <a:xfrm>
+            <a:off x="3184934" y="803132"/>
+            <a:ext cx="4973053" cy="2672510"/>
+            <a:chOff x="1355581" y="1021204"/>
+            <a:chExt cx="6524194" cy="2928680"/>
+          </a:xfrm>
+        </p:grpSpPr>
+        <p:sp>
+          <p:nvSpPr>
+            <p:cNvPr id="5" name="Cloud 4">
+              <a:extLst>
+                <a:ext uri="{FF2B5EF4-FFF2-40B4-BE49-F238E27FC236}">
+                  <a16:creationId xmlns:a16="http://schemas.microsoft.com/office/drawing/2014/main" id="{816CAB5D-93A6-83C1-CB01-1A59168A7660}"/>
+                </a:ext>
+              </a:extLst>
+            </p:cNvPr>
+            <p:cNvSpPr/>
+            <p:nvPr/>
+          </p:nvSpPr>
+          <p:spPr>
+            <a:xfrm>
+              <a:off x="1355581" y="1021204"/>
+              <a:ext cx="6524194" cy="2928680"/>
+            </a:xfrm>
+            <a:prstGeom prst="cloud">
+              <a:avLst/>
+            </a:prstGeom>
+          </p:spPr>
+          <p:style>
+            <a:lnRef idx="1">
+              <a:schemeClr val="accent1"/>
+            </a:lnRef>
+            <a:fillRef idx="2">
+              <a:schemeClr val="accent1"/>
+            </a:fillRef>
+            <a:effectRef idx="1">
+              <a:schemeClr val="accent1"/>
+            </a:effectRef>
+            <a:fontRef idx="minor">
+              <a:schemeClr val="dk1"/>
+            </a:fontRef>
+          </p:style>
+          <p:txBody>
+            <a:bodyPr rtlCol="0" anchor="ctr"/>
+            <a:lstStyle/>
+            <a:p>
+              <a:pPr algn="ctr"/>
+              <a:endParaRPr lang="en-US" sz="4800" dirty="0"/>
+            </a:p>
+          </p:txBody>
+        </p:sp>
+        <p:sp>
+          <p:nvSpPr>
+            <p:cNvPr id="6" name="Can 5">
+              <a:extLst>
+                <a:ext uri="{FF2B5EF4-FFF2-40B4-BE49-F238E27FC236}">
+                  <a16:creationId xmlns:a16="http://schemas.microsoft.com/office/drawing/2014/main" id="{A8A0928A-98B6-D8F6-5B5C-A5482E72C3B1}"/>
+                </a:ext>
+              </a:extLst>
+            </p:cNvPr>
+            <p:cNvSpPr/>
+            <p:nvPr/>
+          </p:nvSpPr>
+          <p:spPr>
+            <a:xfrm>
+              <a:off x="5580807" y="1487321"/>
+              <a:ext cx="1871408" cy="1604308"/>
+            </a:xfrm>
+            <a:prstGeom prst="can">
+              <a:avLst/>
+            </a:prstGeom>
+          </p:spPr>
+          <p:style>
+            <a:lnRef idx="2">
+              <a:schemeClr val="accent1">
+                <a:shade val="50000"/>
+              </a:schemeClr>
+            </a:lnRef>
+            <a:fillRef idx="1">
+              <a:schemeClr val="accent1"/>
+            </a:fillRef>
+            <a:effectRef idx="0">
+              <a:schemeClr val="accent1"/>
+            </a:effectRef>
+            <a:fontRef idx="minor">
+              <a:schemeClr val="lt1"/>
+            </a:fontRef>
+          </p:style>
+          <p:txBody>
+            <a:bodyPr rtlCol="0" anchor="ctr"/>
+            <a:lstStyle/>
+            <a:p>
+              <a:pPr algn="ctr"/>
+              <a:r>
+                <a:rPr lang="en-US" sz="2000" dirty="0"/>
+                <a:t>upstream</a:t>
+              </a:r>
+            </a:p>
+            <a:p>
+              <a:pPr algn="ctr"/>
+              <a:endParaRPr lang="en-US" sz="2000" i="1" dirty="0"/>
+            </a:p>
+            <a:p>
+              <a:pPr algn="ctr"/>
+              <a:endParaRPr lang="en-US" sz="2000" i="1" dirty="0"/>
+            </a:p>
+          </p:txBody>
+        </p:sp>
+        <p:sp>
+          <p:nvSpPr>
+            <p:cNvPr id="7" name="Can 6">
+              <a:extLst>
+                <a:ext uri="{FF2B5EF4-FFF2-40B4-BE49-F238E27FC236}">
+                  <a16:creationId xmlns:a16="http://schemas.microsoft.com/office/drawing/2014/main" id="{C5B2A8D4-368A-FF55-A46D-362D5259CC6F}"/>
+                </a:ext>
+              </a:extLst>
+            </p:cNvPr>
+            <p:cNvSpPr/>
+            <p:nvPr/>
+          </p:nvSpPr>
+          <p:spPr>
+            <a:xfrm>
+              <a:off x="2057227" y="1487321"/>
+              <a:ext cx="1871408" cy="1604308"/>
+            </a:xfrm>
+            <a:prstGeom prst="can">
+              <a:avLst/>
+            </a:prstGeom>
+          </p:spPr>
+          <p:style>
+            <a:lnRef idx="2">
+              <a:schemeClr val="accent1">
+                <a:shade val="50000"/>
+              </a:schemeClr>
+            </a:lnRef>
+            <a:fillRef idx="1">
+              <a:schemeClr val="accent1"/>
+            </a:fillRef>
+            <a:effectRef idx="0">
+              <a:schemeClr val="accent1"/>
+            </a:effectRef>
+            <a:fontRef idx="minor">
+              <a:schemeClr val="lt1"/>
+            </a:fontRef>
+          </p:style>
+          <p:txBody>
+            <a:bodyPr rtlCol="0" anchor="ctr"/>
+            <a:lstStyle/>
+            <a:p>
+              <a:pPr algn="ctr"/>
+              <a:r>
+                <a:rPr lang="en-US" sz="2000" dirty="0"/>
+                <a:t>origin</a:t>
+              </a:r>
+            </a:p>
+            <a:p>
+              <a:pPr algn="ctr"/>
+              <a:endParaRPr lang="en-US" sz="2000" i="1" dirty="0"/>
+            </a:p>
+            <a:p>
+              <a:pPr algn="ctr"/>
+              <a:endParaRPr lang="en-US" sz="2000" i="1" dirty="0"/>
+            </a:p>
+          </p:txBody>
+        </p:sp>
+      </p:grpSp>
+      <p:sp>
+        <p:nvSpPr>
+          <p:cNvPr id="8" name="Rounded Rectangle 7">
+            <a:extLst>
+              <a:ext uri="{FF2B5EF4-FFF2-40B4-BE49-F238E27FC236}">
+                <a16:creationId xmlns:a16="http://schemas.microsoft.com/office/drawing/2014/main" id="{1316A34F-DAB9-DC5F-1CAC-4F097BDC5A0D}"/>
+              </a:ext>
+            </a:extLst>
+          </p:cNvPr>
+          <p:cNvSpPr/>
+          <p:nvPr/>
+        </p:nvSpPr>
+        <p:spPr>
+          <a:xfrm>
+            <a:off x="6527042" y="1912568"/>
+            <a:ext cx="1253994" cy="239921"/>
+          </a:xfrm>
+          <a:prstGeom prst="roundRect">
+            <a:avLst/>
+          </a:prstGeom>
+        </p:spPr>
+        <p:style>
+          <a:lnRef idx="3">
+            <a:schemeClr val="lt1"/>
+          </a:lnRef>
+          <a:fillRef idx="1">
+            <a:schemeClr val="accent3"/>
+          </a:fillRef>
+          <a:effectRef idx="1">
+            <a:schemeClr val="accent3"/>
+          </a:effectRef>
+          <a:fontRef idx="minor">
+            <a:schemeClr val="lt1"/>
+          </a:fontRef>
+        </p:style>
+        <p:txBody>
+          <a:bodyPr rtlCol="0" anchor="ctr"/>
+          <a:lstStyle/>
+          <a:p>
+            <a:pPr algn="ctr"/>
+            <a:endParaRPr lang="en-US" sz="1400" dirty="0"/>
+          </a:p>
+        </p:txBody>
+      </p:sp>
+      <p:sp>
+        <p:nvSpPr>
+          <p:cNvPr id="9" name="Rounded Rectangle 8">
+            <a:extLst>
+              <a:ext uri="{FF2B5EF4-FFF2-40B4-BE49-F238E27FC236}">
+                <a16:creationId xmlns:a16="http://schemas.microsoft.com/office/drawing/2014/main" id="{D41D927E-AEF2-9537-2250-CB19245F1978}"/>
+              </a:ext>
+            </a:extLst>
+          </p:cNvPr>
+          <p:cNvSpPr/>
+          <p:nvPr/>
+        </p:nvSpPr>
+        <p:spPr>
+          <a:xfrm>
+            <a:off x="3806004" y="1912568"/>
+            <a:ext cx="1253994" cy="239921"/>
+          </a:xfrm>
+          <a:prstGeom prst="roundRect">
+            <a:avLst/>
+          </a:prstGeom>
+        </p:spPr>
+        <p:style>
+          <a:lnRef idx="3">
+            <a:schemeClr val="lt1"/>
+          </a:lnRef>
+          <a:fillRef idx="1">
+            <a:schemeClr val="accent3"/>
+          </a:fillRef>
+          <a:effectRef idx="1">
+            <a:schemeClr val="accent3"/>
+          </a:effectRef>
+          <a:fontRef idx="minor">
+            <a:schemeClr val="lt1"/>
+          </a:fontRef>
+        </p:style>
+        <p:txBody>
+          <a:bodyPr rtlCol="0" anchor="ctr"/>
+          <a:lstStyle/>
+          <a:p>
+            <a:pPr algn="ctr"/>
+            <a:endParaRPr lang="en-US" sz="1400" dirty="0"/>
+          </a:p>
+        </p:txBody>
+      </p:sp>
+      <p:sp>
+        <p:nvSpPr>
+          <p:cNvPr id="10" name="Rounded Rectangle 9">
+            <a:extLst>
+              <a:ext uri="{FF2B5EF4-FFF2-40B4-BE49-F238E27FC236}">
+                <a16:creationId xmlns:a16="http://schemas.microsoft.com/office/drawing/2014/main" id="{5FB54CAA-40FC-4E4D-6ED2-F8EA473EBA31}"/>
+              </a:ext>
+            </a:extLst>
+          </p:cNvPr>
+          <p:cNvSpPr/>
+          <p:nvPr/>
+        </p:nvSpPr>
+        <p:spPr>
+          <a:xfrm>
+            <a:off x="3796308" y="4625773"/>
+            <a:ext cx="1253994" cy="239921"/>
+          </a:xfrm>
+          <a:prstGeom prst="roundRect">
+            <a:avLst/>
+          </a:prstGeom>
+        </p:spPr>
+        <p:style>
+          <a:lnRef idx="3">
+            <a:schemeClr val="lt1"/>
+          </a:lnRef>
+          <a:fillRef idx="1">
+            <a:schemeClr val="accent3"/>
+          </a:fillRef>
+          <a:effectRef idx="1">
+            <a:schemeClr val="accent3"/>
+          </a:effectRef>
+          <a:fontRef idx="minor">
+            <a:schemeClr val="lt1"/>
+          </a:fontRef>
+        </p:style>
+        <p:txBody>
+          <a:bodyPr rtlCol="0" anchor="ctr"/>
+          <a:lstStyle/>
+          <a:p>
+            <a:pPr algn="ctr"/>
+            <a:endParaRPr lang="en-US" sz="1400" dirty="0"/>
+          </a:p>
+        </p:txBody>
+      </p:sp>
+      <p:sp>
+        <p:nvSpPr>
+          <p:cNvPr id="11" name="Oval 10">
+            <a:extLst>
+              <a:ext uri="{FF2B5EF4-FFF2-40B4-BE49-F238E27FC236}">
+                <a16:creationId xmlns:a16="http://schemas.microsoft.com/office/drawing/2014/main" id="{0B5C7311-108A-A4DE-6A47-EEAD78D25374}"/>
+              </a:ext>
+            </a:extLst>
+          </p:cNvPr>
+          <p:cNvSpPr/>
+          <p:nvPr/>
+        </p:nvSpPr>
+        <p:spPr>
+          <a:xfrm>
+            <a:off x="6576608" y="1967571"/>
+            <a:ext cx="140086" cy="140086"/>
+          </a:xfrm>
+          <a:prstGeom prst="ellipse">
+            <a:avLst/>
+          </a:prstGeom>
+          <a:solidFill>
+            <a:srgbClr val="FF0000"/>
+          </a:solidFill>
+          <a:ln>
+            <a:solidFill>
+              <a:schemeClr val="tx1"/>
+            </a:solidFill>
+          </a:ln>
+        </p:spPr>
+        <p:style>
+          <a:lnRef idx="2">
+            <a:schemeClr val="accent5">
+              <a:shade val="50000"/>
+            </a:schemeClr>
+          </a:lnRef>
+          <a:fillRef idx="1">
+            <a:schemeClr val="accent5"/>
+          </a:fillRef>
+          <a:effectRef idx="0">
+            <a:schemeClr val="accent5"/>
+          </a:effectRef>
+          <a:fontRef idx="minor">
+            <a:schemeClr val="lt1"/>
+          </a:fontRef>
+        </p:style>
+        <p:txBody>
+          <a:bodyPr rtlCol="0" anchor="ctr"/>
+          <a:lstStyle/>
+          <a:p>
+            <a:pPr algn="ctr"/>
+            <a:endParaRPr lang="en-US"/>
+          </a:p>
+        </p:txBody>
+      </p:sp>
+      <p:cxnSp>
+        <p:nvCxnSpPr>
+          <p:cNvPr id="12" name="Straight Connector 11">
+            <a:extLst>
+              <a:ext uri="{FF2B5EF4-FFF2-40B4-BE49-F238E27FC236}">
+                <a16:creationId xmlns:a16="http://schemas.microsoft.com/office/drawing/2014/main" id="{967D2C3F-B21F-2136-A6F5-485AAB2EF555}"/>
+              </a:ext>
+            </a:extLst>
+          </p:cNvPr>
+          <p:cNvCxnSpPr>
+            <a:stCxn id="11" idx="6"/>
+            <a:endCxn id="13" idx="2"/>
+          </p:cNvCxnSpPr>
+          <p:nvPr/>
+        </p:nvCxnSpPr>
+        <p:spPr>
+          <a:xfrm flipV="1">
+            <a:off x="6716694" y="2034326"/>
+            <a:ext cx="105890" cy="3288"/>
+          </a:xfrm>
+          <a:prstGeom prst="line">
+            <a:avLst/>
+          </a:prstGeom>
+          <a:ln>
+            <a:solidFill>
+              <a:schemeClr val="tx1"/>
+            </a:solidFill>
+          </a:ln>
+        </p:spPr>
+        <p:style>
+          <a:lnRef idx="3">
+            <a:schemeClr val="accent5"/>
+          </a:lnRef>
+          <a:fillRef idx="0">
+            <a:schemeClr val="accent5"/>
+          </a:fillRef>
+          <a:effectRef idx="2">
+            <a:schemeClr val="accent5"/>
+          </a:effectRef>
+          <a:fontRef idx="minor">
+            <a:schemeClr val="tx1"/>
+          </a:fontRef>
+        </p:style>
+      </p:cxnSp>
+      <p:sp>
+        <p:nvSpPr>
+          <p:cNvPr id="13" name="Oval 12">
+            <a:extLst>
+              <a:ext uri="{FF2B5EF4-FFF2-40B4-BE49-F238E27FC236}">
+                <a16:creationId xmlns:a16="http://schemas.microsoft.com/office/drawing/2014/main" id="{9C6B15B5-28FD-8448-E55A-311157140289}"/>
+              </a:ext>
+            </a:extLst>
+          </p:cNvPr>
+          <p:cNvSpPr/>
+          <p:nvPr/>
+        </p:nvSpPr>
+        <p:spPr>
+          <a:xfrm>
+            <a:off x="6822584" y="1964283"/>
+            <a:ext cx="140086" cy="140086"/>
+          </a:xfrm>
+          <a:prstGeom prst="ellipse">
+            <a:avLst/>
+          </a:prstGeom>
+          <a:solidFill>
+            <a:srgbClr val="FFFF00"/>
+          </a:solidFill>
+          <a:ln>
+            <a:solidFill>
+              <a:schemeClr val="tx1"/>
+            </a:solidFill>
+          </a:ln>
+        </p:spPr>
+        <p:style>
+          <a:lnRef idx="2">
+            <a:schemeClr val="accent5">
+              <a:shade val="50000"/>
+            </a:schemeClr>
+          </a:lnRef>
+          <a:fillRef idx="1">
+            <a:schemeClr val="accent5"/>
+          </a:fillRef>
+          <a:effectRef idx="0">
+            <a:schemeClr val="accent5"/>
+          </a:effectRef>
+          <a:fontRef idx="minor">
+            <a:schemeClr val="lt1"/>
+          </a:fontRef>
+        </p:style>
+        <p:txBody>
+          <a:bodyPr rtlCol="0" anchor="ctr"/>
+          <a:lstStyle/>
+          <a:p>
+            <a:pPr algn="ctr"/>
+            <a:endParaRPr lang="en-US"/>
+          </a:p>
+        </p:txBody>
+      </p:sp>
+      <p:sp>
+        <p:nvSpPr>
+          <p:cNvPr id="14" name="Oval 13">
+            <a:extLst>
+              <a:ext uri="{FF2B5EF4-FFF2-40B4-BE49-F238E27FC236}">
+                <a16:creationId xmlns:a16="http://schemas.microsoft.com/office/drawing/2014/main" id="{B86EDAF9-ADD5-7E7A-53C0-52931A010CC8}"/>
+              </a:ext>
+            </a:extLst>
+          </p:cNvPr>
+          <p:cNvSpPr/>
+          <p:nvPr/>
+        </p:nvSpPr>
+        <p:spPr>
+          <a:xfrm>
+            <a:off x="3850201" y="1963569"/>
+            <a:ext cx="140086" cy="140086"/>
+          </a:xfrm>
+          <a:prstGeom prst="ellipse">
+            <a:avLst/>
+          </a:prstGeom>
+          <a:solidFill>
+            <a:srgbClr val="FF0000"/>
+          </a:solidFill>
+          <a:ln>
+            <a:solidFill>
+              <a:schemeClr val="tx1"/>
+            </a:solidFill>
+          </a:ln>
+        </p:spPr>
+        <p:style>
+          <a:lnRef idx="2">
+            <a:schemeClr val="accent5">
+              <a:shade val="50000"/>
+            </a:schemeClr>
+          </a:lnRef>
+          <a:fillRef idx="1">
+            <a:schemeClr val="accent5"/>
+          </a:fillRef>
+          <a:effectRef idx="0">
+            <a:schemeClr val="accent5"/>
+          </a:effectRef>
+          <a:fontRef idx="minor">
+            <a:schemeClr val="lt1"/>
+          </a:fontRef>
+        </p:style>
+        <p:txBody>
+          <a:bodyPr rtlCol="0" anchor="ctr"/>
+          <a:lstStyle/>
+          <a:p>
+            <a:pPr algn="ctr"/>
+            <a:endParaRPr lang="en-US"/>
+          </a:p>
+        </p:txBody>
+      </p:sp>
+      <p:cxnSp>
+        <p:nvCxnSpPr>
+          <p:cNvPr id="15" name="Straight Connector 14">
+            <a:extLst>
+              <a:ext uri="{FF2B5EF4-FFF2-40B4-BE49-F238E27FC236}">
+                <a16:creationId xmlns:a16="http://schemas.microsoft.com/office/drawing/2014/main" id="{E6A07ED4-E384-F2BF-D7DF-7E674A0131E5}"/>
+              </a:ext>
+            </a:extLst>
+          </p:cNvPr>
+          <p:cNvCxnSpPr>
+            <a:stCxn id="14" idx="6"/>
+            <a:endCxn id="16" idx="2"/>
+          </p:cNvCxnSpPr>
+          <p:nvPr/>
+        </p:nvCxnSpPr>
+        <p:spPr>
+          <a:xfrm flipV="1">
+            <a:off x="3990287" y="2030324"/>
+            <a:ext cx="105890" cy="3288"/>
+          </a:xfrm>
+          <a:prstGeom prst="line">
+            <a:avLst/>
+          </a:prstGeom>
+          <a:ln>
+            <a:solidFill>
+              <a:schemeClr val="tx1"/>
+            </a:solidFill>
+          </a:ln>
+        </p:spPr>
+        <p:style>
+          <a:lnRef idx="3">
+            <a:schemeClr val="accent5"/>
+          </a:lnRef>
+          <a:fillRef idx="0">
+            <a:schemeClr val="accent5"/>
+          </a:fillRef>
+          <a:effectRef idx="2">
+            <a:schemeClr val="accent5"/>
+          </a:effectRef>
+          <a:fontRef idx="minor">
+            <a:schemeClr val="tx1"/>
+          </a:fontRef>
+        </p:style>
+      </p:cxnSp>
+      <p:sp>
+        <p:nvSpPr>
+          <p:cNvPr id="16" name="Oval 15">
+            <a:extLst>
+              <a:ext uri="{FF2B5EF4-FFF2-40B4-BE49-F238E27FC236}">
+                <a16:creationId xmlns:a16="http://schemas.microsoft.com/office/drawing/2014/main" id="{D28D57D8-8E3E-6362-183A-F7A40DAD243C}"/>
+              </a:ext>
+            </a:extLst>
+          </p:cNvPr>
+          <p:cNvSpPr/>
+          <p:nvPr/>
+        </p:nvSpPr>
+        <p:spPr>
+          <a:xfrm>
+            <a:off x="4096177" y="1960281"/>
+            <a:ext cx="140086" cy="140086"/>
+          </a:xfrm>
+          <a:prstGeom prst="ellipse">
+            <a:avLst/>
+          </a:prstGeom>
+          <a:solidFill>
+            <a:srgbClr val="FFFF00"/>
+          </a:solidFill>
+          <a:ln>
+            <a:solidFill>
+              <a:schemeClr val="tx1"/>
+            </a:solidFill>
+          </a:ln>
+        </p:spPr>
+        <p:style>
+          <a:lnRef idx="2">
+            <a:schemeClr val="accent5">
+              <a:shade val="50000"/>
+            </a:schemeClr>
+          </a:lnRef>
+          <a:fillRef idx="1">
+            <a:schemeClr val="accent5"/>
+          </a:fillRef>
+          <a:effectRef idx="0">
+            <a:schemeClr val="accent5"/>
+          </a:effectRef>
+          <a:fontRef idx="minor">
+            <a:schemeClr val="lt1"/>
+          </a:fontRef>
+        </p:style>
+        <p:txBody>
+          <a:bodyPr rtlCol="0" anchor="ctr"/>
+          <a:lstStyle/>
+          <a:p>
+            <a:pPr algn="ctr"/>
+            <a:endParaRPr lang="en-US"/>
+          </a:p>
+        </p:txBody>
+      </p:sp>
+      <p:sp>
+        <p:nvSpPr>
+          <p:cNvPr id="17" name="Oval 16">
+            <a:extLst>
+              <a:ext uri="{FF2B5EF4-FFF2-40B4-BE49-F238E27FC236}">
+                <a16:creationId xmlns:a16="http://schemas.microsoft.com/office/drawing/2014/main" id="{9AEC8522-C834-2956-CBDB-1AF3EA5B2E57}"/>
+              </a:ext>
+            </a:extLst>
+          </p:cNvPr>
+          <p:cNvSpPr/>
+          <p:nvPr/>
+        </p:nvSpPr>
+        <p:spPr>
+          <a:xfrm>
+            <a:off x="3850201" y="4669441"/>
+            <a:ext cx="140086" cy="140086"/>
+          </a:xfrm>
+          <a:prstGeom prst="ellipse">
+            <a:avLst/>
+          </a:prstGeom>
+          <a:solidFill>
+            <a:srgbClr val="FF0000"/>
+          </a:solidFill>
+          <a:ln>
+            <a:solidFill>
+              <a:schemeClr val="tx1"/>
+            </a:solidFill>
+          </a:ln>
+        </p:spPr>
+        <p:style>
+          <a:lnRef idx="2">
+            <a:schemeClr val="accent5">
+              <a:shade val="50000"/>
+            </a:schemeClr>
+          </a:lnRef>
+          <a:fillRef idx="1">
+            <a:schemeClr val="accent5"/>
+          </a:fillRef>
+          <a:effectRef idx="0">
+            <a:schemeClr val="accent5"/>
+          </a:effectRef>
+          <a:fontRef idx="minor">
+            <a:schemeClr val="lt1"/>
+          </a:fontRef>
+        </p:style>
+        <p:txBody>
+          <a:bodyPr rtlCol="0" anchor="ctr"/>
+          <a:lstStyle/>
+          <a:p>
+            <a:pPr algn="ctr"/>
+            <a:endParaRPr lang="en-US"/>
+          </a:p>
+        </p:txBody>
+      </p:sp>
+      <p:cxnSp>
+        <p:nvCxnSpPr>
+          <p:cNvPr id="18" name="Straight Connector 17">
+            <a:extLst>
+              <a:ext uri="{FF2B5EF4-FFF2-40B4-BE49-F238E27FC236}">
+                <a16:creationId xmlns:a16="http://schemas.microsoft.com/office/drawing/2014/main" id="{5C062246-A6EF-BD46-17A1-5CA8FD54B0CE}"/>
+              </a:ext>
+            </a:extLst>
+          </p:cNvPr>
+          <p:cNvCxnSpPr>
+            <a:stCxn id="17" idx="6"/>
+            <a:endCxn id="19" idx="2"/>
+          </p:cNvCxnSpPr>
+          <p:nvPr/>
+        </p:nvCxnSpPr>
+        <p:spPr>
+          <a:xfrm flipV="1">
+            <a:off x="3990287" y="4736196"/>
+            <a:ext cx="105890" cy="3288"/>
+          </a:xfrm>
+          <a:prstGeom prst="line">
+            <a:avLst/>
+          </a:prstGeom>
+          <a:ln>
+            <a:solidFill>
+              <a:schemeClr val="tx1"/>
+            </a:solidFill>
+          </a:ln>
+        </p:spPr>
+        <p:style>
+          <a:lnRef idx="3">
+            <a:schemeClr val="accent5"/>
+          </a:lnRef>
+          <a:fillRef idx="0">
+            <a:schemeClr val="accent5"/>
+          </a:fillRef>
+          <a:effectRef idx="2">
+            <a:schemeClr val="accent5"/>
+          </a:effectRef>
+          <a:fontRef idx="minor">
+            <a:schemeClr val="tx1"/>
+          </a:fontRef>
+        </p:style>
+      </p:cxnSp>
+      <p:sp>
+        <p:nvSpPr>
+          <p:cNvPr id="19" name="Oval 18">
+            <a:extLst>
+              <a:ext uri="{FF2B5EF4-FFF2-40B4-BE49-F238E27FC236}">
+                <a16:creationId xmlns:a16="http://schemas.microsoft.com/office/drawing/2014/main" id="{E5863D6A-5CF8-146C-EAD8-54882483A1B1}"/>
+              </a:ext>
+            </a:extLst>
+          </p:cNvPr>
+          <p:cNvSpPr/>
+          <p:nvPr/>
+        </p:nvSpPr>
+        <p:spPr>
+          <a:xfrm>
+            <a:off x="4096177" y="4666153"/>
+            <a:ext cx="140086" cy="140086"/>
+          </a:xfrm>
+          <a:prstGeom prst="ellipse">
+            <a:avLst/>
+          </a:prstGeom>
+          <a:solidFill>
+            <a:srgbClr val="FFFF00"/>
+          </a:solidFill>
+          <a:ln>
+            <a:solidFill>
+              <a:schemeClr val="tx1"/>
+            </a:solidFill>
+          </a:ln>
+        </p:spPr>
+        <p:style>
+          <a:lnRef idx="2">
+            <a:schemeClr val="accent5">
+              <a:shade val="50000"/>
+            </a:schemeClr>
+          </a:lnRef>
+          <a:fillRef idx="1">
+            <a:schemeClr val="accent5"/>
+          </a:fillRef>
+          <a:effectRef idx="0">
+            <a:schemeClr val="accent5"/>
+          </a:effectRef>
+          <a:fontRef idx="minor">
+            <a:schemeClr val="lt1"/>
+          </a:fontRef>
+        </p:style>
+        <p:txBody>
+          <a:bodyPr rtlCol="0" anchor="ctr"/>
+          <a:lstStyle/>
+          <a:p>
+            <a:pPr algn="ctr"/>
+            <a:endParaRPr lang="en-US"/>
+          </a:p>
+        </p:txBody>
+      </p:sp>
+      <p:sp>
+        <p:nvSpPr>
+          <p:cNvPr id="20" name="TextBox 19">
+            <a:extLst>
+              <a:ext uri="{FF2B5EF4-FFF2-40B4-BE49-F238E27FC236}">
+                <a16:creationId xmlns:a16="http://schemas.microsoft.com/office/drawing/2014/main" id="{3237ED74-5977-3653-EA59-B37332BBF109}"/>
+              </a:ext>
+            </a:extLst>
+          </p:cNvPr>
+          <p:cNvSpPr txBox="1"/>
+          <p:nvPr/>
+        </p:nvSpPr>
+        <p:spPr>
+          <a:xfrm>
+            <a:off x="6128829" y="3337064"/>
+            <a:ext cx="2435667" cy="369332"/>
+          </a:xfrm>
+          <a:prstGeom prst="rect">
+            <a:avLst/>
+          </a:prstGeom>
+          <a:noFill/>
+        </p:spPr>
+        <p:txBody>
+          <a:bodyPr wrap="none" rtlCol="0">
+            <a:spAutoFit/>
+          </a:bodyPr>
+          <a:lstStyle/>
+          <a:p>
+            <a:r>
+              <a:rPr lang="en-US" dirty="0"/>
+              <a:t>On GitHub (Browser)</a:t>
+            </a:r>
+          </a:p>
+        </p:txBody>
+      </p:sp>
+      <p:sp>
+        <p:nvSpPr>
+          <p:cNvPr id="21" name="TextBox 20">
+            <a:extLst>
+              <a:ext uri="{FF2B5EF4-FFF2-40B4-BE49-F238E27FC236}">
+                <a16:creationId xmlns:a16="http://schemas.microsoft.com/office/drawing/2014/main" id="{89223112-2D70-FE4F-8FC4-B411494E2586}"/>
+              </a:ext>
+            </a:extLst>
+          </p:cNvPr>
+          <p:cNvSpPr txBox="1"/>
+          <p:nvPr/>
+        </p:nvSpPr>
+        <p:spPr>
+          <a:xfrm>
+            <a:off x="5578999" y="3845683"/>
+            <a:ext cx="2985497" cy="369332"/>
+          </a:xfrm>
+          <a:prstGeom prst="rect">
+            <a:avLst/>
+          </a:prstGeom>
+          <a:noFill/>
+        </p:spPr>
+        <p:txBody>
+          <a:bodyPr wrap="none" rtlCol="0">
+            <a:spAutoFit/>
+          </a:bodyPr>
+          <a:lstStyle/>
+          <a:p>
+            <a:r>
+              <a:rPr lang="en-US" dirty="0"/>
+              <a:t>On Your Machine (git/CLI)</a:t>
+            </a:r>
+          </a:p>
+        </p:txBody>
+      </p:sp>
+      <p:sp>
+        <p:nvSpPr>
+          <p:cNvPr id="22" name="TextBox 21">
+            <a:extLst>
+              <a:ext uri="{FF2B5EF4-FFF2-40B4-BE49-F238E27FC236}">
+                <a16:creationId xmlns:a16="http://schemas.microsoft.com/office/drawing/2014/main" id="{18836F01-5EB9-DA15-F69A-5DA37C913F02}"/>
+              </a:ext>
+            </a:extLst>
+          </p:cNvPr>
+          <p:cNvSpPr txBox="1"/>
+          <p:nvPr/>
+        </p:nvSpPr>
+        <p:spPr>
+          <a:xfrm>
+            <a:off x="2421866" y="3330463"/>
+            <a:ext cx="1013419" cy="369332"/>
+          </a:xfrm>
+          <a:prstGeom prst="rect">
+            <a:avLst/>
+          </a:prstGeom>
+          <a:noFill/>
+        </p:spPr>
+        <p:txBody>
+          <a:bodyPr wrap="none" rtlCol="0">
+            <a:spAutoFit/>
+          </a:bodyPr>
+          <a:lstStyle/>
+          <a:p>
+            <a:r>
+              <a:rPr lang="en-US" dirty="0"/>
+              <a:t>Remote</a:t>
+            </a:r>
+          </a:p>
+        </p:txBody>
+      </p:sp>
+      <p:sp>
+        <p:nvSpPr>
+          <p:cNvPr id="23" name="TextBox 22">
+            <a:extLst>
+              <a:ext uri="{FF2B5EF4-FFF2-40B4-BE49-F238E27FC236}">
+                <a16:creationId xmlns:a16="http://schemas.microsoft.com/office/drawing/2014/main" id="{91A6F7C2-13DC-58B2-554D-D032E1DBB748}"/>
+              </a:ext>
+            </a:extLst>
+          </p:cNvPr>
+          <p:cNvSpPr txBox="1"/>
+          <p:nvPr/>
+        </p:nvSpPr>
+        <p:spPr>
+          <a:xfrm>
+            <a:off x="2564741" y="3872189"/>
+            <a:ext cx="748923" cy="369332"/>
+          </a:xfrm>
+          <a:prstGeom prst="rect">
+            <a:avLst/>
+          </a:prstGeom>
+          <a:noFill/>
+        </p:spPr>
+        <p:txBody>
+          <a:bodyPr wrap="none" rtlCol="0">
+            <a:spAutoFit/>
+          </a:bodyPr>
+          <a:lstStyle/>
+          <a:p>
+            <a:r>
+              <a:rPr lang="en-US" dirty="0"/>
+              <a:t>Local</a:t>
+            </a:r>
+          </a:p>
+        </p:txBody>
+      </p:sp>
+      <p:cxnSp>
+        <p:nvCxnSpPr>
+          <p:cNvPr id="24" name="Curved Connector 23">
+            <a:extLst>
+              <a:ext uri="{FF2B5EF4-FFF2-40B4-BE49-F238E27FC236}">
+                <a16:creationId xmlns:a16="http://schemas.microsoft.com/office/drawing/2014/main" id="{1427B05F-2E59-6D2E-DE30-FFEE8BD3CE6D}"/>
+              </a:ext>
+            </a:extLst>
+          </p:cNvPr>
+          <p:cNvCxnSpPr>
+            <a:cxnSpLocks/>
+          </p:cNvCxnSpPr>
+          <p:nvPr/>
+        </p:nvCxnSpPr>
+        <p:spPr>
+          <a:xfrm rot="5400000" flipH="1" flipV="1">
+            <a:off x="5777131" y="149525"/>
+            <a:ext cx="19660" cy="2734056"/>
+          </a:xfrm>
+          <a:prstGeom prst="curvedConnector3">
+            <a:avLst>
+              <a:gd name="adj1" fmla="val 1838622"/>
+            </a:avLst>
+          </a:prstGeom>
+          <a:ln w="63500">
+            <a:solidFill>
+              <a:schemeClr val="accent4"/>
+            </a:solidFill>
+            <a:prstDash val="sysDot"/>
+            <a:tailEnd type="triangle"/>
+          </a:ln>
+        </p:spPr>
+        <p:style>
+          <a:lnRef idx="2">
+            <a:schemeClr val="accent1"/>
+          </a:lnRef>
+          <a:fillRef idx="0">
+            <a:schemeClr val="accent1"/>
+          </a:fillRef>
+          <a:effectRef idx="1">
+            <a:schemeClr val="accent1"/>
+          </a:effectRef>
+          <a:fontRef idx="minor">
+            <a:schemeClr val="tx1"/>
+          </a:fontRef>
+        </p:style>
+      </p:cxnSp>
+      <p:cxnSp>
+        <p:nvCxnSpPr>
+          <p:cNvPr id="25" name="Curved Connector 24">
+            <a:extLst>
+              <a:ext uri="{FF2B5EF4-FFF2-40B4-BE49-F238E27FC236}">
+                <a16:creationId xmlns:a16="http://schemas.microsoft.com/office/drawing/2014/main" id="{570DE214-2E3A-09A2-F0A7-593389DCFB45}"/>
+              </a:ext>
+            </a:extLst>
+          </p:cNvPr>
+          <p:cNvCxnSpPr>
+            <a:cxnSpLocks/>
+          </p:cNvCxnSpPr>
+          <p:nvPr/>
+        </p:nvCxnSpPr>
+        <p:spPr>
+          <a:xfrm rot="10800000" flipH="1">
+            <a:off x="3719761" y="2126548"/>
+            <a:ext cx="21649" cy="2932304"/>
+          </a:xfrm>
+          <a:prstGeom prst="curvedConnector3">
+            <a:avLst>
+              <a:gd name="adj1" fmla="val -1055938"/>
+            </a:avLst>
+          </a:prstGeom>
+          <a:ln w="63500">
+            <a:solidFill>
+              <a:schemeClr val="accent4"/>
+            </a:solidFill>
+            <a:prstDash val="sysDot"/>
+            <a:tailEnd type="triangle"/>
+          </a:ln>
+        </p:spPr>
+        <p:style>
+          <a:lnRef idx="2">
+            <a:schemeClr val="accent1"/>
+          </a:lnRef>
+          <a:fillRef idx="0">
+            <a:schemeClr val="accent1"/>
+          </a:fillRef>
+          <a:effectRef idx="1">
+            <a:schemeClr val="accent1"/>
+          </a:effectRef>
+          <a:fontRef idx="minor">
+            <a:schemeClr val="tx1"/>
+          </a:fontRef>
+        </p:style>
+      </p:cxnSp>
+      <p:cxnSp>
+        <p:nvCxnSpPr>
+          <p:cNvPr id="26" name="Straight Connector 25">
+            <a:extLst>
+              <a:ext uri="{FF2B5EF4-FFF2-40B4-BE49-F238E27FC236}">
+                <a16:creationId xmlns:a16="http://schemas.microsoft.com/office/drawing/2014/main" id="{CE895954-CFC6-00C7-8A2A-1ACE5F45D4CF}"/>
+              </a:ext>
+            </a:extLst>
+          </p:cNvPr>
+          <p:cNvCxnSpPr>
+            <a:endCxn id="27" idx="2"/>
+          </p:cNvCxnSpPr>
+          <p:nvPr/>
+        </p:nvCxnSpPr>
+        <p:spPr>
+          <a:xfrm flipV="1">
+            <a:off x="4242703" y="2032281"/>
+            <a:ext cx="105890" cy="3288"/>
+          </a:xfrm>
+          <a:prstGeom prst="line">
+            <a:avLst/>
+          </a:prstGeom>
+          <a:ln>
+            <a:solidFill>
+              <a:schemeClr val="tx1"/>
+            </a:solidFill>
+          </a:ln>
+        </p:spPr>
+        <p:style>
+          <a:lnRef idx="3">
+            <a:schemeClr val="accent5"/>
+          </a:lnRef>
+          <a:fillRef idx="0">
+            <a:schemeClr val="accent5"/>
+          </a:fillRef>
+          <a:effectRef idx="2">
+            <a:schemeClr val="accent5"/>
+          </a:effectRef>
+          <a:fontRef idx="minor">
+            <a:schemeClr val="tx1"/>
+          </a:fontRef>
+        </p:style>
+      </p:cxnSp>
+      <p:sp>
+        <p:nvSpPr>
+          <p:cNvPr id="27" name="Oval 26">
+            <a:extLst>
+              <a:ext uri="{FF2B5EF4-FFF2-40B4-BE49-F238E27FC236}">
+                <a16:creationId xmlns:a16="http://schemas.microsoft.com/office/drawing/2014/main" id="{FE8807C8-6AEA-170B-3A8C-4AD10A49DA34}"/>
+              </a:ext>
+            </a:extLst>
+          </p:cNvPr>
+          <p:cNvSpPr/>
+          <p:nvPr/>
+        </p:nvSpPr>
+        <p:spPr>
+          <a:xfrm>
+            <a:off x="4348593" y="1962238"/>
+            <a:ext cx="140086" cy="140086"/>
+          </a:xfrm>
+          <a:prstGeom prst="ellipse">
+            <a:avLst/>
+          </a:prstGeom>
+          <a:solidFill>
+            <a:srgbClr val="00B050"/>
+          </a:solidFill>
+          <a:ln>
+            <a:solidFill>
+              <a:schemeClr val="tx1"/>
+            </a:solidFill>
+          </a:ln>
+        </p:spPr>
+        <p:style>
+          <a:lnRef idx="2">
+            <a:schemeClr val="accent5">
+              <a:shade val="50000"/>
+            </a:schemeClr>
+          </a:lnRef>
+          <a:fillRef idx="1">
+            <a:schemeClr val="accent5"/>
+          </a:fillRef>
+          <a:effectRef idx="0">
+            <a:schemeClr val="accent5"/>
+          </a:effectRef>
+          <a:fontRef idx="minor">
+            <a:schemeClr val="lt1"/>
+          </a:fontRef>
+        </p:style>
+        <p:txBody>
+          <a:bodyPr rtlCol="0" anchor="ctr"/>
+          <a:lstStyle/>
+          <a:p>
+            <a:pPr algn="ctr"/>
+            <a:endParaRPr lang="en-US"/>
+          </a:p>
+        </p:txBody>
+      </p:sp>
+      <p:cxnSp>
+        <p:nvCxnSpPr>
+          <p:cNvPr id="28" name="Straight Connector 27">
+            <a:extLst>
+              <a:ext uri="{FF2B5EF4-FFF2-40B4-BE49-F238E27FC236}">
+                <a16:creationId xmlns:a16="http://schemas.microsoft.com/office/drawing/2014/main" id="{D751C283-931F-F96C-126F-D04F74628287}"/>
+              </a:ext>
+            </a:extLst>
+          </p:cNvPr>
+          <p:cNvCxnSpPr>
+            <a:endCxn id="29" idx="2"/>
+          </p:cNvCxnSpPr>
+          <p:nvPr/>
+        </p:nvCxnSpPr>
+        <p:spPr>
+          <a:xfrm flipV="1">
+            <a:off x="6962670" y="2030324"/>
+            <a:ext cx="105890" cy="3288"/>
+          </a:xfrm>
+          <a:prstGeom prst="line">
+            <a:avLst/>
+          </a:prstGeom>
+          <a:ln>
+            <a:solidFill>
+              <a:schemeClr val="tx1"/>
+            </a:solidFill>
+          </a:ln>
+        </p:spPr>
+        <p:style>
+          <a:lnRef idx="3">
+            <a:schemeClr val="accent5"/>
+          </a:lnRef>
+          <a:fillRef idx="0">
+            <a:schemeClr val="accent5"/>
+          </a:fillRef>
+          <a:effectRef idx="2">
+            <a:schemeClr val="accent5"/>
+          </a:effectRef>
+          <a:fontRef idx="minor">
+            <a:schemeClr val="tx1"/>
+          </a:fontRef>
+        </p:style>
+      </p:cxnSp>
+      <p:sp>
+        <p:nvSpPr>
+          <p:cNvPr id="29" name="Oval 28">
+            <a:extLst>
+              <a:ext uri="{FF2B5EF4-FFF2-40B4-BE49-F238E27FC236}">
+                <a16:creationId xmlns:a16="http://schemas.microsoft.com/office/drawing/2014/main" id="{CE4994B9-9ED5-92E4-6F7C-1422248D7C2F}"/>
+              </a:ext>
+            </a:extLst>
+          </p:cNvPr>
+          <p:cNvSpPr/>
+          <p:nvPr/>
+        </p:nvSpPr>
+        <p:spPr>
+          <a:xfrm>
+            <a:off x="7068560" y="1960281"/>
+            <a:ext cx="140086" cy="140086"/>
+          </a:xfrm>
+          <a:prstGeom prst="ellipse">
+            <a:avLst/>
+          </a:prstGeom>
+          <a:solidFill>
+            <a:srgbClr val="00B050"/>
+          </a:solidFill>
+          <a:ln>
+            <a:solidFill>
+              <a:schemeClr val="tx1"/>
+            </a:solidFill>
+          </a:ln>
+        </p:spPr>
+        <p:style>
+          <a:lnRef idx="2">
+            <a:schemeClr val="accent5">
+              <a:shade val="50000"/>
+            </a:schemeClr>
+          </a:lnRef>
+          <a:fillRef idx="1">
+            <a:schemeClr val="accent5"/>
+          </a:fillRef>
+          <a:effectRef idx="0">
+            <a:schemeClr val="accent5"/>
+          </a:effectRef>
+          <a:fontRef idx="minor">
+            <a:schemeClr val="lt1"/>
+          </a:fontRef>
+        </p:style>
+        <p:txBody>
+          <a:bodyPr rtlCol="0" anchor="ctr"/>
+          <a:lstStyle/>
+          <a:p>
+            <a:pPr algn="ctr"/>
+            <a:endParaRPr lang="en-US"/>
+          </a:p>
+        </p:txBody>
+      </p:sp>
+      <p:cxnSp>
+        <p:nvCxnSpPr>
+          <p:cNvPr id="30" name="Straight Connector 29">
+            <a:extLst>
+              <a:ext uri="{FF2B5EF4-FFF2-40B4-BE49-F238E27FC236}">
+                <a16:creationId xmlns:a16="http://schemas.microsoft.com/office/drawing/2014/main" id="{9800AD63-CA12-5169-2DE4-77CB2955027E}"/>
+              </a:ext>
+            </a:extLst>
+          </p:cNvPr>
+          <p:cNvCxnSpPr>
+            <a:endCxn id="31" idx="2"/>
+          </p:cNvCxnSpPr>
+          <p:nvPr/>
+        </p:nvCxnSpPr>
+        <p:spPr>
+          <a:xfrm flipV="1">
+            <a:off x="4236263" y="4736196"/>
+            <a:ext cx="105890" cy="3288"/>
+          </a:xfrm>
+          <a:prstGeom prst="line">
+            <a:avLst/>
+          </a:prstGeom>
+          <a:ln>
+            <a:solidFill>
+              <a:schemeClr val="tx1"/>
+            </a:solidFill>
+          </a:ln>
+        </p:spPr>
+        <p:style>
+          <a:lnRef idx="3">
+            <a:schemeClr val="accent5"/>
+          </a:lnRef>
+          <a:fillRef idx="0">
+            <a:schemeClr val="accent5"/>
+          </a:fillRef>
+          <a:effectRef idx="2">
+            <a:schemeClr val="accent5"/>
+          </a:effectRef>
+          <a:fontRef idx="minor">
+            <a:schemeClr val="tx1"/>
+          </a:fontRef>
+        </p:style>
+      </p:cxnSp>
+      <p:sp>
+        <p:nvSpPr>
+          <p:cNvPr id="31" name="Oval 30">
+            <a:extLst>
+              <a:ext uri="{FF2B5EF4-FFF2-40B4-BE49-F238E27FC236}">
+                <a16:creationId xmlns:a16="http://schemas.microsoft.com/office/drawing/2014/main" id="{C1A05DA3-1359-E63B-540D-5C8A7B623693}"/>
+              </a:ext>
+            </a:extLst>
+          </p:cNvPr>
+          <p:cNvSpPr/>
+          <p:nvPr/>
+        </p:nvSpPr>
+        <p:spPr>
+          <a:xfrm>
+            <a:off x="4342153" y="4666153"/>
+            <a:ext cx="140086" cy="140086"/>
+          </a:xfrm>
+          <a:prstGeom prst="ellipse">
+            <a:avLst/>
+          </a:prstGeom>
+          <a:solidFill>
+            <a:srgbClr val="00B050"/>
+          </a:solidFill>
+          <a:ln>
+            <a:solidFill>
+              <a:schemeClr val="tx1"/>
+            </a:solidFill>
+          </a:ln>
+        </p:spPr>
+        <p:style>
+          <a:lnRef idx="2">
+            <a:schemeClr val="accent5">
+              <a:shade val="50000"/>
+            </a:schemeClr>
+          </a:lnRef>
+          <a:fillRef idx="1">
+            <a:schemeClr val="accent5"/>
+          </a:fillRef>
+          <a:effectRef idx="0">
+            <a:schemeClr val="accent5"/>
+          </a:effectRef>
+          <a:fontRef idx="minor">
+            <a:schemeClr val="lt1"/>
+          </a:fontRef>
+        </p:style>
+        <p:txBody>
+          <a:bodyPr rtlCol="0" anchor="ctr"/>
+          <a:lstStyle/>
+          <a:p>
+            <a:pPr algn="ctr"/>
+            <a:endParaRPr lang="en-US"/>
+          </a:p>
+        </p:txBody>
+      </p:sp>
+      <p:sp>
+        <p:nvSpPr>
+          <p:cNvPr id="32" name="Rounded Rectangle 31">
+            <a:extLst>
+              <a:ext uri="{FF2B5EF4-FFF2-40B4-BE49-F238E27FC236}">
+                <a16:creationId xmlns:a16="http://schemas.microsoft.com/office/drawing/2014/main" id="{2844D770-13E9-863C-75C1-383AF2A9AD1F}"/>
+              </a:ext>
+            </a:extLst>
+          </p:cNvPr>
+          <p:cNvSpPr/>
+          <p:nvPr/>
+        </p:nvSpPr>
+        <p:spPr>
+          <a:xfrm>
+            <a:off x="6822584" y="4226994"/>
+            <a:ext cx="1471845" cy="239921"/>
+          </a:xfrm>
+          <a:prstGeom prst="roundRect">
+            <a:avLst/>
+          </a:prstGeom>
+        </p:spPr>
+        <p:style>
+          <a:lnRef idx="3">
+            <a:schemeClr val="lt1"/>
+          </a:lnRef>
+          <a:fillRef idx="1">
+            <a:schemeClr val="accent3"/>
+          </a:fillRef>
+          <a:effectRef idx="1">
+            <a:schemeClr val="accent3"/>
+          </a:effectRef>
+          <a:fontRef idx="minor">
+            <a:schemeClr val="lt1"/>
+          </a:fontRef>
+        </p:style>
+        <p:txBody>
+          <a:bodyPr rtlCol="0" anchor="ctr"/>
+          <a:lstStyle/>
+          <a:p>
+            <a:pPr algn="ctr"/>
+            <a:r>
+              <a:rPr lang="en-US" sz="1200" dirty="0"/>
+              <a:t>main branch</a:t>
+            </a:r>
+          </a:p>
+        </p:txBody>
+      </p:sp>
+      <p:sp>
+        <p:nvSpPr>
+          <p:cNvPr id="33" name="Parallelogram 32">
+            <a:extLst>
+              <a:ext uri="{FF2B5EF4-FFF2-40B4-BE49-F238E27FC236}">
+                <a16:creationId xmlns:a16="http://schemas.microsoft.com/office/drawing/2014/main" id="{8384C9FC-7B6B-2AC6-7EEE-EFB0469E3503}"/>
+              </a:ext>
+            </a:extLst>
+          </p:cNvPr>
+          <p:cNvSpPr/>
+          <p:nvPr/>
+        </p:nvSpPr>
+        <p:spPr>
+          <a:xfrm>
+            <a:off x="5988209" y="4936620"/>
+            <a:ext cx="1104476" cy="587856"/>
+          </a:xfrm>
+          <a:prstGeom prst="parallelogram">
+            <a:avLst/>
+          </a:prstGeom>
+        </p:spPr>
+        <p:style>
+          <a:lnRef idx="1">
+            <a:schemeClr val="accent1"/>
+          </a:lnRef>
+          <a:fillRef idx="3">
+            <a:schemeClr val="accent1"/>
+          </a:fillRef>
+          <a:effectRef idx="2">
+            <a:schemeClr val="accent1"/>
+          </a:effectRef>
+          <a:fontRef idx="minor">
+            <a:schemeClr val="lt1"/>
+          </a:fontRef>
+        </p:style>
+        <p:txBody>
+          <a:bodyPr rtlCol="0" anchor="ctr"/>
+          <a:lstStyle/>
+          <a:p>
+            <a:pPr algn="ctr"/>
+            <a:endParaRPr lang="en-US" dirty="0">
+              <a:solidFill>
+                <a:srgbClr val="000000"/>
+              </a:solidFill>
+            </a:endParaRPr>
+          </a:p>
+        </p:txBody>
+      </p:sp>
+      <p:sp>
+        <p:nvSpPr>
+          <p:cNvPr id="34" name="Rounded Rectangle 33">
+            <a:extLst>
+              <a:ext uri="{FF2B5EF4-FFF2-40B4-BE49-F238E27FC236}">
+                <a16:creationId xmlns:a16="http://schemas.microsoft.com/office/drawing/2014/main" id="{2D623027-A2A4-C7CD-F94C-90F19A0EADA3}"/>
+              </a:ext>
+            </a:extLst>
+          </p:cNvPr>
+          <p:cNvSpPr/>
+          <p:nvPr/>
+        </p:nvSpPr>
+        <p:spPr>
+          <a:xfrm>
+            <a:off x="6246942" y="5104497"/>
+            <a:ext cx="526199" cy="239921"/>
+          </a:xfrm>
+          <a:prstGeom prst="roundRect">
+            <a:avLst/>
+          </a:prstGeom>
+        </p:spPr>
+        <p:style>
+          <a:lnRef idx="3">
+            <a:schemeClr val="lt1"/>
+          </a:lnRef>
+          <a:fillRef idx="1">
+            <a:schemeClr val="accent4"/>
+          </a:fillRef>
+          <a:effectRef idx="1">
+            <a:schemeClr val="accent4"/>
+          </a:effectRef>
+          <a:fontRef idx="minor">
+            <a:schemeClr val="lt1"/>
+          </a:fontRef>
+        </p:style>
+        <p:txBody>
+          <a:bodyPr rtlCol="0" anchor="ctr"/>
+          <a:lstStyle/>
+          <a:p>
+            <a:pPr algn="ctr"/>
+            <a:endParaRPr lang="en-US" sz="1200" dirty="0"/>
+          </a:p>
+        </p:txBody>
+      </p:sp>
+      <p:sp>
+        <p:nvSpPr>
+          <p:cNvPr id="35" name="Oval 34">
+            <a:extLst>
+              <a:ext uri="{FF2B5EF4-FFF2-40B4-BE49-F238E27FC236}">
+                <a16:creationId xmlns:a16="http://schemas.microsoft.com/office/drawing/2014/main" id="{A5448CEF-EB52-CE8E-8AD1-F8D5AFEF4CA0}"/>
+              </a:ext>
+            </a:extLst>
+          </p:cNvPr>
+          <p:cNvSpPr/>
+          <p:nvPr/>
+        </p:nvSpPr>
+        <p:spPr>
+          <a:xfrm>
+            <a:off x="6454470" y="5165484"/>
+            <a:ext cx="140086" cy="140086"/>
+          </a:xfrm>
+          <a:prstGeom prst="ellipse">
+            <a:avLst/>
+          </a:prstGeom>
+          <a:solidFill>
+            <a:schemeClr val="accent5">
+              <a:lumMod val="60000"/>
+              <a:lumOff val="40000"/>
+            </a:schemeClr>
+          </a:solidFill>
+          <a:ln>
+            <a:solidFill>
+              <a:schemeClr val="tx1"/>
+            </a:solidFill>
+          </a:ln>
+        </p:spPr>
+        <p:style>
+          <a:lnRef idx="2">
+            <a:schemeClr val="accent5">
+              <a:shade val="50000"/>
+            </a:schemeClr>
+          </a:lnRef>
+          <a:fillRef idx="1">
+            <a:schemeClr val="accent5"/>
+          </a:fillRef>
+          <a:effectRef idx="0">
+            <a:schemeClr val="accent5"/>
+          </a:effectRef>
+          <a:fontRef idx="minor">
+            <a:schemeClr val="lt1"/>
+          </a:fontRef>
+        </p:style>
+        <p:txBody>
+          <a:bodyPr rtlCol="0" anchor="ctr"/>
+          <a:lstStyle/>
+          <a:p>
+            <a:pPr algn="ctr"/>
+            <a:endParaRPr lang="en-US"/>
+          </a:p>
+        </p:txBody>
+      </p:sp>
+      <p:sp>
+        <p:nvSpPr>
+          <p:cNvPr id="36" name="Rounded Rectangle 35">
+            <a:extLst>
+              <a:ext uri="{FF2B5EF4-FFF2-40B4-BE49-F238E27FC236}">
+                <a16:creationId xmlns:a16="http://schemas.microsoft.com/office/drawing/2014/main" id="{A5E77E62-C950-0C75-38AE-05CC99696E6B}"/>
+              </a:ext>
+            </a:extLst>
+          </p:cNvPr>
+          <p:cNvSpPr/>
+          <p:nvPr/>
+        </p:nvSpPr>
+        <p:spPr>
+          <a:xfrm>
+            <a:off x="4166220" y="5551566"/>
+            <a:ext cx="871375" cy="210376"/>
+          </a:xfrm>
+          <a:prstGeom prst="roundRect">
+            <a:avLst/>
+          </a:prstGeom>
+        </p:spPr>
+        <p:style>
+          <a:lnRef idx="3">
+            <a:schemeClr val="lt1"/>
+          </a:lnRef>
+          <a:fillRef idx="1">
+            <a:schemeClr val="accent5"/>
+          </a:fillRef>
+          <a:effectRef idx="1">
+            <a:schemeClr val="accent5"/>
+          </a:effectRef>
+          <a:fontRef idx="minor">
+            <a:schemeClr val="lt1"/>
+          </a:fontRef>
+        </p:style>
+        <p:txBody>
+          <a:bodyPr rtlCol="0" anchor="ctr"/>
+          <a:lstStyle/>
+          <a:p>
+            <a:pPr algn="ctr"/>
+            <a:r>
+              <a:rPr lang="en-US" sz="1400" dirty="0"/>
+              <a:t>Stage</a:t>
+            </a:r>
+          </a:p>
+        </p:txBody>
+      </p:sp>
+      <p:sp>
+        <p:nvSpPr>
+          <p:cNvPr id="37" name="TextBox 36">
+            <a:extLst>
+              <a:ext uri="{FF2B5EF4-FFF2-40B4-BE49-F238E27FC236}">
+                <a16:creationId xmlns:a16="http://schemas.microsoft.com/office/drawing/2014/main" id="{A8B3730B-1F18-717C-8F97-9D1CE1E43B52}"/>
+              </a:ext>
+            </a:extLst>
+          </p:cNvPr>
+          <p:cNvSpPr txBox="1"/>
+          <p:nvPr/>
+        </p:nvSpPr>
+        <p:spPr>
+          <a:xfrm>
+            <a:off x="6100253" y="4663523"/>
+            <a:ext cx="1056700" cy="307777"/>
+          </a:xfrm>
+          <a:prstGeom prst="rect">
+            <a:avLst/>
+          </a:prstGeom>
+          <a:noFill/>
+        </p:spPr>
+        <p:txBody>
+          <a:bodyPr wrap="none" rtlCol="0">
+            <a:spAutoFit/>
+          </a:bodyPr>
+          <a:lstStyle/>
+          <a:p>
+            <a:r>
+              <a:rPr lang="en-US" sz="1400" dirty="0"/>
+              <a:t>Local Files</a:t>
+            </a:r>
+          </a:p>
+        </p:txBody>
+      </p:sp>
+      <p:cxnSp>
+        <p:nvCxnSpPr>
+          <p:cNvPr id="38" name="Straight Connector 37">
+            <a:extLst>
+              <a:ext uri="{FF2B5EF4-FFF2-40B4-BE49-F238E27FC236}">
+                <a16:creationId xmlns:a16="http://schemas.microsoft.com/office/drawing/2014/main" id="{EB4E4B06-E4C9-A215-8628-B074EDCEC4E6}"/>
+              </a:ext>
+            </a:extLst>
+          </p:cNvPr>
+          <p:cNvCxnSpPr/>
+          <p:nvPr/>
+        </p:nvCxnSpPr>
+        <p:spPr>
+          <a:xfrm flipV="1">
+            <a:off x="7215083" y="2025558"/>
+            <a:ext cx="105890" cy="3288"/>
+          </a:xfrm>
+          <a:prstGeom prst="line">
+            <a:avLst/>
+          </a:prstGeom>
+          <a:ln>
+            <a:solidFill>
+              <a:schemeClr val="tx1"/>
+            </a:solidFill>
+          </a:ln>
+        </p:spPr>
+        <p:style>
+          <a:lnRef idx="3">
+            <a:schemeClr val="accent5"/>
+          </a:lnRef>
+          <a:fillRef idx="0">
+            <a:schemeClr val="accent5"/>
+          </a:fillRef>
+          <a:effectRef idx="2">
+            <a:schemeClr val="accent5"/>
+          </a:effectRef>
+          <a:fontRef idx="minor">
+            <a:schemeClr val="tx1"/>
+          </a:fontRef>
+        </p:style>
+      </p:cxnSp>
+      <p:sp>
+        <p:nvSpPr>
+          <p:cNvPr id="39" name="Oval 38">
+            <a:extLst>
+              <a:ext uri="{FF2B5EF4-FFF2-40B4-BE49-F238E27FC236}">
+                <a16:creationId xmlns:a16="http://schemas.microsoft.com/office/drawing/2014/main" id="{E0BDCE9E-CC3A-54B1-9DEC-1B78C6883FCC}"/>
+              </a:ext>
+            </a:extLst>
+          </p:cNvPr>
+          <p:cNvSpPr/>
+          <p:nvPr/>
+        </p:nvSpPr>
+        <p:spPr>
+          <a:xfrm>
+            <a:off x="7315599" y="1954836"/>
+            <a:ext cx="140086" cy="140086"/>
+          </a:xfrm>
+          <a:prstGeom prst="ellipse">
+            <a:avLst/>
+          </a:prstGeom>
+          <a:solidFill>
+            <a:srgbClr val="00B0F0"/>
+          </a:solidFill>
+          <a:ln>
+            <a:solidFill>
+              <a:schemeClr val="tx1"/>
+            </a:solidFill>
+          </a:ln>
+        </p:spPr>
+        <p:style>
+          <a:lnRef idx="3">
+            <a:schemeClr val="lt1"/>
+          </a:lnRef>
+          <a:fillRef idx="1">
+            <a:schemeClr val="accent6"/>
+          </a:fillRef>
+          <a:effectRef idx="1">
+            <a:schemeClr val="accent6"/>
+          </a:effectRef>
+          <a:fontRef idx="minor">
+            <a:schemeClr val="lt1"/>
+          </a:fontRef>
+        </p:style>
+        <p:txBody>
+          <a:bodyPr rtlCol="0" anchor="ctr"/>
+          <a:lstStyle/>
+          <a:p>
+            <a:pPr algn="ctr"/>
+            <a:endParaRPr lang="en-US"/>
+          </a:p>
+        </p:txBody>
+      </p:sp>
+      <p:cxnSp>
+        <p:nvCxnSpPr>
+          <p:cNvPr id="40" name="Straight Connector 39">
+            <a:extLst>
+              <a:ext uri="{FF2B5EF4-FFF2-40B4-BE49-F238E27FC236}">
+                <a16:creationId xmlns:a16="http://schemas.microsoft.com/office/drawing/2014/main" id="{484B8BF8-BAA9-5ABD-178B-0DC6844108E1}"/>
+              </a:ext>
+            </a:extLst>
+          </p:cNvPr>
+          <p:cNvCxnSpPr/>
+          <p:nvPr/>
+        </p:nvCxnSpPr>
+        <p:spPr>
+          <a:xfrm flipV="1">
+            <a:off x="4495685" y="2035080"/>
+            <a:ext cx="105890" cy="3288"/>
+          </a:xfrm>
+          <a:prstGeom prst="line">
+            <a:avLst/>
+          </a:prstGeom>
+          <a:ln>
+            <a:solidFill>
+              <a:schemeClr val="tx1"/>
+            </a:solidFill>
+          </a:ln>
+        </p:spPr>
+        <p:style>
+          <a:lnRef idx="3">
+            <a:schemeClr val="accent5"/>
+          </a:lnRef>
+          <a:fillRef idx="0">
+            <a:schemeClr val="accent5"/>
+          </a:fillRef>
+          <a:effectRef idx="2">
+            <a:schemeClr val="accent5"/>
+          </a:effectRef>
+          <a:fontRef idx="minor">
+            <a:schemeClr val="tx1"/>
+          </a:fontRef>
+        </p:style>
+      </p:cxnSp>
+      <p:sp>
+        <p:nvSpPr>
+          <p:cNvPr id="41" name="Oval 40">
+            <a:extLst>
+              <a:ext uri="{FF2B5EF4-FFF2-40B4-BE49-F238E27FC236}">
+                <a16:creationId xmlns:a16="http://schemas.microsoft.com/office/drawing/2014/main" id="{D92B3D46-C7F4-E8F5-D0C0-402F96C46710}"/>
+              </a:ext>
+            </a:extLst>
+          </p:cNvPr>
+          <p:cNvSpPr/>
+          <p:nvPr/>
+        </p:nvSpPr>
+        <p:spPr>
+          <a:xfrm>
+            <a:off x="4596201" y="1964358"/>
+            <a:ext cx="140086" cy="140086"/>
+          </a:xfrm>
+          <a:prstGeom prst="ellipse">
+            <a:avLst/>
+          </a:prstGeom>
+          <a:solidFill>
+            <a:srgbClr val="00B0F0"/>
+          </a:solidFill>
+          <a:ln>
+            <a:solidFill>
+              <a:schemeClr val="tx1"/>
+            </a:solidFill>
+          </a:ln>
+        </p:spPr>
+        <p:style>
+          <a:lnRef idx="3">
+            <a:schemeClr val="lt1"/>
+          </a:lnRef>
+          <a:fillRef idx="1">
+            <a:schemeClr val="accent6"/>
+          </a:fillRef>
+          <a:effectRef idx="1">
+            <a:schemeClr val="accent6"/>
+          </a:effectRef>
+          <a:fontRef idx="minor">
+            <a:schemeClr val="lt1"/>
+          </a:fontRef>
+        </p:style>
+        <p:txBody>
+          <a:bodyPr rtlCol="0" anchor="ctr"/>
+          <a:lstStyle/>
+          <a:p>
+            <a:pPr algn="ctr"/>
+            <a:endParaRPr lang="en-US"/>
+          </a:p>
+        </p:txBody>
+      </p:sp>
+      <p:sp>
+        <p:nvSpPr>
+          <p:cNvPr id="42" name="Up Arrow 41">
+            <a:extLst>
+              <a:ext uri="{FF2B5EF4-FFF2-40B4-BE49-F238E27FC236}">
+                <a16:creationId xmlns:a16="http://schemas.microsoft.com/office/drawing/2014/main" id="{1174AF6A-080B-84C3-3A50-60432871CF1D}"/>
+              </a:ext>
+            </a:extLst>
+          </p:cNvPr>
+          <p:cNvSpPr/>
+          <p:nvPr/>
+        </p:nvSpPr>
+        <p:spPr>
+          <a:xfrm rot="2683904" flipV="1">
+            <a:off x="5151097" y="2085623"/>
+            <a:ext cx="1363560" cy="2762219"/>
+          </a:xfrm>
+          <a:prstGeom prst="upArrow">
+            <a:avLst/>
+          </a:prstGeom>
+        </p:spPr>
+        <p:style>
+          <a:lnRef idx="3">
+            <a:schemeClr val="lt1"/>
+          </a:lnRef>
+          <a:fillRef idx="1">
+            <a:schemeClr val="accent1"/>
+          </a:fillRef>
+          <a:effectRef idx="1">
+            <a:schemeClr val="accent1"/>
+          </a:effectRef>
+          <a:fontRef idx="minor">
+            <a:schemeClr val="lt1"/>
+          </a:fontRef>
+        </p:style>
+        <p:txBody>
+          <a:bodyPr vert="vert" rtlCol="0" anchor="ctr"/>
+          <a:lstStyle/>
+          <a:p>
+            <a:pPr algn="ctr"/>
+            <a:r>
+              <a:rPr lang="en-US" sz="3200" b="1" dirty="0">
+                <a:solidFill>
+                  <a:srgbClr val="FFFF00"/>
+                </a:solidFill>
+              </a:rPr>
+              <a:t>pull</a:t>
+            </a:r>
+          </a:p>
+        </p:txBody>
+      </p:sp>
+      <p:cxnSp>
+        <p:nvCxnSpPr>
+          <p:cNvPr id="43" name="Straight Connector 42">
+            <a:extLst>
+              <a:ext uri="{FF2B5EF4-FFF2-40B4-BE49-F238E27FC236}">
+                <a16:creationId xmlns:a16="http://schemas.microsoft.com/office/drawing/2014/main" id="{AD27593D-291B-ECF7-0F45-BD29A62F3495}"/>
+              </a:ext>
+            </a:extLst>
+          </p:cNvPr>
+          <p:cNvCxnSpPr/>
+          <p:nvPr/>
+        </p:nvCxnSpPr>
+        <p:spPr>
+          <a:xfrm flipV="1">
+            <a:off x="4490919" y="4730680"/>
+            <a:ext cx="105890" cy="3288"/>
+          </a:xfrm>
+          <a:prstGeom prst="line">
+            <a:avLst/>
+          </a:prstGeom>
+          <a:ln>
+            <a:solidFill>
+              <a:schemeClr val="tx1"/>
+            </a:solidFill>
+          </a:ln>
+        </p:spPr>
+        <p:style>
+          <a:lnRef idx="3">
+            <a:schemeClr val="accent5"/>
+          </a:lnRef>
+          <a:fillRef idx="0">
+            <a:schemeClr val="accent5"/>
+          </a:fillRef>
+          <a:effectRef idx="2">
+            <a:schemeClr val="accent5"/>
+          </a:effectRef>
+          <a:fontRef idx="minor">
+            <a:schemeClr val="tx1"/>
+          </a:fontRef>
+        </p:style>
+      </p:cxnSp>
+      <p:sp>
+        <p:nvSpPr>
+          <p:cNvPr id="44" name="Oval 43">
+            <a:extLst>
+              <a:ext uri="{FF2B5EF4-FFF2-40B4-BE49-F238E27FC236}">
+                <a16:creationId xmlns:a16="http://schemas.microsoft.com/office/drawing/2014/main" id="{419AFB03-4DF6-66B4-D637-6EE6D681A4B9}"/>
+              </a:ext>
+            </a:extLst>
+          </p:cNvPr>
+          <p:cNvSpPr/>
+          <p:nvPr/>
+        </p:nvSpPr>
+        <p:spPr>
+          <a:xfrm>
+            <a:off x="4591435" y="4674246"/>
+            <a:ext cx="140086" cy="140086"/>
+          </a:xfrm>
+          <a:prstGeom prst="ellipse">
+            <a:avLst/>
+          </a:prstGeom>
+          <a:solidFill>
+            <a:srgbClr val="00B0F0"/>
+          </a:solidFill>
+          <a:ln>
+            <a:solidFill>
+              <a:schemeClr val="tx1"/>
+            </a:solidFill>
+          </a:ln>
+        </p:spPr>
+        <p:style>
+          <a:lnRef idx="3">
+            <a:schemeClr val="lt1"/>
+          </a:lnRef>
+          <a:fillRef idx="1">
+            <a:schemeClr val="accent6"/>
+          </a:fillRef>
+          <a:effectRef idx="1">
+            <a:schemeClr val="accent6"/>
+          </a:effectRef>
+          <a:fontRef idx="minor">
+            <a:schemeClr val="lt1"/>
+          </a:fontRef>
+        </p:style>
+        <p:txBody>
+          <a:bodyPr rtlCol="0" anchor="ctr"/>
+          <a:lstStyle/>
+          <a:p>
+            <a:pPr algn="ctr"/>
+            <a:endParaRPr lang="en-US"/>
+          </a:p>
+        </p:txBody>
+      </p:sp>
+      <p:sp>
+        <p:nvSpPr>
+          <p:cNvPr id="45" name="Rounded Rectangle 44">
+            <a:extLst>
+              <a:ext uri="{FF2B5EF4-FFF2-40B4-BE49-F238E27FC236}">
+                <a16:creationId xmlns:a16="http://schemas.microsoft.com/office/drawing/2014/main" id="{932745D9-79FA-4AF9-2B52-191B6DF86930}"/>
+              </a:ext>
+            </a:extLst>
+          </p:cNvPr>
+          <p:cNvSpPr/>
+          <p:nvPr/>
+        </p:nvSpPr>
+        <p:spPr>
+          <a:xfrm>
+            <a:off x="3815527" y="2217208"/>
+            <a:ext cx="1253994" cy="239921"/>
+          </a:xfrm>
+          <a:prstGeom prst="roundRect">
+            <a:avLst/>
+          </a:prstGeom>
+        </p:spPr>
+        <p:style>
+          <a:lnRef idx="3">
+            <a:schemeClr val="lt1"/>
+          </a:lnRef>
+          <a:fillRef idx="1">
+            <a:schemeClr val="accent4"/>
+          </a:fillRef>
+          <a:effectRef idx="1">
+            <a:schemeClr val="accent4"/>
+          </a:effectRef>
+          <a:fontRef idx="minor">
+            <a:schemeClr val="lt1"/>
+          </a:fontRef>
+        </p:style>
+        <p:txBody>
+          <a:bodyPr rtlCol="0" anchor="ctr"/>
+          <a:lstStyle/>
+          <a:p>
+            <a:pPr algn="ctr"/>
+            <a:endParaRPr lang="en-US" sz="1200" dirty="0"/>
+          </a:p>
+        </p:txBody>
+      </p:sp>
+      <p:cxnSp>
+        <p:nvCxnSpPr>
+          <p:cNvPr id="46" name="Curved Connector 45">
+            <a:extLst>
+              <a:ext uri="{FF2B5EF4-FFF2-40B4-BE49-F238E27FC236}">
+                <a16:creationId xmlns:a16="http://schemas.microsoft.com/office/drawing/2014/main" id="{4F739E63-9015-D9BE-7BF1-C7E8594D1F1B}"/>
+              </a:ext>
+            </a:extLst>
+          </p:cNvPr>
+          <p:cNvCxnSpPr>
+            <a:cxnSpLocks/>
+          </p:cNvCxnSpPr>
+          <p:nvPr/>
+        </p:nvCxnSpPr>
+        <p:spPr>
+          <a:xfrm rot="16200000" flipH="1">
+            <a:off x="4378089" y="2130456"/>
+            <a:ext cx="238783" cy="151524"/>
+          </a:xfrm>
+          <a:prstGeom prst="curvedConnector2">
+            <a:avLst/>
+          </a:prstGeom>
+          <a:ln>
+            <a:solidFill>
+              <a:schemeClr val="tx1"/>
+            </a:solidFill>
+            <a:tailEnd type="triangle"/>
+          </a:ln>
+        </p:spPr>
+        <p:style>
+          <a:lnRef idx="2">
+            <a:schemeClr val="accent1"/>
+          </a:lnRef>
+          <a:fillRef idx="0">
+            <a:schemeClr val="accent1"/>
+          </a:fillRef>
+          <a:effectRef idx="1">
+            <a:schemeClr val="accent1"/>
+          </a:effectRef>
+          <a:fontRef idx="minor">
+            <a:schemeClr val="tx1"/>
+          </a:fontRef>
+        </p:style>
+      </p:cxnSp>
+      <p:sp>
+        <p:nvSpPr>
+          <p:cNvPr id="47" name="Oval 46">
+            <a:extLst>
+              <a:ext uri="{FF2B5EF4-FFF2-40B4-BE49-F238E27FC236}">
+                <a16:creationId xmlns:a16="http://schemas.microsoft.com/office/drawing/2014/main" id="{D4043D98-1853-C80A-EF94-1FD441ADE1DC}"/>
+              </a:ext>
+            </a:extLst>
+          </p:cNvPr>
+          <p:cNvSpPr/>
+          <p:nvPr/>
+        </p:nvSpPr>
+        <p:spPr>
+          <a:xfrm>
+            <a:off x="4577128" y="2259647"/>
+            <a:ext cx="140086" cy="140086"/>
+          </a:xfrm>
+          <a:prstGeom prst="ellipse">
+            <a:avLst/>
+          </a:prstGeom>
+          <a:solidFill>
+            <a:srgbClr val="00B0F0"/>
+          </a:solidFill>
+          <a:ln>
+            <a:solidFill>
+              <a:schemeClr val="tx1"/>
+            </a:solidFill>
+          </a:ln>
+        </p:spPr>
+        <p:style>
+          <a:lnRef idx="3">
+            <a:schemeClr val="lt1"/>
+          </a:lnRef>
+          <a:fillRef idx="1">
+            <a:schemeClr val="accent6"/>
+          </a:fillRef>
+          <a:effectRef idx="1">
+            <a:schemeClr val="accent6"/>
+          </a:effectRef>
+          <a:fontRef idx="minor">
+            <a:schemeClr val="lt1"/>
+          </a:fontRef>
+        </p:style>
+        <p:txBody>
+          <a:bodyPr rtlCol="0" anchor="ctr"/>
+          <a:lstStyle/>
+          <a:p>
+            <a:pPr algn="ctr"/>
+            <a:endParaRPr lang="en-US"/>
+          </a:p>
+        </p:txBody>
+      </p:sp>
+      <p:sp>
+        <p:nvSpPr>
+          <p:cNvPr id="48" name="Rounded Rectangle 47">
+            <a:extLst>
+              <a:ext uri="{FF2B5EF4-FFF2-40B4-BE49-F238E27FC236}">
+                <a16:creationId xmlns:a16="http://schemas.microsoft.com/office/drawing/2014/main" id="{E60AF3DA-6178-0C07-C7F0-AE05470AA3AA}"/>
+              </a:ext>
+            </a:extLst>
+          </p:cNvPr>
+          <p:cNvSpPr/>
+          <p:nvPr/>
+        </p:nvSpPr>
+        <p:spPr>
+          <a:xfrm>
+            <a:off x="3806005" y="4936620"/>
+            <a:ext cx="1253994" cy="239921"/>
+          </a:xfrm>
+          <a:prstGeom prst="roundRect">
+            <a:avLst/>
+          </a:prstGeom>
+        </p:spPr>
+        <p:style>
+          <a:lnRef idx="3">
+            <a:schemeClr val="lt1"/>
+          </a:lnRef>
+          <a:fillRef idx="1">
+            <a:schemeClr val="accent4"/>
+          </a:fillRef>
+          <a:effectRef idx="1">
+            <a:schemeClr val="accent4"/>
+          </a:effectRef>
+          <a:fontRef idx="minor">
+            <a:schemeClr val="lt1"/>
+          </a:fontRef>
+        </p:style>
+        <p:txBody>
+          <a:bodyPr rtlCol="0" anchor="ctr"/>
+          <a:lstStyle/>
+          <a:p>
+            <a:pPr algn="ctr"/>
+            <a:endParaRPr lang="en-US" sz="1200" dirty="0"/>
+          </a:p>
+        </p:txBody>
+      </p:sp>
+      <p:cxnSp>
+        <p:nvCxnSpPr>
+          <p:cNvPr id="49" name="Curved Connector 48">
+            <a:extLst>
+              <a:ext uri="{FF2B5EF4-FFF2-40B4-BE49-F238E27FC236}">
+                <a16:creationId xmlns:a16="http://schemas.microsoft.com/office/drawing/2014/main" id="{CB5AD055-E56B-3A35-84E4-985093CF962D}"/>
+              </a:ext>
+            </a:extLst>
+          </p:cNvPr>
+          <p:cNvCxnSpPr>
+            <a:cxnSpLocks/>
+          </p:cNvCxnSpPr>
+          <p:nvPr/>
+        </p:nvCxnSpPr>
+        <p:spPr>
+          <a:xfrm rot="16200000" flipH="1">
+            <a:off x="4368567" y="4849868"/>
+            <a:ext cx="238783" cy="151524"/>
+          </a:xfrm>
+          <a:prstGeom prst="curvedConnector2">
+            <a:avLst/>
+          </a:prstGeom>
+          <a:ln>
+            <a:solidFill>
+              <a:schemeClr val="tx1"/>
+            </a:solidFill>
+            <a:tailEnd type="triangle"/>
+          </a:ln>
+        </p:spPr>
+        <p:style>
+          <a:lnRef idx="2">
+            <a:schemeClr val="accent1"/>
+          </a:lnRef>
+          <a:fillRef idx="0">
+            <a:schemeClr val="accent1"/>
+          </a:fillRef>
+          <a:effectRef idx="1">
+            <a:schemeClr val="accent1"/>
+          </a:effectRef>
+          <a:fontRef idx="minor">
+            <a:schemeClr val="tx1"/>
+          </a:fontRef>
+        </p:style>
+      </p:cxnSp>
+      <p:sp>
+        <p:nvSpPr>
+          <p:cNvPr id="50" name="Oval 49">
+            <a:extLst>
+              <a:ext uri="{FF2B5EF4-FFF2-40B4-BE49-F238E27FC236}">
+                <a16:creationId xmlns:a16="http://schemas.microsoft.com/office/drawing/2014/main" id="{93808A74-11ED-7EA9-C3D4-614E5CEA94C5}"/>
+              </a:ext>
+            </a:extLst>
+          </p:cNvPr>
+          <p:cNvSpPr/>
+          <p:nvPr/>
+        </p:nvSpPr>
+        <p:spPr>
+          <a:xfrm>
+            <a:off x="4567606" y="4979059"/>
+            <a:ext cx="140086" cy="140086"/>
+          </a:xfrm>
+          <a:prstGeom prst="ellipse">
+            <a:avLst/>
+          </a:prstGeom>
+          <a:solidFill>
+            <a:srgbClr val="00B0F0"/>
+          </a:solidFill>
+          <a:ln>
+            <a:solidFill>
+              <a:schemeClr val="tx1"/>
+            </a:solidFill>
+          </a:ln>
+        </p:spPr>
+        <p:style>
+          <a:lnRef idx="3">
+            <a:schemeClr val="lt1"/>
+          </a:lnRef>
+          <a:fillRef idx="1">
+            <a:schemeClr val="accent6"/>
+          </a:fillRef>
+          <a:effectRef idx="1">
+            <a:schemeClr val="accent6"/>
+          </a:effectRef>
+          <a:fontRef idx="minor">
+            <a:schemeClr val="lt1"/>
+          </a:fontRef>
+        </p:style>
+        <p:txBody>
+          <a:bodyPr rtlCol="0" anchor="ctr"/>
+          <a:lstStyle/>
+          <a:p>
+            <a:pPr algn="ctr"/>
+            <a:endParaRPr lang="en-US"/>
+          </a:p>
+        </p:txBody>
+      </p:sp>
+      <p:sp>
+        <p:nvSpPr>
+          <p:cNvPr id="51" name="Rounded Rectangle 50">
+            <a:extLst>
+              <a:ext uri="{FF2B5EF4-FFF2-40B4-BE49-F238E27FC236}">
+                <a16:creationId xmlns:a16="http://schemas.microsoft.com/office/drawing/2014/main" id="{4AA1015D-C35D-F312-3DC6-7C985374337D}"/>
+              </a:ext>
+            </a:extLst>
+          </p:cNvPr>
+          <p:cNvSpPr/>
+          <p:nvPr/>
+        </p:nvSpPr>
+        <p:spPr>
+          <a:xfrm>
+            <a:off x="6822584" y="4487772"/>
+            <a:ext cx="1471845" cy="239921"/>
+          </a:xfrm>
+          <a:prstGeom prst="roundRect">
+            <a:avLst/>
+          </a:prstGeom>
+        </p:spPr>
+        <p:style>
+          <a:lnRef idx="3">
+            <a:schemeClr val="lt1"/>
+          </a:lnRef>
+          <a:fillRef idx="1">
+            <a:schemeClr val="accent4"/>
+          </a:fillRef>
+          <a:effectRef idx="1">
+            <a:schemeClr val="accent4"/>
+          </a:effectRef>
+          <a:fontRef idx="minor">
+            <a:schemeClr val="lt1"/>
+          </a:fontRef>
+        </p:style>
+        <p:txBody>
+          <a:bodyPr rtlCol="0" anchor="ctr"/>
+          <a:lstStyle/>
+          <a:p>
+            <a:pPr algn="ctr"/>
+            <a:r>
+              <a:rPr lang="en-US" sz="1200" dirty="0"/>
+              <a:t>feature branch</a:t>
+            </a:r>
+          </a:p>
+        </p:txBody>
+      </p:sp>
+      <p:cxnSp>
+        <p:nvCxnSpPr>
+          <p:cNvPr id="53" name="Curved Connector 52">
+            <a:extLst>
+              <a:ext uri="{FF2B5EF4-FFF2-40B4-BE49-F238E27FC236}">
+                <a16:creationId xmlns:a16="http://schemas.microsoft.com/office/drawing/2014/main" id="{7C0F50D3-8D5F-2F44-A3C3-14B8EFE1B6C1}"/>
+              </a:ext>
+            </a:extLst>
+          </p:cNvPr>
+          <p:cNvCxnSpPr>
+            <a:cxnSpLocks/>
+            <a:stCxn id="2" idx="4"/>
+          </p:cNvCxnSpPr>
+          <p:nvPr/>
+        </p:nvCxnSpPr>
+        <p:spPr>
+          <a:xfrm flipV="1">
+            <a:off x="5146239" y="2701363"/>
+            <a:ext cx="2093022" cy="2357489"/>
+          </a:xfrm>
+          <a:prstGeom prst="curvedConnector2">
+            <a:avLst/>
+          </a:prstGeom>
+          <a:ln w="63500">
+            <a:solidFill>
+              <a:schemeClr val="accent4"/>
+            </a:solidFill>
+            <a:prstDash val="sysDot"/>
+            <a:tailEnd type="triangle"/>
+          </a:ln>
+        </p:spPr>
+        <p:style>
+          <a:lnRef idx="2">
+            <a:schemeClr val="accent1"/>
+          </a:lnRef>
+          <a:fillRef idx="0">
+            <a:schemeClr val="accent1"/>
+          </a:fillRef>
+          <a:effectRef idx="1">
+            <a:schemeClr val="accent1"/>
+          </a:effectRef>
+          <a:fontRef idx="minor">
+            <a:schemeClr val="tx1"/>
+          </a:fontRef>
+        </p:style>
+      </p:cxnSp>
+      <p:sp>
+        <p:nvSpPr>
+          <p:cNvPr id="54" name="Oval 53">
+            <a:extLst>
+              <a:ext uri="{FF2B5EF4-FFF2-40B4-BE49-F238E27FC236}">
+                <a16:creationId xmlns:a16="http://schemas.microsoft.com/office/drawing/2014/main" id="{961F33BF-79F6-8B86-4E56-C073EE10A724}"/>
+              </a:ext>
+            </a:extLst>
+          </p:cNvPr>
+          <p:cNvSpPr/>
+          <p:nvPr/>
+        </p:nvSpPr>
+        <p:spPr>
+          <a:xfrm>
+            <a:off x="7472759" y="1954838"/>
+            <a:ext cx="140086" cy="140086"/>
+          </a:xfrm>
+          <a:prstGeom prst="ellipse">
+            <a:avLst/>
+          </a:prstGeom>
+          <a:solidFill>
+            <a:schemeClr val="accent6">
+              <a:lumMod val="40000"/>
+              <a:lumOff val="60000"/>
+            </a:schemeClr>
+          </a:solidFill>
+          <a:ln>
+            <a:solidFill>
+              <a:schemeClr val="tx1"/>
+            </a:solidFill>
+          </a:ln>
+        </p:spPr>
+        <p:style>
+          <a:lnRef idx="3">
+            <a:schemeClr val="lt1"/>
+          </a:lnRef>
+          <a:fillRef idx="1">
+            <a:schemeClr val="accent6"/>
+          </a:fillRef>
+          <a:effectRef idx="1">
+            <a:schemeClr val="accent6"/>
+          </a:effectRef>
+          <a:fontRef idx="minor">
+            <a:schemeClr val="lt1"/>
+          </a:fontRef>
+        </p:style>
+        <p:txBody>
+          <a:bodyPr rtlCol="0" anchor="ctr"/>
+          <a:lstStyle/>
+          <a:p>
+            <a:pPr algn="ctr"/>
+            <a:endParaRPr lang="en-US"/>
+          </a:p>
+        </p:txBody>
+      </p:sp>
+      <p:sp>
+        <p:nvSpPr>
+          <p:cNvPr id="55" name="Oval 54">
+            <a:extLst>
+              <a:ext uri="{FF2B5EF4-FFF2-40B4-BE49-F238E27FC236}">
+                <a16:creationId xmlns:a16="http://schemas.microsoft.com/office/drawing/2014/main" id="{B77ADBB6-C994-3F4A-A0CA-4CF9C47ECE1E}"/>
+              </a:ext>
+            </a:extLst>
+          </p:cNvPr>
+          <p:cNvSpPr/>
+          <p:nvPr/>
+        </p:nvSpPr>
+        <p:spPr>
+          <a:xfrm>
+            <a:off x="7639447" y="1950071"/>
+            <a:ext cx="140086" cy="140086"/>
+          </a:xfrm>
+          <a:prstGeom prst="ellipse">
+            <a:avLst/>
+          </a:prstGeom>
+          <a:solidFill>
+            <a:schemeClr val="accent5">
+              <a:lumMod val="60000"/>
+              <a:lumOff val="40000"/>
+            </a:schemeClr>
+          </a:solidFill>
+          <a:ln>
+            <a:solidFill>
+              <a:schemeClr val="tx1"/>
+            </a:solidFill>
+          </a:ln>
+        </p:spPr>
+        <p:style>
+          <a:lnRef idx="3">
+            <a:schemeClr val="lt1"/>
+          </a:lnRef>
+          <a:fillRef idx="1">
+            <a:schemeClr val="accent6"/>
+          </a:fillRef>
+          <a:effectRef idx="1">
+            <a:schemeClr val="accent6"/>
+          </a:effectRef>
+          <a:fontRef idx="minor">
+            <a:schemeClr val="lt1"/>
+          </a:fontRef>
+        </p:style>
+        <p:txBody>
+          <a:bodyPr rtlCol="0" anchor="ctr"/>
+          <a:lstStyle/>
+          <a:p>
+            <a:pPr algn="ctr"/>
+            <a:endParaRPr lang="en-US"/>
+          </a:p>
+        </p:txBody>
+      </p:sp>
+      <p:sp>
+        <p:nvSpPr>
+          <p:cNvPr id="56" name="Oval 55">
+            <a:extLst>
+              <a:ext uri="{FF2B5EF4-FFF2-40B4-BE49-F238E27FC236}">
+                <a16:creationId xmlns:a16="http://schemas.microsoft.com/office/drawing/2014/main" id="{3F7614D7-D0DA-1588-3795-783600B30733}"/>
+              </a:ext>
+            </a:extLst>
+          </p:cNvPr>
+          <p:cNvSpPr/>
+          <p:nvPr/>
+        </p:nvSpPr>
+        <p:spPr>
+          <a:xfrm>
+            <a:off x="4767644" y="4679003"/>
+            <a:ext cx="140086" cy="140086"/>
+          </a:xfrm>
+          <a:prstGeom prst="ellipse">
+            <a:avLst/>
+          </a:prstGeom>
+          <a:solidFill>
+            <a:schemeClr val="accent6">
+              <a:lumMod val="40000"/>
+              <a:lumOff val="60000"/>
+            </a:schemeClr>
+          </a:solidFill>
+          <a:ln>
+            <a:solidFill>
+              <a:schemeClr val="tx1"/>
+            </a:solidFill>
+          </a:ln>
+        </p:spPr>
+        <p:style>
+          <a:lnRef idx="3">
+            <a:schemeClr val="lt1"/>
+          </a:lnRef>
+          <a:fillRef idx="1">
+            <a:schemeClr val="accent6"/>
+          </a:fillRef>
+          <a:effectRef idx="1">
+            <a:schemeClr val="accent6"/>
+          </a:effectRef>
+          <a:fontRef idx="minor">
+            <a:schemeClr val="lt1"/>
+          </a:fontRef>
+        </p:style>
+        <p:txBody>
+          <a:bodyPr rtlCol="0" anchor="ctr"/>
+          <a:lstStyle/>
+          <a:p>
+            <a:pPr algn="ctr"/>
+            <a:endParaRPr lang="en-US"/>
+          </a:p>
+        </p:txBody>
+      </p:sp>
+      <p:sp>
+        <p:nvSpPr>
+          <p:cNvPr id="57" name="Oval 56">
+            <a:extLst>
+              <a:ext uri="{FF2B5EF4-FFF2-40B4-BE49-F238E27FC236}">
+                <a16:creationId xmlns:a16="http://schemas.microsoft.com/office/drawing/2014/main" id="{A3FB79E4-76C4-05EA-20AD-41DC48721BFB}"/>
+              </a:ext>
+            </a:extLst>
+          </p:cNvPr>
+          <p:cNvSpPr/>
+          <p:nvPr/>
+        </p:nvSpPr>
+        <p:spPr>
+          <a:xfrm>
+            <a:off x="4934332" y="4674236"/>
+            <a:ext cx="140086" cy="140086"/>
+          </a:xfrm>
+          <a:prstGeom prst="ellipse">
+            <a:avLst/>
+          </a:prstGeom>
+          <a:solidFill>
+            <a:schemeClr val="accent5">
+              <a:lumMod val="60000"/>
+              <a:lumOff val="40000"/>
+            </a:schemeClr>
+          </a:solidFill>
+          <a:ln>
+            <a:solidFill>
+              <a:schemeClr val="tx1"/>
+            </a:solidFill>
+          </a:ln>
+        </p:spPr>
+        <p:style>
+          <a:lnRef idx="3">
+            <a:schemeClr val="lt1"/>
+          </a:lnRef>
+          <a:fillRef idx="1">
+            <a:schemeClr val="accent6"/>
+          </a:fillRef>
+          <a:effectRef idx="1">
+            <a:schemeClr val="accent6"/>
+          </a:effectRef>
+          <a:fontRef idx="minor">
+            <a:schemeClr val="lt1"/>
+          </a:fontRef>
+        </p:style>
+        <p:txBody>
+          <a:bodyPr rtlCol="0" anchor="ctr"/>
+          <a:lstStyle/>
+          <a:p>
+            <a:pPr algn="ctr"/>
+            <a:endParaRPr lang="en-US"/>
+          </a:p>
+        </p:txBody>
+      </p:sp>
+      <p:sp>
+        <p:nvSpPr>
+          <p:cNvPr id="58" name="Oval 57">
+            <a:extLst>
+              <a:ext uri="{FF2B5EF4-FFF2-40B4-BE49-F238E27FC236}">
+                <a16:creationId xmlns:a16="http://schemas.microsoft.com/office/drawing/2014/main" id="{8A711A4D-FC20-6662-D84D-705BC85C4974}"/>
+              </a:ext>
+            </a:extLst>
+          </p:cNvPr>
+          <p:cNvSpPr/>
+          <p:nvPr/>
+        </p:nvSpPr>
+        <p:spPr>
+          <a:xfrm>
+            <a:off x="4767643" y="1964358"/>
+            <a:ext cx="140086" cy="140086"/>
+          </a:xfrm>
+          <a:prstGeom prst="ellipse">
+            <a:avLst/>
+          </a:prstGeom>
+          <a:solidFill>
+            <a:schemeClr val="accent6">
+              <a:lumMod val="40000"/>
+              <a:lumOff val="60000"/>
+            </a:schemeClr>
+          </a:solidFill>
+          <a:ln>
+            <a:solidFill>
+              <a:schemeClr val="tx1"/>
+            </a:solidFill>
+          </a:ln>
+        </p:spPr>
+        <p:style>
+          <a:lnRef idx="3">
+            <a:schemeClr val="lt1"/>
+          </a:lnRef>
+          <a:fillRef idx="1">
+            <a:schemeClr val="accent6"/>
+          </a:fillRef>
+          <a:effectRef idx="1">
+            <a:schemeClr val="accent6"/>
+          </a:effectRef>
+          <a:fontRef idx="minor">
+            <a:schemeClr val="lt1"/>
+          </a:fontRef>
+        </p:style>
+        <p:txBody>
+          <a:bodyPr rtlCol="0" anchor="ctr"/>
+          <a:lstStyle/>
+          <a:p>
+            <a:pPr algn="ctr"/>
+            <a:endParaRPr lang="en-US"/>
+          </a:p>
+        </p:txBody>
+      </p:sp>
+      <p:sp>
+        <p:nvSpPr>
+          <p:cNvPr id="59" name="Oval 58">
+            <a:extLst>
+              <a:ext uri="{FF2B5EF4-FFF2-40B4-BE49-F238E27FC236}">
+                <a16:creationId xmlns:a16="http://schemas.microsoft.com/office/drawing/2014/main" id="{318541E5-A33C-7F52-D7F7-E116DDE81EA7}"/>
+              </a:ext>
+            </a:extLst>
+          </p:cNvPr>
+          <p:cNvSpPr/>
+          <p:nvPr/>
+        </p:nvSpPr>
+        <p:spPr>
+          <a:xfrm>
+            <a:off x="4934331" y="1959591"/>
+            <a:ext cx="140086" cy="140086"/>
+          </a:xfrm>
+          <a:prstGeom prst="ellipse">
+            <a:avLst/>
+          </a:prstGeom>
+          <a:solidFill>
+            <a:schemeClr val="accent5">
+              <a:lumMod val="60000"/>
+              <a:lumOff val="40000"/>
+            </a:schemeClr>
+          </a:solidFill>
+          <a:ln>
+            <a:solidFill>
+              <a:schemeClr val="tx1"/>
+            </a:solidFill>
+          </a:ln>
+        </p:spPr>
+        <p:style>
+          <a:lnRef idx="3">
+            <a:schemeClr val="lt1"/>
+          </a:lnRef>
+          <a:fillRef idx="1">
+            <a:schemeClr val="accent6"/>
+          </a:fillRef>
+          <a:effectRef idx="1">
+            <a:schemeClr val="accent6"/>
+          </a:effectRef>
+          <a:fontRef idx="minor">
+            <a:schemeClr val="lt1"/>
+          </a:fontRef>
+        </p:style>
+        <p:txBody>
+          <a:bodyPr rtlCol="0" anchor="ctr"/>
+          <a:lstStyle/>
+          <a:p>
+            <a:pPr algn="ctr"/>
+            <a:endParaRPr lang="en-US"/>
+          </a:p>
+        </p:txBody>
+      </p:sp>
+      <p:sp>
+        <p:nvSpPr>
+          <p:cNvPr id="60" name="Right Arrow 59">
+            <a:extLst>
+              <a:ext uri="{FF2B5EF4-FFF2-40B4-BE49-F238E27FC236}">
+                <a16:creationId xmlns:a16="http://schemas.microsoft.com/office/drawing/2014/main" id="{706BE843-20E9-A0DD-FCDE-D4762CEA37EC}"/>
+              </a:ext>
+            </a:extLst>
+          </p:cNvPr>
+          <p:cNvSpPr/>
+          <p:nvPr/>
+        </p:nvSpPr>
+        <p:spPr>
+          <a:xfrm rot="1456893">
+            <a:off x="5073497" y="4727195"/>
+            <a:ext cx="1141566" cy="486914"/>
+          </a:xfrm>
+          <a:prstGeom prst="rightArrow">
+            <a:avLst/>
+          </a:prstGeom>
+        </p:spPr>
+        <p:style>
+          <a:lnRef idx="1">
+            <a:schemeClr val="accent1"/>
+          </a:lnRef>
+          <a:fillRef idx="3">
+            <a:schemeClr val="accent1"/>
+          </a:fillRef>
+          <a:effectRef idx="2">
+            <a:schemeClr val="accent1"/>
+          </a:effectRef>
+          <a:fontRef idx="minor">
+            <a:schemeClr val="lt1"/>
+          </a:fontRef>
+        </p:style>
+        <p:txBody>
+          <a:bodyPr rtlCol="0" anchor="ctr"/>
+          <a:lstStyle/>
+          <a:p>
+            <a:pPr algn="ctr"/>
+            <a:endParaRPr lang="en-US" sz="2000" b="1" dirty="0">
+              <a:solidFill>
+                <a:srgbClr val="FFFF00"/>
+              </a:solidFill>
+            </a:endParaRPr>
+          </a:p>
+        </p:txBody>
+      </p:sp>
+    </p:spTree>
+    <p:extLst>
+      <p:ext uri="{BB962C8B-B14F-4D97-AF65-F5344CB8AC3E}">
+        <p14:creationId xmlns:p14="http://schemas.microsoft.com/office/powerpoint/2010/main" val="1658481695"/>
+      </p:ext>
+    </p:extLst>
+  </p:cSld>
+  <p:clrMapOvr>
+    <a:masterClrMapping/>
+  </p:clrMapOvr>
+</p:sld>
+</file>
+
+<file path=ppt/slides/slide18.xml><?xml version="1.0" encoding="utf-8"?>
+<p:sld xmlns:a="http://schemas.openxmlformats.org/drawingml/2006/main" xmlns:r="http://schemas.openxmlformats.org/officeDocument/2006/relationships" xmlns:p="http://schemas.openxmlformats.org/presentationml/2006/main">
+  <p:cSld>
+    <p:spTree>
+      <p:nvGrpSpPr>
         <p:cNvPr id="1" name=""/>
         <p:cNvGrpSpPr/>
         <p:nvPr/>
@@ -19934,7 +22712,7 @@
 </p:sld>
 </file>
 
-<file path=ppt/slides/slide18.xml><?xml version="1.0" encoding="utf-8"?>
+<file path=ppt/slides/slide19.xml><?xml version="1.0" encoding="utf-8"?>
 <p:sld xmlns:a="http://schemas.openxmlformats.org/drawingml/2006/main" xmlns:r="http://schemas.openxmlformats.org/officeDocument/2006/relationships" xmlns:p="http://schemas.openxmlformats.org/presentationml/2006/main">
   <p:cSld>
     <p:spTree>
@@ -19992,7 +22770,1012 @@
 </p:sld>
 </file>
 
-<file path=ppt/slides/slide19.xml><?xml version="1.0" encoding="utf-8"?>
+<file path=ppt/slides/slide2.xml><?xml version="1.0" encoding="utf-8"?>
+<p:sld xmlns:a="http://schemas.openxmlformats.org/drawingml/2006/main" xmlns:r="http://schemas.openxmlformats.org/officeDocument/2006/relationships" xmlns:p="http://schemas.openxmlformats.org/presentationml/2006/main">
+  <p:cSld>
+    <p:spTree>
+      <p:nvGrpSpPr>
+        <p:cNvPr id="1" name=""/>
+        <p:cNvGrpSpPr/>
+        <p:nvPr/>
+      </p:nvGrpSpPr>
+      <p:grpSpPr>
+        <a:xfrm>
+          <a:off x="0" y="0"/>
+          <a:ext cx="0" cy="0"/>
+          <a:chOff x="0" y="0"/>
+          <a:chExt cx="0" cy="0"/>
+        </a:xfrm>
+      </p:grpSpPr>
+      <p:cxnSp>
+        <p:nvCxnSpPr>
+          <p:cNvPr id="2" name="Straight Connector 1">
+            <a:extLst>
+              <a:ext uri="{FF2B5EF4-FFF2-40B4-BE49-F238E27FC236}">
+                <a16:creationId xmlns:a16="http://schemas.microsoft.com/office/drawing/2014/main" id="{A542FD0C-BB34-EB15-DD80-19B02199C2EB}"/>
+              </a:ext>
+            </a:extLst>
+          </p:cNvPr>
+          <p:cNvCxnSpPr/>
+          <p:nvPr/>
+        </p:nvCxnSpPr>
+        <p:spPr>
+          <a:xfrm>
+            <a:off x="3021383" y="3752952"/>
+            <a:ext cx="5903596" cy="0"/>
+          </a:xfrm>
+          <a:prstGeom prst="line">
+            <a:avLst/>
+          </a:prstGeom>
+          <a:ln w="76200" cmpd="sng">
+            <a:solidFill>
+              <a:srgbClr val="76C5EF"/>
+            </a:solidFill>
+          </a:ln>
+        </p:spPr>
+        <p:style>
+          <a:lnRef idx="2">
+            <a:schemeClr val="accent1"/>
+          </a:lnRef>
+          <a:fillRef idx="0">
+            <a:schemeClr val="accent1"/>
+          </a:fillRef>
+          <a:effectRef idx="1">
+            <a:schemeClr val="accent1"/>
+          </a:effectRef>
+          <a:fontRef idx="minor">
+            <a:schemeClr val="tx1"/>
+          </a:fontRef>
+        </p:style>
+      </p:cxnSp>
+      <p:sp>
+        <p:nvSpPr>
+          <p:cNvPr id="3" name="Cloud 2">
+            <a:extLst>
+              <a:ext uri="{FF2B5EF4-FFF2-40B4-BE49-F238E27FC236}">
+                <a16:creationId xmlns:a16="http://schemas.microsoft.com/office/drawing/2014/main" id="{3B067AE2-1E7E-0602-ABC9-7B6F19D00559}"/>
+              </a:ext>
+            </a:extLst>
+          </p:cNvPr>
+          <p:cNvSpPr/>
+          <p:nvPr/>
+        </p:nvSpPr>
+        <p:spPr>
+          <a:xfrm>
+            <a:off x="3689784" y="756490"/>
+            <a:ext cx="4973053" cy="2672510"/>
+          </a:xfrm>
+          <a:prstGeom prst="cloud">
+            <a:avLst/>
+          </a:prstGeom>
+        </p:spPr>
+        <p:style>
+          <a:lnRef idx="1">
+            <a:schemeClr val="accent1"/>
+          </a:lnRef>
+          <a:fillRef idx="2">
+            <a:schemeClr val="accent1"/>
+          </a:fillRef>
+          <a:effectRef idx="1">
+            <a:schemeClr val="accent1"/>
+          </a:effectRef>
+          <a:fontRef idx="minor">
+            <a:schemeClr val="dk1"/>
+          </a:fontRef>
+        </p:style>
+        <p:txBody>
+          <a:bodyPr rtlCol="0" anchor="ctr"/>
+          <a:lstStyle/>
+          <a:p>
+            <a:pPr algn="ctr"/>
+            <a:endParaRPr lang="en-US" sz="4800" dirty="0"/>
+          </a:p>
+        </p:txBody>
+      </p:sp>
+      <p:sp>
+        <p:nvSpPr>
+          <p:cNvPr id="4" name="Can 3">
+            <a:extLst>
+              <a:ext uri="{FF2B5EF4-FFF2-40B4-BE49-F238E27FC236}">
+                <a16:creationId xmlns:a16="http://schemas.microsoft.com/office/drawing/2014/main" id="{A753D108-B2A3-16F1-891C-519AC95E00DC}"/>
+              </a:ext>
+            </a:extLst>
+          </p:cNvPr>
+          <p:cNvSpPr/>
+          <p:nvPr/>
+        </p:nvSpPr>
+        <p:spPr>
+          <a:xfrm>
+            <a:off x="6910454" y="1181836"/>
+            <a:ext cx="1426477" cy="1463980"/>
+          </a:xfrm>
+          <a:prstGeom prst="can">
+            <a:avLst/>
+          </a:prstGeom>
+        </p:spPr>
+        <p:style>
+          <a:lnRef idx="2">
+            <a:schemeClr val="accent1">
+              <a:shade val="50000"/>
+            </a:schemeClr>
+          </a:lnRef>
+          <a:fillRef idx="1">
+            <a:schemeClr val="accent1"/>
+          </a:fillRef>
+          <a:effectRef idx="0">
+            <a:schemeClr val="accent1"/>
+          </a:effectRef>
+          <a:fontRef idx="minor">
+            <a:schemeClr val="lt1"/>
+          </a:fontRef>
+        </p:style>
+        <p:txBody>
+          <a:bodyPr rtlCol="0" anchor="ctr"/>
+          <a:lstStyle/>
+          <a:p>
+            <a:pPr algn="ctr"/>
+            <a:endParaRPr lang="en-US" sz="2000" i="1" dirty="0"/>
+          </a:p>
+          <a:p>
+            <a:pPr algn="ctr"/>
+            <a:endParaRPr lang="en-US" sz="2000" i="1" dirty="0"/>
+          </a:p>
+        </p:txBody>
+      </p:sp>
+      <p:sp>
+        <p:nvSpPr>
+          <p:cNvPr id="5" name="TextBox 4">
+            <a:extLst>
+              <a:ext uri="{FF2B5EF4-FFF2-40B4-BE49-F238E27FC236}">
+                <a16:creationId xmlns:a16="http://schemas.microsoft.com/office/drawing/2014/main" id="{57AEA246-C48D-007F-5268-61811A10D441}"/>
+              </a:ext>
+            </a:extLst>
+          </p:cNvPr>
+          <p:cNvSpPr txBox="1"/>
+          <p:nvPr/>
+        </p:nvSpPr>
+        <p:spPr>
+          <a:xfrm>
+            <a:off x="2926716" y="3283821"/>
+            <a:ext cx="1013419" cy="369332"/>
+          </a:xfrm>
+          <a:prstGeom prst="rect">
+            <a:avLst/>
+          </a:prstGeom>
+          <a:noFill/>
+        </p:spPr>
+        <p:txBody>
+          <a:bodyPr wrap="none" rtlCol="0">
+            <a:spAutoFit/>
+          </a:bodyPr>
+          <a:lstStyle/>
+          <a:p>
+            <a:r>
+              <a:rPr lang="en-US" dirty="0"/>
+              <a:t>Remote</a:t>
+            </a:r>
+          </a:p>
+        </p:txBody>
+      </p:sp>
+      <p:sp>
+        <p:nvSpPr>
+          <p:cNvPr id="6" name="TextBox 5">
+            <a:extLst>
+              <a:ext uri="{FF2B5EF4-FFF2-40B4-BE49-F238E27FC236}">
+                <a16:creationId xmlns:a16="http://schemas.microsoft.com/office/drawing/2014/main" id="{90E89A52-F0AC-8544-8638-28FD81BEC04E}"/>
+              </a:ext>
+            </a:extLst>
+          </p:cNvPr>
+          <p:cNvSpPr txBox="1"/>
+          <p:nvPr/>
+        </p:nvSpPr>
+        <p:spPr>
+          <a:xfrm>
+            <a:off x="3069591" y="3825547"/>
+            <a:ext cx="748923" cy="369332"/>
+          </a:xfrm>
+          <a:prstGeom prst="rect">
+            <a:avLst/>
+          </a:prstGeom>
+          <a:noFill/>
+        </p:spPr>
+        <p:txBody>
+          <a:bodyPr wrap="none" rtlCol="0">
+            <a:spAutoFit/>
+          </a:bodyPr>
+          <a:lstStyle/>
+          <a:p>
+            <a:r>
+              <a:rPr lang="en-US" dirty="0"/>
+              <a:t>Local</a:t>
+            </a:r>
+          </a:p>
+        </p:txBody>
+      </p:sp>
+      <p:sp>
+        <p:nvSpPr>
+          <p:cNvPr id="7" name="TextBox 6">
+            <a:extLst>
+              <a:ext uri="{FF2B5EF4-FFF2-40B4-BE49-F238E27FC236}">
+                <a16:creationId xmlns:a16="http://schemas.microsoft.com/office/drawing/2014/main" id="{C688C1BB-E276-FCC5-4BC9-44642821AEEF}"/>
+              </a:ext>
+            </a:extLst>
+          </p:cNvPr>
+          <p:cNvSpPr txBox="1"/>
+          <p:nvPr/>
+        </p:nvSpPr>
+        <p:spPr>
+          <a:xfrm>
+            <a:off x="6636174" y="3290422"/>
+            <a:ext cx="2435667" cy="369332"/>
+          </a:xfrm>
+          <a:prstGeom prst="rect">
+            <a:avLst/>
+          </a:prstGeom>
+          <a:noFill/>
+        </p:spPr>
+        <p:txBody>
+          <a:bodyPr wrap="none" rtlCol="0">
+            <a:spAutoFit/>
+          </a:bodyPr>
+          <a:lstStyle/>
+          <a:p>
+            <a:r>
+              <a:rPr lang="en-US" dirty="0"/>
+              <a:t>On GitHub (Browser)</a:t>
+            </a:r>
+          </a:p>
+        </p:txBody>
+      </p:sp>
+      <p:sp>
+        <p:nvSpPr>
+          <p:cNvPr id="8" name="TextBox 7">
+            <a:extLst>
+              <a:ext uri="{FF2B5EF4-FFF2-40B4-BE49-F238E27FC236}">
+                <a16:creationId xmlns:a16="http://schemas.microsoft.com/office/drawing/2014/main" id="{5C77A1E1-BFA3-BDDB-2D25-B90EFE46FB50}"/>
+              </a:ext>
+            </a:extLst>
+          </p:cNvPr>
+          <p:cNvSpPr txBox="1"/>
+          <p:nvPr/>
+        </p:nvSpPr>
+        <p:spPr>
+          <a:xfrm>
+            <a:off x="6094359" y="3799041"/>
+            <a:ext cx="2985497" cy="369332"/>
+          </a:xfrm>
+          <a:prstGeom prst="rect">
+            <a:avLst/>
+          </a:prstGeom>
+          <a:noFill/>
+        </p:spPr>
+        <p:txBody>
+          <a:bodyPr wrap="none" rtlCol="0">
+            <a:spAutoFit/>
+          </a:bodyPr>
+          <a:lstStyle/>
+          <a:p>
+            <a:r>
+              <a:rPr lang="en-US" dirty="0"/>
+              <a:t>On Your Machine (git/CLI)</a:t>
+            </a:r>
+          </a:p>
+        </p:txBody>
+      </p:sp>
+      <p:sp>
+        <p:nvSpPr>
+          <p:cNvPr id="9" name="TextBox 8">
+            <a:extLst>
+              <a:ext uri="{FF2B5EF4-FFF2-40B4-BE49-F238E27FC236}">
+                <a16:creationId xmlns:a16="http://schemas.microsoft.com/office/drawing/2014/main" id="{5EFF8847-7D36-2E59-56D5-92C196EF8954}"/>
+              </a:ext>
+            </a:extLst>
+          </p:cNvPr>
+          <p:cNvSpPr txBox="1"/>
+          <p:nvPr/>
+        </p:nvSpPr>
+        <p:spPr>
+          <a:xfrm>
+            <a:off x="7015074" y="1460081"/>
+            <a:ext cx="1287532" cy="1200329"/>
+          </a:xfrm>
+          <a:prstGeom prst="rect">
+            <a:avLst/>
+          </a:prstGeom>
+          <a:noFill/>
+        </p:spPr>
+        <p:txBody>
+          <a:bodyPr wrap="none" rtlCol="0">
+            <a:spAutoFit/>
+          </a:bodyPr>
+          <a:lstStyle/>
+          <a:p>
+            <a:pPr algn="ctr"/>
+            <a:r>
+              <a:rPr lang="en-US" sz="2400" dirty="0">
+                <a:solidFill>
+                  <a:schemeClr val="bg1"/>
+                </a:solidFill>
+                <a:latin typeface="Segoe Print" panose="02000800000000000000" pitchFamily="2" charset="0"/>
+              </a:rPr>
+              <a:t>Main</a:t>
+            </a:r>
+          </a:p>
+          <a:p>
+            <a:pPr algn="ctr"/>
+            <a:r>
+              <a:rPr lang="en-US" sz="2400" dirty="0">
+                <a:solidFill>
+                  <a:schemeClr val="bg1"/>
+                </a:solidFill>
+                <a:latin typeface="Segoe Print" panose="02000800000000000000" pitchFamily="2" charset="0"/>
+              </a:rPr>
+              <a:t>Project</a:t>
+            </a:r>
+          </a:p>
+          <a:p>
+            <a:pPr algn="ctr"/>
+            <a:r>
+              <a:rPr lang="en-US" sz="2400" dirty="0">
+                <a:solidFill>
+                  <a:schemeClr val="bg1"/>
+                </a:solidFill>
+                <a:latin typeface="Segoe Print" panose="02000800000000000000" pitchFamily="2" charset="0"/>
+              </a:rPr>
+              <a:t>Repo</a:t>
+            </a:r>
+          </a:p>
+        </p:txBody>
+      </p:sp>
+      <p:sp>
+        <p:nvSpPr>
+          <p:cNvPr id="10" name="Can 9">
+            <a:extLst>
+              <a:ext uri="{FF2B5EF4-FFF2-40B4-BE49-F238E27FC236}">
+                <a16:creationId xmlns:a16="http://schemas.microsoft.com/office/drawing/2014/main" id="{2FBA5496-5C4E-9D4F-48A1-4F1A245AFDFE}"/>
+              </a:ext>
+            </a:extLst>
+          </p:cNvPr>
+          <p:cNvSpPr/>
+          <p:nvPr/>
+        </p:nvSpPr>
+        <p:spPr>
+          <a:xfrm>
+            <a:off x="4224612" y="1181836"/>
+            <a:ext cx="1426477" cy="1463980"/>
+          </a:xfrm>
+          <a:prstGeom prst="can">
+            <a:avLst/>
+          </a:prstGeom>
+        </p:spPr>
+        <p:style>
+          <a:lnRef idx="2">
+            <a:schemeClr val="accent1">
+              <a:shade val="50000"/>
+            </a:schemeClr>
+          </a:lnRef>
+          <a:fillRef idx="1">
+            <a:schemeClr val="accent1"/>
+          </a:fillRef>
+          <a:effectRef idx="0">
+            <a:schemeClr val="accent1"/>
+          </a:effectRef>
+          <a:fontRef idx="minor">
+            <a:schemeClr val="lt1"/>
+          </a:fontRef>
+        </p:style>
+        <p:txBody>
+          <a:bodyPr rtlCol="0" anchor="ctr"/>
+          <a:lstStyle/>
+          <a:p>
+            <a:pPr algn="ctr"/>
+            <a:endParaRPr lang="en-US" sz="2000" i="1" dirty="0"/>
+          </a:p>
+          <a:p>
+            <a:pPr algn="ctr"/>
+            <a:endParaRPr lang="en-US" sz="2000" i="1" dirty="0"/>
+          </a:p>
+        </p:txBody>
+      </p:sp>
+      <p:sp>
+        <p:nvSpPr>
+          <p:cNvPr id="11" name="Can 10">
+            <a:extLst>
+              <a:ext uri="{FF2B5EF4-FFF2-40B4-BE49-F238E27FC236}">
+                <a16:creationId xmlns:a16="http://schemas.microsoft.com/office/drawing/2014/main" id="{F3621BDC-2969-FD51-F83E-CAEF6AA0FBCE}"/>
+              </a:ext>
+            </a:extLst>
+          </p:cNvPr>
+          <p:cNvSpPr/>
+          <p:nvPr/>
+        </p:nvSpPr>
+        <p:spPr>
+          <a:xfrm>
+            <a:off x="4224612" y="4172625"/>
+            <a:ext cx="1426477" cy="1679170"/>
+          </a:xfrm>
+          <a:prstGeom prst="can">
+            <a:avLst/>
+          </a:prstGeom>
+          <a:solidFill>
+            <a:schemeClr val="accent1">
+              <a:alpha val="0"/>
+            </a:schemeClr>
+          </a:solidFill>
+          <a:ln>
+            <a:solidFill>
+              <a:schemeClr val="accent1">
+                <a:shade val="50000"/>
+                <a:alpha val="0"/>
+              </a:schemeClr>
+            </a:solidFill>
+          </a:ln>
+        </p:spPr>
+        <p:style>
+          <a:lnRef idx="2">
+            <a:schemeClr val="accent1">
+              <a:shade val="50000"/>
+            </a:schemeClr>
+          </a:lnRef>
+          <a:fillRef idx="1">
+            <a:schemeClr val="accent1"/>
+          </a:fillRef>
+          <a:effectRef idx="0">
+            <a:schemeClr val="accent1"/>
+          </a:effectRef>
+          <a:fontRef idx="minor">
+            <a:schemeClr val="lt1"/>
+          </a:fontRef>
+        </p:style>
+        <p:txBody>
+          <a:bodyPr rtlCol="0" anchor="ctr"/>
+          <a:lstStyle/>
+          <a:p>
+            <a:pPr algn="ctr"/>
+            <a:br>
+              <a:rPr lang="en-US" sz="2000" dirty="0"/>
+            </a:br>
+            <a:endParaRPr lang="en-US" sz="2000" dirty="0"/>
+          </a:p>
+        </p:txBody>
+      </p:sp>
+      <p:sp>
+        <p:nvSpPr>
+          <p:cNvPr id="12" name="TextBox 11">
+            <a:extLst>
+              <a:ext uri="{FF2B5EF4-FFF2-40B4-BE49-F238E27FC236}">
+                <a16:creationId xmlns:a16="http://schemas.microsoft.com/office/drawing/2014/main" id="{3D208841-E66A-FBF9-1039-24928DFF10EE}"/>
+              </a:ext>
+            </a:extLst>
+          </p:cNvPr>
+          <p:cNvSpPr txBox="1"/>
+          <p:nvPr/>
+        </p:nvSpPr>
+        <p:spPr>
+          <a:xfrm>
+            <a:off x="4246261" y="1479741"/>
+            <a:ext cx="1351652" cy="1200329"/>
+          </a:xfrm>
+          <a:prstGeom prst="rect">
+            <a:avLst/>
+          </a:prstGeom>
+          <a:noFill/>
+        </p:spPr>
+        <p:txBody>
+          <a:bodyPr wrap="none" rtlCol="0">
+            <a:spAutoFit/>
+          </a:bodyPr>
+          <a:lstStyle/>
+          <a:p>
+            <a:pPr algn="ctr"/>
+            <a:r>
+              <a:rPr lang="en-US" sz="2400" dirty="0">
+                <a:solidFill>
+                  <a:schemeClr val="bg1"/>
+                </a:solidFill>
+                <a:latin typeface="Segoe Print" panose="02000800000000000000" pitchFamily="2" charset="0"/>
+              </a:rPr>
+              <a:t>Your</a:t>
+            </a:r>
+          </a:p>
+          <a:p>
+            <a:pPr algn="ctr"/>
+            <a:r>
+              <a:rPr lang="en-US" sz="2400" dirty="0">
+                <a:solidFill>
+                  <a:schemeClr val="bg1"/>
+                </a:solidFill>
+                <a:latin typeface="Segoe Print" panose="02000800000000000000" pitchFamily="2" charset="0"/>
+              </a:rPr>
+              <a:t>Remote</a:t>
+            </a:r>
+          </a:p>
+          <a:p>
+            <a:pPr algn="ctr"/>
+            <a:r>
+              <a:rPr lang="en-US" sz="2400" dirty="0">
+                <a:solidFill>
+                  <a:schemeClr val="bg1"/>
+                </a:solidFill>
+                <a:latin typeface="Segoe Print" panose="02000800000000000000" pitchFamily="2" charset="0"/>
+              </a:rPr>
+              <a:t>Copy</a:t>
+            </a:r>
+          </a:p>
+        </p:txBody>
+      </p:sp>
+      <p:sp>
+        <p:nvSpPr>
+          <p:cNvPr id="13" name="Can 12">
+            <a:extLst>
+              <a:ext uri="{FF2B5EF4-FFF2-40B4-BE49-F238E27FC236}">
+                <a16:creationId xmlns:a16="http://schemas.microsoft.com/office/drawing/2014/main" id="{EDD855E2-1DA5-326B-C9CA-D179C5F26FC4}"/>
+              </a:ext>
+            </a:extLst>
+          </p:cNvPr>
+          <p:cNvSpPr/>
+          <p:nvPr/>
+        </p:nvSpPr>
+        <p:spPr>
+          <a:xfrm>
+            <a:off x="4224612" y="4172625"/>
+            <a:ext cx="1426477" cy="1679170"/>
+          </a:xfrm>
+          <a:prstGeom prst="can">
+            <a:avLst/>
+          </a:prstGeom>
+        </p:spPr>
+        <p:style>
+          <a:lnRef idx="2">
+            <a:schemeClr val="accent1">
+              <a:shade val="50000"/>
+            </a:schemeClr>
+          </a:lnRef>
+          <a:fillRef idx="1">
+            <a:schemeClr val="accent1"/>
+          </a:fillRef>
+          <a:effectRef idx="0">
+            <a:schemeClr val="accent1"/>
+          </a:effectRef>
+          <a:fontRef idx="minor">
+            <a:schemeClr val="lt1"/>
+          </a:fontRef>
+        </p:style>
+        <p:txBody>
+          <a:bodyPr rtlCol="0" anchor="ctr"/>
+          <a:lstStyle/>
+          <a:p>
+            <a:pPr algn="ctr"/>
+            <a:br>
+              <a:rPr lang="en-US" sz="2000" dirty="0"/>
+            </a:br>
+            <a:endParaRPr lang="en-US" sz="2000" dirty="0"/>
+          </a:p>
+        </p:txBody>
+      </p:sp>
+      <p:sp>
+        <p:nvSpPr>
+          <p:cNvPr id="14" name="Left Arrow 13">
+            <a:extLst>
+              <a:ext uri="{FF2B5EF4-FFF2-40B4-BE49-F238E27FC236}">
+                <a16:creationId xmlns:a16="http://schemas.microsoft.com/office/drawing/2014/main" id="{A7E3AA56-EA46-3656-53A3-916E6D8D741D}"/>
+              </a:ext>
+            </a:extLst>
+          </p:cNvPr>
+          <p:cNvSpPr/>
+          <p:nvPr/>
+        </p:nvSpPr>
+        <p:spPr>
+          <a:xfrm rot="16200000">
+            <a:off x="3658905" y="2983694"/>
+            <a:ext cx="1731819" cy="1019070"/>
+          </a:xfrm>
+          <a:prstGeom prst="leftArrow">
+            <a:avLst/>
+          </a:prstGeom>
+          <a:ln>
+            <a:solidFill>
+              <a:schemeClr val="bg1">
+                <a:lumMod val="95000"/>
+              </a:schemeClr>
+            </a:solidFill>
+          </a:ln>
+        </p:spPr>
+        <p:style>
+          <a:lnRef idx="2">
+            <a:schemeClr val="accent1">
+              <a:shade val="50000"/>
+            </a:schemeClr>
+          </a:lnRef>
+          <a:fillRef idx="1">
+            <a:schemeClr val="accent1"/>
+          </a:fillRef>
+          <a:effectRef idx="0">
+            <a:schemeClr val="accent1"/>
+          </a:effectRef>
+          <a:fontRef idx="minor">
+            <a:schemeClr val="lt1"/>
+          </a:fontRef>
+        </p:style>
+        <p:txBody>
+          <a:bodyPr rtlCol="0" anchor="ctr"/>
+          <a:lstStyle/>
+          <a:p>
+            <a:pPr algn="ctr"/>
+            <a:r>
+              <a:rPr lang="en-US" sz="3200" b="1" dirty="0"/>
+              <a:t> </a:t>
+            </a:r>
+            <a:r>
+              <a:rPr lang="en-US" sz="3200" b="1" dirty="0">
+                <a:solidFill>
+                  <a:srgbClr val="FFFF00"/>
+                </a:solidFill>
+              </a:rPr>
+              <a:t>clone</a:t>
+            </a:r>
+          </a:p>
+        </p:txBody>
+      </p:sp>
+      <p:sp>
+        <p:nvSpPr>
+          <p:cNvPr id="15" name="TextBox 14">
+            <a:extLst>
+              <a:ext uri="{FF2B5EF4-FFF2-40B4-BE49-F238E27FC236}">
+                <a16:creationId xmlns:a16="http://schemas.microsoft.com/office/drawing/2014/main" id="{AD0F72B6-D682-A715-9F22-B78F06EB6FB3}"/>
+              </a:ext>
+            </a:extLst>
+          </p:cNvPr>
+          <p:cNvSpPr txBox="1"/>
+          <p:nvPr/>
+        </p:nvSpPr>
+        <p:spPr>
+          <a:xfrm>
+            <a:off x="4133976" y="4626175"/>
+            <a:ext cx="1584087" cy="1015663"/>
+          </a:xfrm>
+          <a:prstGeom prst="rect">
+            <a:avLst/>
+          </a:prstGeom>
+          <a:noFill/>
+        </p:spPr>
+        <p:txBody>
+          <a:bodyPr wrap="none" rtlCol="0">
+            <a:spAutoFit/>
+          </a:bodyPr>
+          <a:lstStyle/>
+          <a:p>
+            <a:pPr algn="ctr"/>
+            <a:r>
+              <a:rPr lang="en-US" sz="2000" dirty="0">
+                <a:solidFill>
+                  <a:schemeClr val="bg1"/>
+                </a:solidFill>
+                <a:latin typeface="Segoe Print" panose="02000800000000000000" pitchFamily="2" charset="0"/>
+              </a:rPr>
+              <a:t>Local Copy</a:t>
+            </a:r>
+          </a:p>
+          <a:p>
+            <a:pPr algn="ctr"/>
+            <a:r>
+              <a:rPr lang="en-US" sz="2000" dirty="0">
+                <a:solidFill>
+                  <a:schemeClr val="bg1"/>
+                </a:solidFill>
+                <a:latin typeface="Segoe Print" panose="02000800000000000000" pitchFamily="2" charset="0"/>
+              </a:rPr>
+              <a:t>Of Your</a:t>
+            </a:r>
+          </a:p>
+          <a:p>
+            <a:pPr algn="ctr"/>
+            <a:r>
+              <a:rPr lang="en-US" sz="2000" dirty="0">
+                <a:solidFill>
+                  <a:schemeClr val="bg1"/>
+                </a:solidFill>
+                <a:latin typeface="Segoe Print" panose="02000800000000000000" pitchFamily="2" charset="0"/>
+              </a:rPr>
+              <a:t>Copy</a:t>
+            </a:r>
+          </a:p>
+        </p:txBody>
+      </p:sp>
+      <p:cxnSp>
+        <p:nvCxnSpPr>
+          <p:cNvPr id="16" name="Curved Connector 15">
+            <a:extLst>
+              <a:ext uri="{FF2B5EF4-FFF2-40B4-BE49-F238E27FC236}">
+                <a16:creationId xmlns:a16="http://schemas.microsoft.com/office/drawing/2014/main" id="{B0E2347A-39E6-6062-318C-450814F1C44A}"/>
+              </a:ext>
+            </a:extLst>
+          </p:cNvPr>
+          <p:cNvCxnSpPr>
+            <a:cxnSpLocks/>
+          </p:cNvCxnSpPr>
+          <p:nvPr/>
+        </p:nvCxnSpPr>
+        <p:spPr>
+          <a:xfrm rot="5400000" flipH="1" flipV="1">
+            <a:off x="6281981" y="102883"/>
+            <a:ext cx="19660" cy="2734056"/>
+          </a:xfrm>
+          <a:prstGeom prst="curvedConnector3">
+            <a:avLst>
+              <a:gd name="adj1" fmla="val 1838622"/>
+            </a:avLst>
+          </a:prstGeom>
+          <a:ln w="63500">
+            <a:solidFill>
+              <a:schemeClr val="accent4"/>
+            </a:solidFill>
+            <a:prstDash val="sysDot"/>
+            <a:tailEnd type="triangle"/>
+          </a:ln>
+        </p:spPr>
+        <p:style>
+          <a:lnRef idx="2">
+            <a:schemeClr val="accent1"/>
+          </a:lnRef>
+          <a:fillRef idx="0">
+            <a:schemeClr val="accent1"/>
+          </a:fillRef>
+          <a:effectRef idx="1">
+            <a:schemeClr val="accent1"/>
+          </a:effectRef>
+          <a:fontRef idx="minor">
+            <a:schemeClr val="tx1"/>
+          </a:fontRef>
+        </p:style>
+      </p:cxnSp>
+      <p:cxnSp>
+        <p:nvCxnSpPr>
+          <p:cNvPr id="17" name="Curved Connector 16">
+            <a:extLst>
+              <a:ext uri="{FF2B5EF4-FFF2-40B4-BE49-F238E27FC236}">
+                <a16:creationId xmlns:a16="http://schemas.microsoft.com/office/drawing/2014/main" id="{D788DFE4-28FC-3737-390C-D84BB5D29FA3}"/>
+              </a:ext>
+            </a:extLst>
+          </p:cNvPr>
+          <p:cNvCxnSpPr>
+            <a:cxnSpLocks/>
+            <a:stCxn id="13" idx="2"/>
+            <a:endCxn id="12" idx="1"/>
+          </p:cNvCxnSpPr>
+          <p:nvPr/>
+        </p:nvCxnSpPr>
+        <p:spPr>
+          <a:xfrm rot="10800000" flipH="1">
+            <a:off x="4224611" y="2079906"/>
+            <a:ext cx="21649" cy="2932304"/>
+          </a:xfrm>
+          <a:prstGeom prst="curvedConnector3">
+            <a:avLst>
+              <a:gd name="adj1" fmla="val -1055938"/>
+            </a:avLst>
+          </a:prstGeom>
+          <a:ln w="63500">
+            <a:solidFill>
+              <a:schemeClr val="accent4"/>
+            </a:solidFill>
+            <a:prstDash val="sysDot"/>
+            <a:tailEnd type="triangle"/>
+          </a:ln>
+        </p:spPr>
+        <p:style>
+          <a:lnRef idx="2">
+            <a:schemeClr val="accent1"/>
+          </a:lnRef>
+          <a:fillRef idx="0">
+            <a:schemeClr val="accent1"/>
+          </a:fillRef>
+          <a:effectRef idx="1">
+            <a:schemeClr val="accent1"/>
+          </a:effectRef>
+          <a:fontRef idx="minor">
+            <a:schemeClr val="tx1"/>
+          </a:fontRef>
+        </p:style>
+      </p:cxnSp>
+      <p:sp>
+        <p:nvSpPr>
+          <p:cNvPr id="18" name="Left Arrow 17">
+            <a:extLst>
+              <a:ext uri="{FF2B5EF4-FFF2-40B4-BE49-F238E27FC236}">
+                <a16:creationId xmlns:a16="http://schemas.microsoft.com/office/drawing/2014/main" id="{1B6A2998-1957-2A13-A501-FCE312F3308B}"/>
+              </a:ext>
+            </a:extLst>
+          </p:cNvPr>
+          <p:cNvSpPr/>
+          <p:nvPr/>
+        </p:nvSpPr>
+        <p:spPr>
+          <a:xfrm>
+            <a:off x="5523725" y="1172099"/>
+            <a:ext cx="1386729" cy="732701"/>
+          </a:xfrm>
+          <a:prstGeom prst="leftArrow">
+            <a:avLst/>
+          </a:prstGeom>
+          <a:ln>
+            <a:solidFill>
+              <a:schemeClr val="bg1">
+                <a:lumMod val="95000"/>
+              </a:schemeClr>
+            </a:solidFill>
+          </a:ln>
+        </p:spPr>
+        <p:style>
+          <a:lnRef idx="2">
+            <a:schemeClr val="accent1">
+              <a:shade val="50000"/>
+            </a:schemeClr>
+          </a:lnRef>
+          <a:fillRef idx="1">
+            <a:schemeClr val="accent1"/>
+          </a:fillRef>
+          <a:effectRef idx="0">
+            <a:schemeClr val="accent1"/>
+          </a:effectRef>
+          <a:fontRef idx="minor">
+            <a:schemeClr val="lt1"/>
+          </a:fontRef>
+        </p:style>
+        <p:txBody>
+          <a:bodyPr rtlCol="0" anchor="ctr"/>
+          <a:lstStyle/>
+          <a:p>
+            <a:pPr algn="ctr"/>
+            <a:r>
+              <a:rPr lang="en-US" sz="3200" b="1" dirty="0">
+                <a:solidFill>
+                  <a:srgbClr val="FFFF00"/>
+                </a:solidFill>
+              </a:rPr>
+              <a:t>fork</a:t>
+            </a:r>
+            <a:endParaRPr lang="en-US" sz="2000" b="1" dirty="0">
+              <a:solidFill>
+                <a:srgbClr val="FFFF00"/>
+              </a:solidFill>
+            </a:endParaRPr>
+          </a:p>
+        </p:txBody>
+      </p:sp>
+      <p:sp>
+        <p:nvSpPr>
+          <p:cNvPr id="19" name="Up Arrow 18">
+            <a:extLst>
+              <a:ext uri="{FF2B5EF4-FFF2-40B4-BE49-F238E27FC236}">
+                <a16:creationId xmlns:a16="http://schemas.microsoft.com/office/drawing/2014/main" id="{53222C8D-21E9-BE14-6361-F83DCE90F964}"/>
+              </a:ext>
+            </a:extLst>
+          </p:cNvPr>
+          <p:cNvSpPr/>
+          <p:nvPr/>
+        </p:nvSpPr>
+        <p:spPr>
+          <a:xfrm>
+            <a:off x="4878922" y="2597699"/>
+            <a:ext cx="1016592" cy="1689752"/>
+          </a:xfrm>
+          <a:prstGeom prst="upArrow">
+            <a:avLst>
+              <a:gd name="adj1" fmla="val 50000"/>
+              <a:gd name="adj2" fmla="val 51082"/>
+            </a:avLst>
+          </a:prstGeom>
+          <a:ln>
+            <a:solidFill>
+              <a:schemeClr val="bg1">
+                <a:lumMod val="95000"/>
+              </a:schemeClr>
+            </a:solidFill>
+          </a:ln>
+        </p:spPr>
+        <p:style>
+          <a:lnRef idx="3">
+            <a:schemeClr val="lt1"/>
+          </a:lnRef>
+          <a:fillRef idx="1">
+            <a:schemeClr val="accent1"/>
+          </a:fillRef>
+          <a:effectRef idx="1">
+            <a:schemeClr val="accent1"/>
+          </a:effectRef>
+          <a:fontRef idx="minor">
+            <a:schemeClr val="lt1"/>
+          </a:fontRef>
+        </p:style>
+        <p:txBody>
+          <a:bodyPr vert="vert270" rtlCol="0" anchor="ctr"/>
+          <a:lstStyle/>
+          <a:p>
+            <a:pPr algn="ctr"/>
+            <a:r>
+              <a:rPr lang="en-US" sz="3200" b="1" dirty="0">
+                <a:solidFill>
+                  <a:srgbClr val="FFFF00"/>
+                </a:solidFill>
+              </a:rPr>
+              <a:t>push</a:t>
+            </a:r>
+          </a:p>
+        </p:txBody>
+      </p:sp>
+      <p:sp>
+        <p:nvSpPr>
+          <p:cNvPr id="20" name="Right Arrow 19">
+            <a:extLst>
+              <a:ext uri="{FF2B5EF4-FFF2-40B4-BE49-F238E27FC236}">
+                <a16:creationId xmlns:a16="http://schemas.microsoft.com/office/drawing/2014/main" id="{A50E1B59-B374-EF56-BD56-EBF348DBEAE8}"/>
+              </a:ext>
+            </a:extLst>
+          </p:cNvPr>
+          <p:cNvSpPr/>
+          <p:nvPr/>
+        </p:nvSpPr>
+        <p:spPr>
+          <a:xfrm>
+            <a:off x="5651089" y="1849948"/>
+            <a:ext cx="1394208" cy="1135980"/>
+          </a:xfrm>
+          <a:prstGeom prst="rightArrow">
+            <a:avLst/>
+          </a:prstGeom>
+          <a:ln>
+            <a:solidFill>
+              <a:schemeClr val="bg1">
+                <a:lumMod val="95000"/>
+              </a:schemeClr>
+            </a:solidFill>
+          </a:ln>
+        </p:spPr>
+        <p:style>
+          <a:lnRef idx="3">
+            <a:schemeClr val="lt1"/>
+          </a:lnRef>
+          <a:fillRef idx="1">
+            <a:schemeClr val="accent1"/>
+          </a:fillRef>
+          <a:effectRef idx="1">
+            <a:schemeClr val="accent1"/>
+          </a:effectRef>
+          <a:fontRef idx="minor">
+            <a:schemeClr val="lt1"/>
+          </a:fontRef>
+        </p:style>
+        <p:txBody>
+          <a:bodyPr rtlCol="0" anchor="ctr"/>
+          <a:lstStyle/>
+          <a:p>
+            <a:pPr algn="ctr"/>
+            <a:r>
+              <a:rPr lang="en-US" sz="1600" b="1" dirty="0">
+                <a:solidFill>
+                  <a:srgbClr val="FFFF00"/>
+                </a:solidFill>
+              </a:rPr>
+              <a:t>Pull Request</a:t>
+            </a:r>
+          </a:p>
+        </p:txBody>
+      </p:sp>
+    </p:spTree>
+    <p:extLst>
+      <p:ext uri="{BB962C8B-B14F-4D97-AF65-F5344CB8AC3E}">
+        <p14:creationId xmlns:p14="http://schemas.microsoft.com/office/powerpoint/2010/main" val="529549300"/>
+      </p:ext>
+    </p:extLst>
+  </p:cSld>
+  <p:clrMapOvr>
+    <a:masterClrMapping/>
+  </p:clrMapOvr>
+</p:sld>
+</file>
+
+<file path=ppt/slides/slide20.xml><?xml version="1.0" encoding="utf-8"?>
 <p:sld xmlns:a="http://schemas.openxmlformats.org/drawingml/2006/main" xmlns:r="http://schemas.openxmlformats.org/officeDocument/2006/relationships" xmlns:p="http://schemas.openxmlformats.org/presentationml/2006/main">
   <p:cSld>
     <p:spTree>
@@ -23807,1012 +27590,7 @@
 </p:sld>
 </file>
 
-<file path=ppt/slides/slide2.xml><?xml version="1.0" encoding="utf-8"?>
-<p:sld xmlns:a="http://schemas.openxmlformats.org/drawingml/2006/main" xmlns:r="http://schemas.openxmlformats.org/officeDocument/2006/relationships" xmlns:p="http://schemas.openxmlformats.org/presentationml/2006/main">
-  <p:cSld>
-    <p:spTree>
-      <p:nvGrpSpPr>
-        <p:cNvPr id="1" name=""/>
-        <p:cNvGrpSpPr/>
-        <p:nvPr/>
-      </p:nvGrpSpPr>
-      <p:grpSpPr>
-        <a:xfrm>
-          <a:off x="0" y="0"/>
-          <a:ext cx="0" cy="0"/>
-          <a:chOff x="0" y="0"/>
-          <a:chExt cx="0" cy="0"/>
-        </a:xfrm>
-      </p:grpSpPr>
-      <p:cxnSp>
-        <p:nvCxnSpPr>
-          <p:cNvPr id="2" name="Straight Connector 1">
-            <a:extLst>
-              <a:ext uri="{FF2B5EF4-FFF2-40B4-BE49-F238E27FC236}">
-                <a16:creationId xmlns:a16="http://schemas.microsoft.com/office/drawing/2014/main" id="{A542FD0C-BB34-EB15-DD80-19B02199C2EB}"/>
-              </a:ext>
-            </a:extLst>
-          </p:cNvPr>
-          <p:cNvCxnSpPr/>
-          <p:nvPr/>
-        </p:nvCxnSpPr>
-        <p:spPr>
-          <a:xfrm>
-            <a:off x="3021383" y="3752952"/>
-            <a:ext cx="5903596" cy="0"/>
-          </a:xfrm>
-          <a:prstGeom prst="line">
-            <a:avLst/>
-          </a:prstGeom>
-          <a:ln w="76200" cmpd="sng">
-            <a:solidFill>
-              <a:srgbClr val="76C5EF"/>
-            </a:solidFill>
-          </a:ln>
-        </p:spPr>
-        <p:style>
-          <a:lnRef idx="2">
-            <a:schemeClr val="accent1"/>
-          </a:lnRef>
-          <a:fillRef idx="0">
-            <a:schemeClr val="accent1"/>
-          </a:fillRef>
-          <a:effectRef idx="1">
-            <a:schemeClr val="accent1"/>
-          </a:effectRef>
-          <a:fontRef idx="minor">
-            <a:schemeClr val="tx1"/>
-          </a:fontRef>
-        </p:style>
-      </p:cxnSp>
-      <p:sp>
-        <p:nvSpPr>
-          <p:cNvPr id="3" name="Cloud 2">
-            <a:extLst>
-              <a:ext uri="{FF2B5EF4-FFF2-40B4-BE49-F238E27FC236}">
-                <a16:creationId xmlns:a16="http://schemas.microsoft.com/office/drawing/2014/main" id="{3B067AE2-1E7E-0602-ABC9-7B6F19D00559}"/>
-              </a:ext>
-            </a:extLst>
-          </p:cNvPr>
-          <p:cNvSpPr/>
-          <p:nvPr/>
-        </p:nvSpPr>
-        <p:spPr>
-          <a:xfrm>
-            <a:off x="3689784" y="756490"/>
-            <a:ext cx="4973053" cy="2672510"/>
-          </a:xfrm>
-          <a:prstGeom prst="cloud">
-            <a:avLst/>
-          </a:prstGeom>
-        </p:spPr>
-        <p:style>
-          <a:lnRef idx="1">
-            <a:schemeClr val="accent1"/>
-          </a:lnRef>
-          <a:fillRef idx="2">
-            <a:schemeClr val="accent1"/>
-          </a:fillRef>
-          <a:effectRef idx="1">
-            <a:schemeClr val="accent1"/>
-          </a:effectRef>
-          <a:fontRef idx="minor">
-            <a:schemeClr val="dk1"/>
-          </a:fontRef>
-        </p:style>
-        <p:txBody>
-          <a:bodyPr rtlCol="0" anchor="ctr"/>
-          <a:lstStyle/>
-          <a:p>
-            <a:pPr algn="ctr"/>
-            <a:endParaRPr lang="en-US" sz="4800" dirty="0"/>
-          </a:p>
-        </p:txBody>
-      </p:sp>
-      <p:sp>
-        <p:nvSpPr>
-          <p:cNvPr id="4" name="Can 3">
-            <a:extLst>
-              <a:ext uri="{FF2B5EF4-FFF2-40B4-BE49-F238E27FC236}">
-                <a16:creationId xmlns:a16="http://schemas.microsoft.com/office/drawing/2014/main" id="{A753D108-B2A3-16F1-891C-519AC95E00DC}"/>
-              </a:ext>
-            </a:extLst>
-          </p:cNvPr>
-          <p:cNvSpPr/>
-          <p:nvPr/>
-        </p:nvSpPr>
-        <p:spPr>
-          <a:xfrm>
-            <a:off x="6910454" y="1181836"/>
-            <a:ext cx="1426477" cy="1463980"/>
-          </a:xfrm>
-          <a:prstGeom prst="can">
-            <a:avLst/>
-          </a:prstGeom>
-        </p:spPr>
-        <p:style>
-          <a:lnRef idx="2">
-            <a:schemeClr val="accent1">
-              <a:shade val="50000"/>
-            </a:schemeClr>
-          </a:lnRef>
-          <a:fillRef idx="1">
-            <a:schemeClr val="accent1"/>
-          </a:fillRef>
-          <a:effectRef idx="0">
-            <a:schemeClr val="accent1"/>
-          </a:effectRef>
-          <a:fontRef idx="minor">
-            <a:schemeClr val="lt1"/>
-          </a:fontRef>
-        </p:style>
-        <p:txBody>
-          <a:bodyPr rtlCol="0" anchor="ctr"/>
-          <a:lstStyle/>
-          <a:p>
-            <a:pPr algn="ctr"/>
-            <a:endParaRPr lang="en-US" sz="2000" i="1" dirty="0"/>
-          </a:p>
-          <a:p>
-            <a:pPr algn="ctr"/>
-            <a:endParaRPr lang="en-US" sz="2000" i="1" dirty="0"/>
-          </a:p>
-        </p:txBody>
-      </p:sp>
-      <p:sp>
-        <p:nvSpPr>
-          <p:cNvPr id="5" name="TextBox 4">
-            <a:extLst>
-              <a:ext uri="{FF2B5EF4-FFF2-40B4-BE49-F238E27FC236}">
-                <a16:creationId xmlns:a16="http://schemas.microsoft.com/office/drawing/2014/main" id="{57AEA246-C48D-007F-5268-61811A10D441}"/>
-              </a:ext>
-            </a:extLst>
-          </p:cNvPr>
-          <p:cNvSpPr txBox="1"/>
-          <p:nvPr/>
-        </p:nvSpPr>
-        <p:spPr>
-          <a:xfrm>
-            <a:off x="2926716" y="3283821"/>
-            <a:ext cx="1013419" cy="369332"/>
-          </a:xfrm>
-          <a:prstGeom prst="rect">
-            <a:avLst/>
-          </a:prstGeom>
-          <a:noFill/>
-        </p:spPr>
-        <p:txBody>
-          <a:bodyPr wrap="none" rtlCol="0">
-            <a:spAutoFit/>
-          </a:bodyPr>
-          <a:lstStyle/>
-          <a:p>
-            <a:r>
-              <a:rPr lang="en-US" dirty="0"/>
-              <a:t>Remote</a:t>
-            </a:r>
-          </a:p>
-        </p:txBody>
-      </p:sp>
-      <p:sp>
-        <p:nvSpPr>
-          <p:cNvPr id="6" name="TextBox 5">
-            <a:extLst>
-              <a:ext uri="{FF2B5EF4-FFF2-40B4-BE49-F238E27FC236}">
-                <a16:creationId xmlns:a16="http://schemas.microsoft.com/office/drawing/2014/main" id="{90E89A52-F0AC-8544-8638-28FD81BEC04E}"/>
-              </a:ext>
-            </a:extLst>
-          </p:cNvPr>
-          <p:cNvSpPr txBox="1"/>
-          <p:nvPr/>
-        </p:nvSpPr>
-        <p:spPr>
-          <a:xfrm>
-            <a:off x="3069591" y="3825547"/>
-            <a:ext cx="748923" cy="369332"/>
-          </a:xfrm>
-          <a:prstGeom prst="rect">
-            <a:avLst/>
-          </a:prstGeom>
-          <a:noFill/>
-        </p:spPr>
-        <p:txBody>
-          <a:bodyPr wrap="none" rtlCol="0">
-            <a:spAutoFit/>
-          </a:bodyPr>
-          <a:lstStyle/>
-          <a:p>
-            <a:r>
-              <a:rPr lang="en-US" dirty="0"/>
-              <a:t>Local</a:t>
-            </a:r>
-          </a:p>
-        </p:txBody>
-      </p:sp>
-      <p:sp>
-        <p:nvSpPr>
-          <p:cNvPr id="7" name="TextBox 6">
-            <a:extLst>
-              <a:ext uri="{FF2B5EF4-FFF2-40B4-BE49-F238E27FC236}">
-                <a16:creationId xmlns:a16="http://schemas.microsoft.com/office/drawing/2014/main" id="{C688C1BB-E276-FCC5-4BC9-44642821AEEF}"/>
-              </a:ext>
-            </a:extLst>
-          </p:cNvPr>
-          <p:cNvSpPr txBox="1"/>
-          <p:nvPr/>
-        </p:nvSpPr>
-        <p:spPr>
-          <a:xfrm>
-            <a:off x="6636174" y="3290422"/>
-            <a:ext cx="2435667" cy="369332"/>
-          </a:xfrm>
-          <a:prstGeom prst="rect">
-            <a:avLst/>
-          </a:prstGeom>
-          <a:noFill/>
-        </p:spPr>
-        <p:txBody>
-          <a:bodyPr wrap="none" rtlCol="0">
-            <a:spAutoFit/>
-          </a:bodyPr>
-          <a:lstStyle/>
-          <a:p>
-            <a:r>
-              <a:rPr lang="en-US" dirty="0"/>
-              <a:t>On GitHub (Browser)</a:t>
-            </a:r>
-          </a:p>
-        </p:txBody>
-      </p:sp>
-      <p:sp>
-        <p:nvSpPr>
-          <p:cNvPr id="8" name="TextBox 7">
-            <a:extLst>
-              <a:ext uri="{FF2B5EF4-FFF2-40B4-BE49-F238E27FC236}">
-                <a16:creationId xmlns:a16="http://schemas.microsoft.com/office/drawing/2014/main" id="{5C77A1E1-BFA3-BDDB-2D25-B90EFE46FB50}"/>
-              </a:ext>
-            </a:extLst>
-          </p:cNvPr>
-          <p:cNvSpPr txBox="1"/>
-          <p:nvPr/>
-        </p:nvSpPr>
-        <p:spPr>
-          <a:xfrm>
-            <a:off x="6094359" y="3799041"/>
-            <a:ext cx="2985497" cy="369332"/>
-          </a:xfrm>
-          <a:prstGeom prst="rect">
-            <a:avLst/>
-          </a:prstGeom>
-          <a:noFill/>
-        </p:spPr>
-        <p:txBody>
-          <a:bodyPr wrap="none" rtlCol="0">
-            <a:spAutoFit/>
-          </a:bodyPr>
-          <a:lstStyle/>
-          <a:p>
-            <a:r>
-              <a:rPr lang="en-US" dirty="0"/>
-              <a:t>On Your Machine (git/CLI)</a:t>
-            </a:r>
-          </a:p>
-        </p:txBody>
-      </p:sp>
-      <p:sp>
-        <p:nvSpPr>
-          <p:cNvPr id="9" name="TextBox 8">
-            <a:extLst>
-              <a:ext uri="{FF2B5EF4-FFF2-40B4-BE49-F238E27FC236}">
-                <a16:creationId xmlns:a16="http://schemas.microsoft.com/office/drawing/2014/main" id="{5EFF8847-7D36-2E59-56D5-92C196EF8954}"/>
-              </a:ext>
-            </a:extLst>
-          </p:cNvPr>
-          <p:cNvSpPr txBox="1"/>
-          <p:nvPr/>
-        </p:nvSpPr>
-        <p:spPr>
-          <a:xfrm>
-            <a:off x="7015074" y="1460081"/>
-            <a:ext cx="1287532" cy="1200329"/>
-          </a:xfrm>
-          <a:prstGeom prst="rect">
-            <a:avLst/>
-          </a:prstGeom>
-          <a:noFill/>
-        </p:spPr>
-        <p:txBody>
-          <a:bodyPr wrap="none" rtlCol="0">
-            <a:spAutoFit/>
-          </a:bodyPr>
-          <a:lstStyle/>
-          <a:p>
-            <a:pPr algn="ctr"/>
-            <a:r>
-              <a:rPr lang="en-US" sz="2400" dirty="0">
-                <a:solidFill>
-                  <a:schemeClr val="bg1"/>
-                </a:solidFill>
-                <a:latin typeface="Segoe Print" panose="02000800000000000000" pitchFamily="2" charset="0"/>
-              </a:rPr>
-              <a:t>Main</a:t>
-            </a:r>
-          </a:p>
-          <a:p>
-            <a:pPr algn="ctr"/>
-            <a:r>
-              <a:rPr lang="en-US" sz="2400" dirty="0">
-                <a:solidFill>
-                  <a:schemeClr val="bg1"/>
-                </a:solidFill>
-                <a:latin typeface="Segoe Print" panose="02000800000000000000" pitchFamily="2" charset="0"/>
-              </a:rPr>
-              <a:t>Project</a:t>
-            </a:r>
-          </a:p>
-          <a:p>
-            <a:pPr algn="ctr"/>
-            <a:r>
-              <a:rPr lang="en-US" sz="2400" dirty="0">
-                <a:solidFill>
-                  <a:schemeClr val="bg1"/>
-                </a:solidFill>
-                <a:latin typeface="Segoe Print" panose="02000800000000000000" pitchFamily="2" charset="0"/>
-              </a:rPr>
-              <a:t>Repo</a:t>
-            </a:r>
-          </a:p>
-        </p:txBody>
-      </p:sp>
-      <p:sp>
-        <p:nvSpPr>
-          <p:cNvPr id="10" name="Can 9">
-            <a:extLst>
-              <a:ext uri="{FF2B5EF4-FFF2-40B4-BE49-F238E27FC236}">
-                <a16:creationId xmlns:a16="http://schemas.microsoft.com/office/drawing/2014/main" id="{2FBA5496-5C4E-9D4F-48A1-4F1A245AFDFE}"/>
-              </a:ext>
-            </a:extLst>
-          </p:cNvPr>
-          <p:cNvSpPr/>
-          <p:nvPr/>
-        </p:nvSpPr>
-        <p:spPr>
-          <a:xfrm>
-            <a:off x="4224612" y="1181836"/>
-            <a:ext cx="1426477" cy="1463980"/>
-          </a:xfrm>
-          <a:prstGeom prst="can">
-            <a:avLst/>
-          </a:prstGeom>
-        </p:spPr>
-        <p:style>
-          <a:lnRef idx="2">
-            <a:schemeClr val="accent1">
-              <a:shade val="50000"/>
-            </a:schemeClr>
-          </a:lnRef>
-          <a:fillRef idx="1">
-            <a:schemeClr val="accent1"/>
-          </a:fillRef>
-          <a:effectRef idx="0">
-            <a:schemeClr val="accent1"/>
-          </a:effectRef>
-          <a:fontRef idx="minor">
-            <a:schemeClr val="lt1"/>
-          </a:fontRef>
-        </p:style>
-        <p:txBody>
-          <a:bodyPr rtlCol="0" anchor="ctr"/>
-          <a:lstStyle/>
-          <a:p>
-            <a:pPr algn="ctr"/>
-            <a:endParaRPr lang="en-US" sz="2000" i="1" dirty="0"/>
-          </a:p>
-          <a:p>
-            <a:pPr algn="ctr"/>
-            <a:endParaRPr lang="en-US" sz="2000" i="1" dirty="0"/>
-          </a:p>
-        </p:txBody>
-      </p:sp>
-      <p:sp>
-        <p:nvSpPr>
-          <p:cNvPr id="11" name="Can 10">
-            <a:extLst>
-              <a:ext uri="{FF2B5EF4-FFF2-40B4-BE49-F238E27FC236}">
-                <a16:creationId xmlns:a16="http://schemas.microsoft.com/office/drawing/2014/main" id="{F3621BDC-2969-FD51-F83E-CAEF6AA0FBCE}"/>
-              </a:ext>
-            </a:extLst>
-          </p:cNvPr>
-          <p:cNvSpPr/>
-          <p:nvPr/>
-        </p:nvSpPr>
-        <p:spPr>
-          <a:xfrm>
-            <a:off x="4224612" y="4172625"/>
-            <a:ext cx="1426477" cy="1679170"/>
-          </a:xfrm>
-          <a:prstGeom prst="can">
-            <a:avLst/>
-          </a:prstGeom>
-          <a:solidFill>
-            <a:schemeClr val="accent1">
-              <a:alpha val="0"/>
-            </a:schemeClr>
-          </a:solidFill>
-          <a:ln>
-            <a:solidFill>
-              <a:schemeClr val="accent1">
-                <a:shade val="50000"/>
-                <a:alpha val="0"/>
-              </a:schemeClr>
-            </a:solidFill>
-          </a:ln>
-        </p:spPr>
-        <p:style>
-          <a:lnRef idx="2">
-            <a:schemeClr val="accent1">
-              <a:shade val="50000"/>
-            </a:schemeClr>
-          </a:lnRef>
-          <a:fillRef idx="1">
-            <a:schemeClr val="accent1"/>
-          </a:fillRef>
-          <a:effectRef idx="0">
-            <a:schemeClr val="accent1"/>
-          </a:effectRef>
-          <a:fontRef idx="minor">
-            <a:schemeClr val="lt1"/>
-          </a:fontRef>
-        </p:style>
-        <p:txBody>
-          <a:bodyPr rtlCol="0" anchor="ctr"/>
-          <a:lstStyle/>
-          <a:p>
-            <a:pPr algn="ctr"/>
-            <a:br>
-              <a:rPr lang="en-US" sz="2000" dirty="0"/>
-            </a:br>
-            <a:endParaRPr lang="en-US" sz="2000" dirty="0"/>
-          </a:p>
-        </p:txBody>
-      </p:sp>
-      <p:sp>
-        <p:nvSpPr>
-          <p:cNvPr id="12" name="TextBox 11">
-            <a:extLst>
-              <a:ext uri="{FF2B5EF4-FFF2-40B4-BE49-F238E27FC236}">
-                <a16:creationId xmlns:a16="http://schemas.microsoft.com/office/drawing/2014/main" id="{3D208841-E66A-FBF9-1039-24928DFF10EE}"/>
-              </a:ext>
-            </a:extLst>
-          </p:cNvPr>
-          <p:cNvSpPr txBox="1"/>
-          <p:nvPr/>
-        </p:nvSpPr>
-        <p:spPr>
-          <a:xfrm>
-            <a:off x="4246261" y="1479741"/>
-            <a:ext cx="1351652" cy="1200329"/>
-          </a:xfrm>
-          <a:prstGeom prst="rect">
-            <a:avLst/>
-          </a:prstGeom>
-          <a:noFill/>
-        </p:spPr>
-        <p:txBody>
-          <a:bodyPr wrap="none" rtlCol="0">
-            <a:spAutoFit/>
-          </a:bodyPr>
-          <a:lstStyle/>
-          <a:p>
-            <a:pPr algn="ctr"/>
-            <a:r>
-              <a:rPr lang="en-US" sz="2400" dirty="0">
-                <a:solidFill>
-                  <a:schemeClr val="bg1"/>
-                </a:solidFill>
-                <a:latin typeface="Segoe Print" panose="02000800000000000000" pitchFamily="2" charset="0"/>
-              </a:rPr>
-              <a:t>Your</a:t>
-            </a:r>
-          </a:p>
-          <a:p>
-            <a:pPr algn="ctr"/>
-            <a:r>
-              <a:rPr lang="en-US" sz="2400" dirty="0">
-                <a:solidFill>
-                  <a:schemeClr val="bg1"/>
-                </a:solidFill>
-                <a:latin typeface="Segoe Print" panose="02000800000000000000" pitchFamily="2" charset="0"/>
-              </a:rPr>
-              <a:t>Remote</a:t>
-            </a:r>
-          </a:p>
-          <a:p>
-            <a:pPr algn="ctr"/>
-            <a:r>
-              <a:rPr lang="en-US" sz="2400" dirty="0">
-                <a:solidFill>
-                  <a:schemeClr val="bg1"/>
-                </a:solidFill>
-                <a:latin typeface="Segoe Print" panose="02000800000000000000" pitchFamily="2" charset="0"/>
-              </a:rPr>
-              <a:t>Copy</a:t>
-            </a:r>
-          </a:p>
-        </p:txBody>
-      </p:sp>
-      <p:sp>
-        <p:nvSpPr>
-          <p:cNvPr id="13" name="Can 12">
-            <a:extLst>
-              <a:ext uri="{FF2B5EF4-FFF2-40B4-BE49-F238E27FC236}">
-                <a16:creationId xmlns:a16="http://schemas.microsoft.com/office/drawing/2014/main" id="{EDD855E2-1DA5-326B-C9CA-D179C5F26FC4}"/>
-              </a:ext>
-            </a:extLst>
-          </p:cNvPr>
-          <p:cNvSpPr/>
-          <p:nvPr/>
-        </p:nvSpPr>
-        <p:spPr>
-          <a:xfrm>
-            <a:off x="4224612" y="4172625"/>
-            <a:ext cx="1426477" cy="1679170"/>
-          </a:xfrm>
-          <a:prstGeom prst="can">
-            <a:avLst/>
-          </a:prstGeom>
-        </p:spPr>
-        <p:style>
-          <a:lnRef idx="2">
-            <a:schemeClr val="accent1">
-              <a:shade val="50000"/>
-            </a:schemeClr>
-          </a:lnRef>
-          <a:fillRef idx="1">
-            <a:schemeClr val="accent1"/>
-          </a:fillRef>
-          <a:effectRef idx="0">
-            <a:schemeClr val="accent1"/>
-          </a:effectRef>
-          <a:fontRef idx="minor">
-            <a:schemeClr val="lt1"/>
-          </a:fontRef>
-        </p:style>
-        <p:txBody>
-          <a:bodyPr rtlCol="0" anchor="ctr"/>
-          <a:lstStyle/>
-          <a:p>
-            <a:pPr algn="ctr"/>
-            <a:br>
-              <a:rPr lang="en-US" sz="2000" dirty="0"/>
-            </a:br>
-            <a:endParaRPr lang="en-US" sz="2000" dirty="0"/>
-          </a:p>
-        </p:txBody>
-      </p:sp>
-      <p:sp>
-        <p:nvSpPr>
-          <p:cNvPr id="14" name="Left Arrow 13">
-            <a:extLst>
-              <a:ext uri="{FF2B5EF4-FFF2-40B4-BE49-F238E27FC236}">
-                <a16:creationId xmlns:a16="http://schemas.microsoft.com/office/drawing/2014/main" id="{A7E3AA56-EA46-3656-53A3-916E6D8D741D}"/>
-              </a:ext>
-            </a:extLst>
-          </p:cNvPr>
-          <p:cNvSpPr/>
-          <p:nvPr/>
-        </p:nvSpPr>
-        <p:spPr>
-          <a:xfrm rot="16200000">
-            <a:off x="3658905" y="2983694"/>
-            <a:ext cx="1731819" cy="1019070"/>
-          </a:xfrm>
-          <a:prstGeom prst="leftArrow">
-            <a:avLst/>
-          </a:prstGeom>
-          <a:ln>
-            <a:solidFill>
-              <a:schemeClr val="bg1">
-                <a:lumMod val="95000"/>
-              </a:schemeClr>
-            </a:solidFill>
-          </a:ln>
-        </p:spPr>
-        <p:style>
-          <a:lnRef idx="2">
-            <a:schemeClr val="accent1">
-              <a:shade val="50000"/>
-            </a:schemeClr>
-          </a:lnRef>
-          <a:fillRef idx="1">
-            <a:schemeClr val="accent1"/>
-          </a:fillRef>
-          <a:effectRef idx="0">
-            <a:schemeClr val="accent1"/>
-          </a:effectRef>
-          <a:fontRef idx="minor">
-            <a:schemeClr val="lt1"/>
-          </a:fontRef>
-        </p:style>
-        <p:txBody>
-          <a:bodyPr rtlCol="0" anchor="ctr"/>
-          <a:lstStyle/>
-          <a:p>
-            <a:pPr algn="ctr"/>
-            <a:r>
-              <a:rPr lang="en-US" sz="3200" b="1" dirty="0"/>
-              <a:t> </a:t>
-            </a:r>
-            <a:r>
-              <a:rPr lang="en-US" sz="3200" b="1" dirty="0">
-                <a:solidFill>
-                  <a:srgbClr val="FFFF00"/>
-                </a:solidFill>
-              </a:rPr>
-              <a:t>clone</a:t>
-            </a:r>
-          </a:p>
-        </p:txBody>
-      </p:sp>
-      <p:sp>
-        <p:nvSpPr>
-          <p:cNvPr id="15" name="TextBox 14">
-            <a:extLst>
-              <a:ext uri="{FF2B5EF4-FFF2-40B4-BE49-F238E27FC236}">
-                <a16:creationId xmlns:a16="http://schemas.microsoft.com/office/drawing/2014/main" id="{AD0F72B6-D682-A715-9F22-B78F06EB6FB3}"/>
-              </a:ext>
-            </a:extLst>
-          </p:cNvPr>
-          <p:cNvSpPr txBox="1"/>
-          <p:nvPr/>
-        </p:nvSpPr>
-        <p:spPr>
-          <a:xfrm>
-            <a:off x="4133976" y="4626175"/>
-            <a:ext cx="1584087" cy="1015663"/>
-          </a:xfrm>
-          <a:prstGeom prst="rect">
-            <a:avLst/>
-          </a:prstGeom>
-          <a:noFill/>
-        </p:spPr>
-        <p:txBody>
-          <a:bodyPr wrap="none" rtlCol="0">
-            <a:spAutoFit/>
-          </a:bodyPr>
-          <a:lstStyle/>
-          <a:p>
-            <a:pPr algn="ctr"/>
-            <a:r>
-              <a:rPr lang="en-US" sz="2000" dirty="0">
-                <a:solidFill>
-                  <a:schemeClr val="bg1"/>
-                </a:solidFill>
-                <a:latin typeface="Segoe Print" panose="02000800000000000000" pitchFamily="2" charset="0"/>
-              </a:rPr>
-              <a:t>Local Copy</a:t>
-            </a:r>
-          </a:p>
-          <a:p>
-            <a:pPr algn="ctr"/>
-            <a:r>
-              <a:rPr lang="en-US" sz="2000" dirty="0">
-                <a:solidFill>
-                  <a:schemeClr val="bg1"/>
-                </a:solidFill>
-                <a:latin typeface="Segoe Print" panose="02000800000000000000" pitchFamily="2" charset="0"/>
-              </a:rPr>
-              <a:t>Of Your</a:t>
-            </a:r>
-          </a:p>
-          <a:p>
-            <a:pPr algn="ctr"/>
-            <a:r>
-              <a:rPr lang="en-US" sz="2000" dirty="0">
-                <a:solidFill>
-                  <a:schemeClr val="bg1"/>
-                </a:solidFill>
-                <a:latin typeface="Segoe Print" panose="02000800000000000000" pitchFamily="2" charset="0"/>
-              </a:rPr>
-              <a:t>Copy</a:t>
-            </a:r>
-          </a:p>
-        </p:txBody>
-      </p:sp>
-      <p:cxnSp>
-        <p:nvCxnSpPr>
-          <p:cNvPr id="16" name="Curved Connector 15">
-            <a:extLst>
-              <a:ext uri="{FF2B5EF4-FFF2-40B4-BE49-F238E27FC236}">
-                <a16:creationId xmlns:a16="http://schemas.microsoft.com/office/drawing/2014/main" id="{B0E2347A-39E6-6062-318C-450814F1C44A}"/>
-              </a:ext>
-            </a:extLst>
-          </p:cNvPr>
-          <p:cNvCxnSpPr>
-            <a:cxnSpLocks/>
-          </p:cNvCxnSpPr>
-          <p:nvPr/>
-        </p:nvCxnSpPr>
-        <p:spPr>
-          <a:xfrm rot="5400000" flipH="1" flipV="1">
-            <a:off x="6281981" y="102883"/>
-            <a:ext cx="19660" cy="2734056"/>
-          </a:xfrm>
-          <a:prstGeom prst="curvedConnector3">
-            <a:avLst>
-              <a:gd name="adj1" fmla="val 1838622"/>
-            </a:avLst>
-          </a:prstGeom>
-          <a:ln w="63500">
-            <a:solidFill>
-              <a:schemeClr val="accent4"/>
-            </a:solidFill>
-            <a:prstDash val="sysDot"/>
-            <a:tailEnd type="triangle"/>
-          </a:ln>
-        </p:spPr>
-        <p:style>
-          <a:lnRef idx="2">
-            <a:schemeClr val="accent1"/>
-          </a:lnRef>
-          <a:fillRef idx="0">
-            <a:schemeClr val="accent1"/>
-          </a:fillRef>
-          <a:effectRef idx="1">
-            <a:schemeClr val="accent1"/>
-          </a:effectRef>
-          <a:fontRef idx="minor">
-            <a:schemeClr val="tx1"/>
-          </a:fontRef>
-        </p:style>
-      </p:cxnSp>
-      <p:cxnSp>
-        <p:nvCxnSpPr>
-          <p:cNvPr id="17" name="Curved Connector 16">
-            <a:extLst>
-              <a:ext uri="{FF2B5EF4-FFF2-40B4-BE49-F238E27FC236}">
-                <a16:creationId xmlns:a16="http://schemas.microsoft.com/office/drawing/2014/main" id="{D788DFE4-28FC-3737-390C-D84BB5D29FA3}"/>
-              </a:ext>
-            </a:extLst>
-          </p:cNvPr>
-          <p:cNvCxnSpPr>
-            <a:cxnSpLocks/>
-            <a:stCxn id="13" idx="2"/>
-            <a:endCxn id="12" idx="1"/>
-          </p:cNvCxnSpPr>
-          <p:nvPr/>
-        </p:nvCxnSpPr>
-        <p:spPr>
-          <a:xfrm rot="10800000" flipH="1">
-            <a:off x="4224611" y="2079906"/>
-            <a:ext cx="21649" cy="2932304"/>
-          </a:xfrm>
-          <a:prstGeom prst="curvedConnector3">
-            <a:avLst>
-              <a:gd name="adj1" fmla="val -1055938"/>
-            </a:avLst>
-          </a:prstGeom>
-          <a:ln w="63500">
-            <a:solidFill>
-              <a:schemeClr val="accent4"/>
-            </a:solidFill>
-            <a:prstDash val="sysDot"/>
-            <a:tailEnd type="triangle"/>
-          </a:ln>
-        </p:spPr>
-        <p:style>
-          <a:lnRef idx="2">
-            <a:schemeClr val="accent1"/>
-          </a:lnRef>
-          <a:fillRef idx="0">
-            <a:schemeClr val="accent1"/>
-          </a:fillRef>
-          <a:effectRef idx="1">
-            <a:schemeClr val="accent1"/>
-          </a:effectRef>
-          <a:fontRef idx="minor">
-            <a:schemeClr val="tx1"/>
-          </a:fontRef>
-        </p:style>
-      </p:cxnSp>
-      <p:sp>
-        <p:nvSpPr>
-          <p:cNvPr id="18" name="Left Arrow 17">
-            <a:extLst>
-              <a:ext uri="{FF2B5EF4-FFF2-40B4-BE49-F238E27FC236}">
-                <a16:creationId xmlns:a16="http://schemas.microsoft.com/office/drawing/2014/main" id="{1B6A2998-1957-2A13-A501-FCE312F3308B}"/>
-              </a:ext>
-            </a:extLst>
-          </p:cNvPr>
-          <p:cNvSpPr/>
-          <p:nvPr/>
-        </p:nvSpPr>
-        <p:spPr>
-          <a:xfrm>
-            <a:off x="5523725" y="1172099"/>
-            <a:ext cx="1386729" cy="732701"/>
-          </a:xfrm>
-          <a:prstGeom prst="leftArrow">
-            <a:avLst/>
-          </a:prstGeom>
-          <a:ln>
-            <a:solidFill>
-              <a:schemeClr val="bg1">
-                <a:lumMod val="95000"/>
-              </a:schemeClr>
-            </a:solidFill>
-          </a:ln>
-        </p:spPr>
-        <p:style>
-          <a:lnRef idx="2">
-            <a:schemeClr val="accent1">
-              <a:shade val="50000"/>
-            </a:schemeClr>
-          </a:lnRef>
-          <a:fillRef idx="1">
-            <a:schemeClr val="accent1"/>
-          </a:fillRef>
-          <a:effectRef idx="0">
-            <a:schemeClr val="accent1"/>
-          </a:effectRef>
-          <a:fontRef idx="minor">
-            <a:schemeClr val="lt1"/>
-          </a:fontRef>
-        </p:style>
-        <p:txBody>
-          <a:bodyPr rtlCol="0" anchor="ctr"/>
-          <a:lstStyle/>
-          <a:p>
-            <a:pPr algn="ctr"/>
-            <a:r>
-              <a:rPr lang="en-US" sz="3200" b="1" dirty="0">
-                <a:solidFill>
-                  <a:srgbClr val="FFFF00"/>
-                </a:solidFill>
-              </a:rPr>
-              <a:t>fork</a:t>
-            </a:r>
-            <a:endParaRPr lang="en-US" sz="2000" b="1" dirty="0">
-              <a:solidFill>
-                <a:srgbClr val="FFFF00"/>
-              </a:solidFill>
-            </a:endParaRPr>
-          </a:p>
-        </p:txBody>
-      </p:sp>
-      <p:sp>
-        <p:nvSpPr>
-          <p:cNvPr id="19" name="Up Arrow 18">
-            <a:extLst>
-              <a:ext uri="{FF2B5EF4-FFF2-40B4-BE49-F238E27FC236}">
-                <a16:creationId xmlns:a16="http://schemas.microsoft.com/office/drawing/2014/main" id="{53222C8D-21E9-BE14-6361-F83DCE90F964}"/>
-              </a:ext>
-            </a:extLst>
-          </p:cNvPr>
-          <p:cNvSpPr/>
-          <p:nvPr/>
-        </p:nvSpPr>
-        <p:spPr>
-          <a:xfrm>
-            <a:off x="4878922" y="2597699"/>
-            <a:ext cx="1016592" cy="1689752"/>
-          </a:xfrm>
-          <a:prstGeom prst="upArrow">
-            <a:avLst>
-              <a:gd name="adj1" fmla="val 50000"/>
-              <a:gd name="adj2" fmla="val 51082"/>
-            </a:avLst>
-          </a:prstGeom>
-          <a:ln>
-            <a:solidFill>
-              <a:schemeClr val="bg1">
-                <a:lumMod val="95000"/>
-              </a:schemeClr>
-            </a:solidFill>
-          </a:ln>
-        </p:spPr>
-        <p:style>
-          <a:lnRef idx="3">
-            <a:schemeClr val="lt1"/>
-          </a:lnRef>
-          <a:fillRef idx="1">
-            <a:schemeClr val="accent1"/>
-          </a:fillRef>
-          <a:effectRef idx="1">
-            <a:schemeClr val="accent1"/>
-          </a:effectRef>
-          <a:fontRef idx="minor">
-            <a:schemeClr val="lt1"/>
-          </a:fontRef>
-        </p:style>
-        <p:txBody>
-          <a:bodyPr vert="vert270" rtlCol="0" anchor="ctr"/>
-          <a:lstStyle/>
-          <a:p>
-            <a:pPr algn="ctr"/>
-            <a:r>
-              <a:rPr lang="en-US" sz="3200" b="1" dirty="0">
-                <a:solidFill>
-                  <a:srgbClr val="FFFF00"/>
-                </a:solidFill>
-              </a:rPr>
-              <a:t>push</a:t>
-            </a:r>
-          </a:p>
-        </p:txBody>
-      </p:sp>
-      <p:sp>
-        <p:nvSpPr>
-          <p:cNvPr id="20" name="Right Arrow 19">
-            <a:extLst>
-              <a:ext uri="{FF2B5EF4-FFF2-40B4-BE49-F238E27FC236}">
-                <a16:creationId xmlns:a16="http://schemas.microsoft.com/office/drawing/2014/main" id="{A50E1B59-B374-EF56-BD56-EBF348DBEAE8}"/>
-              </a:ext>
-            </a:extLst>
-          </p:cNvPr>
-          <p:cNvSpPr/>
-          <p:nvPr/>
-        </p:nvSpPr>
-        <p:spPr>
-          <a:xfrm>
-            <a:off x="5651089" y="1849948"/>
-            <a:ext cx="1394208" cy="1135980"/>
-          </a:xfrm>
-          <a:prstGeom prst="rightArrow">
-            <a:avLst/>
-          </a:prstGeom>
-          <a:ln>
-            <a:solidFill>
-              <a:schemeClr val="bg1">
-                <a:lumMod val="95000"/>
-              </a:schemeClr>
-            </a:solidFill>
-          </a:ln>
-        </p:spPr>
-        <p:style>
-          <a:lnRef idx="3">
-            <a:schemeClr val="lt1"/>
-          </a:lnRef>
-          <a:fillRef idx="1">
-            <a:schemeClr val="accent1"/>
-          </a:fillRef>
-          <a:effectRef idx="1">
-            <a:schemeClr val="accent1"/>
-          </a:effectRef>
-          <a:fontRef idx="minor">
-            <a:schemeClr val="lt1"/>
-          </a:fontRef>
-        </p:style>
-        <p:txBody>
-          <a:bodyPr rtlCol="0" anchor="ctr"/>
-          <a:lstStyle/>
-          <a:p>
-            <a:pPr algn="ctr"/>
-            <a:r>
-              <a:rPr lang="en-US" sz="1600" b="1" dirty="0">
-                <a:solidFill>
-                  <a:srgbClr val="FFFF00"/>
-                </a:solidFill>
-              </a:rPr>
-              <a:t>Pull Request</a:t>
-            </a:r>
-          </a:p>
-        </p:txBody>
-      </p:sp>
-    </p:spTree>
-    <p:extLst>
-      <p:ext uri="{BB962C8B-B14F-4D97-AF65-F5344CB8AC3E}">
-        <p14:creationId xmlns:p14="http://schemas.microsoft.com/office/powerpoint/2010/main" val="529549300"/>
-      </p:ext>
-    </p:extLst>
-  </p:cSld>
-  <p:clrMapOvr>
-    <a:masterClrMapping/>
-  </p:clrMapOvr>
-</p:sld>
-</file>
-
-<file path=ppt/slides/slide20.xml><?xml version="1.0" encoding="utf-8"?>
+<file path=ppt/slides/slide21.xml><?xml version="1.0" encoding="utf-8"?>
 <p:sld xmlns:a="http://schemas.openxmlformats.org/drawingml/2006/main" xmlns:r="http://schemas.openxmlformats.org/officeDocument/2006/relationships" xmlns:p="http://schemas.openxmlformats.org/presentationml/2006/main">
   <p:cSld>
     <p:spTree>
@@ -25749,7 +28527,7 @@
 </p:sld>
 </file>
 
-<file path=ppt/slides/slide21.xml><?xml version="1.0" encoding="utf-8"?>
+<file path=ppt/slides/slide22.xml><?xml version="1.0" encoding="utf-8"?>
 <p:sld xmlns:a="http://schemas.openxmlformats.org/drawingml/2006/main" xmlns:r="http://schemas.openxmlformats.org/officeDocument/2006/relationships" xmlns:p="http://schemas.openxmlformats.org/presentationml/2006/main">
   <p:cSld>
     <p:spTree>

</xml_diff>

<commit_message>
Staying synched updates (#114)
**Pull Request Description**

Updates to Chapter 4 from the January 2025 Sprint.

Partial completion of #92.

---

**Licensing Certification**

GitKit is a [Free Cultural Work](https://freedomdefined.org/Definition)
and all accepted contributions are licensed as described in the
LICENSE.md file. This requires that the contributor holds the rights to
do so. By submitting this pull request **I certify that I satisfy the
terms of the [Developer Certificate of
Origin](https://developercertificate.org/)** for its contents.
</commit_message>
<xml_diff>
--- a/materials/images/GitKit-Text-Soure-Images.pptx
+++ b/materials/images/GitKit-Text-Soure-Images.pptx
@@ -5,7 +5,7 @@
     <p:sldMasterId id="2147484099" r:id="rId1"/>
   </p:sldMasterIdLst>
   <p:notesMasterIdLst>
-    <p:notesMasterId r:id="rId23"/>
+    <p:notesMasterId r:id="rId24"/>
   </p:notesMasterIdLst>
   <p:sldIdLst>
     <p:sldId id="258" r:id="rId2"/>
@@ -24,11 +24,12 @@
     <p:sldId id="267" r:id="rId15"/>
     <p:sldId id="268" r:id="rId16"/>
     <p:sldId id="269" r:id="rId17"/>
-    <p:sldId id="270" r:id="rId18"/>
-    <p:sldId id="272" r:id="rId19"/>
-    <p:sldId id="273" r:id="rId20"/>
-    <p:sldId id="274" r:id="rId21"/>
-    <p:sldId id="275" r:id="rId22"/>
+    <p:sldId id="278" r:id="rId18"/>
+    <p:sldId id="270" r:id="rId19"/>
+    <p:sldId id="272" r:id="rId20"/>
+    <p:sldId id="273" r:id="rId21"/>
+    <p:sldId id="274" r:id="rId22"/>
+    <p:sldId id="275" r:id="rId23"/>
   </p:sldIdLst>
   <p:sldSz cx="12192000" cy="6858000"/>
   <p:notesSz cx="6858000" cy="9144000"/>
@@ -217,7 +218,7 @@
           <a:p>
             <a:fld id="{54450688-851B-C844-9616-D91E312B1884}" type="datetimeFigureOut">
               <a:rPr lang="en-US" smtClean="0"/>
-              <a:t>7/27/24</a:t>
+              <a:t>1/16/2025</a:t>
             </a:fld>
             <a:endParaRPr lang="en-US"/>
           </a:p>
@@ -767,7 +768,7 @@
           <a:p>
             <a:fld id="{7A82D7F2-23D8-094A-BC7F-45020389E464}" type="datetimeFigureOut">
               <a:rPr lang="en-US" smtClean="0"/>
-              <a:t>7/27/24</a:t>
+              <a:t>1/16/2025</a:t>
             </a:fld>
             <a:endParaRPr lang="en-US"/>
           </a:p>
@@ -964,7 +965,7 @@
           <a:p>
             <a:fld id="{7A82D7F2-23D8-094A-BC7F-45020389E464}" type="datetimeFigureOut">
               <a:rPr lang="en-US" smtClean="0"/>
-              <a:t>7/27/24</a:t>
+              <a:t>1/16/2025</a:t>
             </a:fld>
             <a:endParaRPr lang="en-US"/>
           </a:p>
@@ -1238,7 +1239,7 @@
           <a:p>
             <a:fld id="{7A82D7F2-23D8-094A-BC7F-45020389E464}" type="datetimeFigureOut">
               <a:rPr lang="en-US" smtClean="0"/>
-              <a:t>7/27/24</a:t>
+              <a:t>1/16/2025</a:t>
             </a:fld>
             <a:endParaRPr lang="en-US"/>
           </a:p>
@@ -1422,7 +1423,7 @@
           <a:p>
             <a:fld id="{7A82D7F2-23D8-094A-BC7F-45020389E464}" type="datetimeFigureOut">
               <a:rPr lang="en-US" smtClean="0"/>
-              <a:t>7/27/24</a:t>
+              <a:t>1/16/2025</a:t>
             </a:fld>
             <a:endParaRPr lang="en-US"/>
           </a:p>
@@ -1626,7 +1627,7 @@
           <a:p>
             <a:fld id="{7A82D7F2-23D8-094A-BC7F-45020389E464}" type="datetimeFigureOut">
               <a:rPr lang="en-US" smtClean="0"/>
-              <a:t>7/27/24</a:t>
+              <a:t>1/16/2025</a:t>
             </a:fld>
             <a:endParaRPr lang="en-US"/>
           </a:p>
@@ -1873,7 +1874,7 @@
           <a:p>
             <a:fld id="{7A82D7F2-23D8-094A-BC7F-45020389E464}" type="datetimeFigureOut">
               <a:rPr lang="en-US" smtClean="0"/>
-              <a:t>7/27/24</a:t>
+              <a:t>1/16/2025</a:t>
             </a:fld>
             <a:endParaRPr lang="en-US"/>
           </a:p>
@@ -2201,7 +2202,7 @@
           <a:p>
             <a:fld id="{7A82D7F2-23D8-094A-BC7F-45020389E464}" type="datetimeFigureOut">
               <a:rPr lang="en-US" smtClean="0"/>
-              <a:t>7/27/24</a:t>
+              <a:t>1/16/2025</a:t>
             </a:fld>
             <a:endParaRPr lang="en-US"/>
           </a:p>
@@ -2504,7 +2505,7 @@
           <a:p>
             <a:fld id="{7A82D7F2-23D8-094A-BC7F-45020389E464}" type="datetimeFigureOut">
               <a:rPr lang="en-US" smtClean="0"/>
-              <a:t>7/27/24</a:t>
+              <a:t>1/16/2025</a:t>
             </a:fld>
             <a:endParaRPr lang="en-US"/>
           </a:p>
@@ -2965,7 +2966,7 @@
           <a:p>
             <a:fld id="{7A82D7F2-23D8-094A-BC7F-45020389E464}" type="datetimeFigureOut">
               <a:rPr lang="en-US" smtClean="0"/>
-              <a:t>7/27/24</a:t>
+              <a:t>1/16/2025</a:t>
             </a:fld>
             <a:endParaRPr lang="en-US"/>
           </a:p>
@@ -3083,7 +3084,7 @@
           <a:p>
             <a:fld id="{7A82D7F2-23D8-094A-BC7F-45020389E464}" type="datetimeFigureOut">
               <a:rPr lang="en-US" smtClean="0"/>
-              <a:t>7/27/24</a:t>
+              <a:t>1/16/2025</a:t>
             </a:fld>
             <a:endParaRPr lang="en-US"/>
           </a:p>
@@ -3178,7 +3179,7 @@
           <a:p>
             <a:fld id="{7A82D7F2-23D8-094A-BC7F-45020389E464}" type="datetimeFigureOut">
               <a:rPr lang="en-US" smtClean="0"/>
-              <a:t>7/27/24</a:t>
+              <a:t>1/16/2025</a:t>
             </a:fld>
             <a:endParaRPr lang="en-US"/>
           </a:p>
@@ -3465,7 +3466,7 @@
           <a:p>
             <a:fld id="{7A82D7F2-23D8-094A-BC7F-45020389E464}" type="datetimeFigureOut">
               <a:rPr lang="en-US" smtClean="0"/>
-              <a:t>7/27/24</a:t>
+              <a:t>1/16/2025</a:t>
             </a:fld>
             <a:endParaRPr lang="en-US"/>
           </a:p>
@@ -3679,7 +3680,7 @@
           <a:p>
             <a:fld id="{7A82D7F2-23D8-094A-BC7F-45020389E464}" type="datetimeFigureOut">
               <a:rPr lang="en-US" smtClean="0"/>
-              <a:t>7/27/24</a:t>
+              <a:t>1/16/2025</a:t>
             </a:fld>
             <a:endParaRPr lang="en-US"/>
           </a:p>
@@ -17543,6 +17544,2783 @@
   <p:cSld>
     <p:spTree>
       <p:nvGrpSpPr>
+        <p:cNvPr id="1" name="">
+          <a:extLst>
+            <a:ext uri="{FF2B5EF4-FFF2-40B4-BE49-F238E27FC236}">
+              <a16:creationId xmlns:a16="http://schemas.microsoft.com/office/drawing/2014/main" id="{5C65A320-052D-64C9-16C5-218C0D26B977}"/>
+            </a:ext>
+          </a:extLst>
+        </p:cNvPr>
+        <p:cNvGrpSpPr/>
+        <p:nvPr/>
+      </p:nvGrpSpPr>
+      <p:grpSpPr>
+        <a:xfrm>
+          <a:off x="0" y="0"/>
+          <a:ext cx="0" cy="0"/>
+          <a:chOff x="0" y="0"/>
+          <a:chExt cx="0" cy="0"/>
+        </a:xfrm>
+      </p:grpSpPr>
+      <p:sp>
+        <p:nvSpPr>
+          <p:cNvPr id="2" name="Can 1">
+            <a:extLst>
+              <a:ext uri="{FF2B5EF4-FFF2-40B4-BE49-F238E27FC236}">
+                <a16:creationId xmlns:a16="http://schemas.microsoft.com/office/drawing/2014/main" id="{A54D951C-F04E-17EE-E791-6B5875B0FE36}"/>
+              </a:ext>
+            </a:extLst>
+          </p:cNvPr>
+          <p:cNvSpPr/>
+          <p:nvPr/>
+        </p:nvSpPr>
+        <p:spPr>
+          <a:xfrm>
+            <a:off x="3719762" y="4219267"/>
+            <a:ext cx="1426477" cy="1679170"/>
+          </a:xfrm>
+          <a:prstGeom prst="can">
+            <a:avLst/>
+          </a:prstGeom>
+        </p:spPr>
+        <p:style>
+          <a:lnRef idx="2">
+            <a:schemeClr val="accent1">
+              <a:shade val="50000"/>
+            </a:schemeClr>
+          </a:lnRef>
+          <a:fillRef idx="1">
+            <a:schemeClr val="accent1"/>
+          </a:fillRef>
+          <a:effectRef idx="0">
+            <a:schemeClr val="accent1"/>
+          </a:effectRef>
+          <a:fontRef idx="minor">
+            <a:schemeClr val="lt1"/>
+          </a:fontRef>
+        </p:style>
+        <p:txBody>
+          <a:bodyPr rtlCol="0" anchor="ctr"/>
+          <a:lstStyle/>
+          <a:p>
+            <a:pPr algn="ctr"/>
+            <a:br>
+              <a:rPr lang="en-US" sz="2000" dirty="0"/>
+            </a:br>
+            <a:endParaRPr lang="en-US" sz="2000" dirty="0"/>
+          </a:p>
+        </p:txBody>
+      </p:sp>
+      <p:cxnSp>
+        <p:nvCxnSpPr>
+          <p:cNvPr id="3" name="Straight Connector 2">
+            <a:extLst>
+              <a:ext uri="{FF2B5EF4-FFF2-40B4-BE49-F238E27FC236}">
+                <a16:creationId xmlns:a16="http://schemas.microsoft.com/office/drawing/2014/main" id="{23D63D21-81B1-58D4-01EA-6BB65CCFDD9C}"/>
+              </a:ext>
+            </a:extLst>
+          </p:cNvPr>
+          <p:cNvCxnSpPr/>
+          <p:nvPr/>
+        </p:nvCxnSpPr>
+        <p:spPr>
+          <a:xfrm>
+            <a:off x="2516533" y="3799594"/>
+            <a:ext cx="5903596" cy="0"/>
+          </a:xfrm>
+          <a:prstGeom prst="line">
+            <a:avLst/>
+          </a:prstGeom>
+          <a:ln w="76200" cmpd="sng">
+            <a:solidFill>
+              <a:srgbClr val="76C5EF"/>
+            </a:solidFill>
+          </a:ln>
+        </p:spPr>
+        <p:style>
+          <a:lnRef idx="2">
+            <a:schemeClr val="accent1"/>
+          </a:lnRef>
+          <a:fillRef idx="0">
+            <a:schemeClr val="accent1"/>
+          </a:fillRef>
+          <a:effectRef idx="1">
+            <a:schemeClr val="accent1"/>
+          </a:effectRef>
+          <a:fontRef idx="minor">
+            <a:schemeClr val="tx1"/>
+          </a:fontRef>
+        </p:style>
+      </p:cxnSp>
+      <p:grpSp>
+        <p:nvGrpSpPr>
+          <p:cNvPr id="4" name="Group 3">
+            <a:extLst>
+              <a:ext uri="{FF2B5EF4-FFF2-40B4-BE49-F238E27FC236}">
+                <a16:creationId xmlns:a16="http://schemas.microsoft.com/office/drawing/2014/main" id="{EA4C2A24-BD8F-B6C3-0944-07B17C9ED9CB}"/>
+              </a:ext>
+            </a:extLst>
+          </p:cNvPr>
+          <p:cNvGrpSpPr/>
+          <p:nvPr/>
+        </p:nvGrpSpPr>
+        <p:grpSpPr>
+          <a:xfrm>
+            <a:off x="3184934" y="803132"/>
+            <a:ext cx="4973053" cy="2672510"/>
+            <a:chOff x="1355581" y="1021204"/>
+            <a:chExt cx="6524194" cy="2928680"/>
+          </a:xfrm>
+        </p:grpSpPr>
+        <p:sp>
+          <p:nvSpPr>
+            <p:cNvPr id="5" name="Cloud 4">
+              <a:extLst>
+                <a:ext uri="{FF2B5EF4-FFF2-40B4-BE49-F238E27FC236}">
+                  <a16:creationId xmlns:a16="http://schemas.microsoft.com/office/drawing/2014/main" id="{816CAB5D-93A6-83C1-CB01-1A59168A7660}"/>
+                </a:ext>
+              </a:extLst>
+            </p:cNvPr>
+            <p:cNvSpPr/>
+            <p:nvPr/>
+          </p:nvSpPr>
+          <p:spPr>
+            <a:xfrm>
+              <a:off x="1355581" y="1021204"/>
+              <a:ext cx="6524194" cy="2928680"/>
+            </a:xfrm>
+            <a:prstGeom prst="cloud">
+              <a:avLst/>
+            </a:prstGeom>
+          </p:spPr>
+          <p:style>
+            <a:lnRef idx="1">
+              <a:schemeClr val="accent1"/>
+            </a:lnRef>
+            <a:fillRef idx="2">
+              <a:schemeClr val="accent1"/>
+            </a:fillRef>
+            <a:effectRef idx="1">
+              <a:schemeClr val="accent1"/>
+            </a:effectRef>
+            <a:fontRef idx="minor">
+              <a:schemeClr val="dk1"/>
+            </a:fontRef>
+          </p:style>
+          <p:txBody>
+            <a:bodyPr rtlCol="0" anchor="ctr"/>
+            <a:lstStyle/>
+            <a:p>
+              <a:pPr algn="ctr"/>
+              <a:endParaRPr lang="en-US" sz="4800" dirty="0"/>
+            </a:p>
+          </p:txBody>
+        </p:sp>
+        <p:sp>
+          <p:nvSpPr>
+            <p:cNvPr id="6" name="Can 5">
+              <a:extLst>
+                <a:ext uri="{FF2B5EF4-FFF2-40B4-BE49-F238E27FC236}">
+                  <a16:creationId xmlns:a16="http://schemas.microsoft.com/office/drawing/2014/main" id="{A8A0928A-98B6-D8F6-5B5C-A5482E72C3B1}"/>
+                </a:ext>
+              </a:extLst>
+            </p:cNvPr>
+            <p:cNvSpPr/>
+            <p:nvPr/>
+          </p:nvSpPr>
+          <p:spPr>
+            <a:xfrm>
+              <a:off x="5580807" y="1487321"/>
+              <a:ext cx="1871408" cy="1604308"/>
+            </a:xfrm>
+            <a:prstGeom prst="can">
+              <a:avLst/>
+            </a:prstGeom>
+          </p:spPr>
+          <p:style>
+            <a:lnRef idx="2">
+              <a:schemeClr val="accent1">
+                <a:shade val="50000"/>
+              </a:schemeClr>
+            </a:lnRef>
+            <a:fillRef idx="1">
+              <a:schemeClr val="accent1"/>
+            </a:fillRef>
+            <a:effectRef idx="0">
+              <a:schemeClr val="accent1"/>
+            </a:effectRef>
+            <a:fontRef idx="minor">
+              <a:schemeClr val="lt1"/>
+            </a:fontRef>
+          </p:style>
+          <p:txBody>
+            <a:bodyPr rtlCol="0" anchor="ctr"/>
+            <a:lstStyle/>
+            <a:p>
+              <a:pPr algn="ctr"/>
+              <a:r>
+                <a:rPr lang="en-US" sz="2000" dirty="0"/>
+                <a:t>upstream</a:t>
+              </a:r>
+            </a:p>
+            <a:p>
+              <a:pPr algn="ctr"/>
+              <a:endParaRPr lang="en-US" sz="2000" i="1" dirty="0"/>
+            </a:p>
+            <a:p>
+              <a:pPr algn="ctr"/>
+              <a:endParaRPr lang="en-US" sz="2000" i="1" dirty="0"/>
+            </a:p>
+          </p:txBody>
+        </p:sp>
+        <p:sp>
+          <p:nvSpPr>
+            <p:cNvPr id="7" name="Can 6">
+              <a:extLst>
+                <a:ext uri="{FF2B5EF4-FFF2-40B4-BE49-F238E27FC236}">
+                  <a16:creationId xmlns:a16="http://schemas.microsoft.com/office/drawing/2014/main" id="{C5B2A8D4-368A-FF55-A46D-362D5259CC6F}"/>
+                </a:ext>
+              </a:extLst>
+            </p:cNvPr>
+            <p:cNvSpPr/>
+            <p:nvPr/>
+          </p:nvSpPr>
+          <p:spPr>
+            <a:xfrm>
+              <a:off x="2057227" y="1487321"/>
+              <a:ext cx="1871408" cy="1604308"/>
+            </a:xfrm>
+            <a:prstGeom prst="can">
+              <a:avLst/>
+            </a:prstGeom>
+          </p:spPr>
+          <p:style>
+            <a:lnRef idx="2">
+              <a:schemeClr val="accent1">
+                <a:shade val="50000"/>
+              </a:schemeClr>
+            </a:lnRef>
+            <a:fillRef idx="1">
+              <a:schemeClr val="accent1"/>
+            </a:fillRef>
+            <a:effectRef idx="0">
+              <a:schemeClr val="accent1"/>
+            </a:effectRef>
+            <a:fontRef idx="minor">
+              <a:schemeClr val="lt1"/>
+            </a:fontRef>
+          </p:style>
+          <p:txBody>
+            <a:bodyPr rtlCol="0" anchor="ctr"/>
+            <a:lstStyle/>
+            <a:p>
+              <a:pPr algn="ctr"/>
+              <a:r>
+                <a:rPr lang="en-US" sz="2000" dirty="0"/>
+                <a:t>origin</a:t>
+              </a:r>
+            </a:p>
+            <a:p>
+              <a:pPr algn="ctr"/>
+              <a:endParaRPr lang="en-US" sz="2000" i="1" dirty="0"/>
+            </a:p>
+            <a:p>
+              <a:pPr algn="ctr"/>
+              <a:endParaRPr lang="en-US" sz="2000" i="1" dirty="0"/>
+            </a:p>
+          </p:txBody>
+        </p:sp>
+      </p:grpSp>
+      <p:sp>
+        <p:nvSpPr>
+          <p:cNvPr id="8" name="Rounded Rectangle 7">
+            <a:extLst>
+              <a:ext uri="{FF2B5EF4-FFF2-40B4-BE49-F238E27FC236}">
+                <a16:creationId xmlns:a16="http://schemas.microsoft.com/office/drawing/2014/main" id="{1316A34F-DAB9-DC5F-1CAC-4F097BDC5A0D}"/>
+              </a:ext>
+            </a:extLst>
+          </p:cNvPr>
+          <p:cNvSpPr/>
+          <p:nvPr/>
+        </p:nvSpPr>
+        <p:spPr>
+          <a:xfrm>
+            <a:off x="6527042" y="1912568"/>
+            <a:ext cx="1253994" cy="239921"/>
+          </a:xfrm>
+          <a:prstGeom prst="roundRect">
+            <a:avLst/>
+          </a:prstGeom>
+        </p:spPr>
+        <p:style>
+          <a:lnRef idx="3">
+            <a:schemeClr val="lt1"/>
+          </a:lnRef>
+          <a:fillRef idx="1">
+            <a:schemeClr val="accent3"/>
+          </a:fillRef>
+          <a:effectRef idx="1">
+            <a:schemeClr val="accent3"/>
+          </a:effectRef>
+          <a:fontRef idx="minor">
+            <a:schemeClr val="lt1"/>
+          </a:fontRef>
+        </p:style>
+        <p:txBody>
+          <a:bodyPr rtlCol="0" anchor="ctr"/>
+          <a:lstStyle/>
+          <a:p>
+            <a:pPr algn="ctr"/>
+            <a:endParaRPr lang="en-US" sz="1400" dirty="0"/>
+          </a:p>
+        </p:txBody>
+      </p:sp>
+      <p:sp>
+        <p:nvSpPr>
+          <p:cNvPr id="9" name="Rounded Rectangle 8">
+            <a:extLst>
+              <a:ext uri="{FF2B5EF4-FFF2-40B4-BE49-F238E27FC236}">
+                <a16:creationId xmlns:a16="http://schemas.microsoft.com/office/drawing/2014/main" id="{D41D927E-AEF2-9537-2250-CB19245F1978}"/>
+              </a:ext>
+            </a:extLst>
+          </p:cNvPr>
+          <p:cNvSpPr/>
+          <p:nvPr/>
+        </p:nvSpPr>
+        <p:spPr>
+          <a:xfrm>
+            <a:off x="3806004" y="1912568"/>
+            <a:ext cx="1253994" cy="239921"/>
+          </a:xfrm>
+          <a:prstGeom prst="roundRect">
+            <a:avLst/>
+          </a:prstGeom>
+        </p:spPr>
+        <p:style>
+          <a:lnRef idx="3">
+            <a:schemeClr val="lt1"/>
+          </a:lnRef>
+          <a:fillRef idx="1">
+            <a:schemeClr val="accent3"/>
+          </a:fillRef>
+          <a:effectRef idx="1">
+            <a:schemeClr val="accent3"/>
+          </a:effectRef>
+          <a:fontRef idx="minor">
+            <a:schemeClr val="lt1"/>
+          </a:fontRef>
+        </p:style>
+        <p:txBody>
+          <a:bodyPr rtlCol="0" anchor="ctr"/>
+          <a:lstStyle/>
+          <a:p>
+            <a:pPr algn="ctr"/>
+            <a:endParaRPr lang="en-US" sz="1400" dirty="0"/>
+          </a:p>
+        </p:txBody>
+      </p:sp>
+      <p:sp>
+        <p:nvSpPr>
+          <p:cNvPr id="10" name="Rounded Rectangle 9">
+            <a:extLst>
+              <a:ext uri="{FF2B5EF4-FFF2-40B4-BE49-F238E27FC236}">
+                <a16:creationId xmlns:a16="http://schemas.microsoft.com/office/drawing/2014/main" id="{5FB54CAA-40FC-4E4D-6ED2-F8EA473EBA31}"/>
+              </a:ext>
+            </a:extLst>
+          </p:cNvPr>
+          <p:cNvSpPr/>
+          <p:nvPr/>
+        </p:nvSpPr>
+        <p:spPr>
+          <a:xfrm>
+            <a:off x="3796308" y="4625773"/>
+            <a:ext cx="1253994" cy="239921"/>
+          </a:xfrm>
+          <a:prstGeom prst="roundRect">
+            <a:avLst/>
+          </a:prstGeom>
+        </p:spPr>
+        <p:style>
+          <a:lnRef idx="3">
+            <a:schemeClr val="lt1"/>
+          </a:lnRef>
+          <a:fillRef idx="1">
+            <a:schemeClr val="accent3"/>
+          </a:fillRef>
+          <a:effectRef idx="1">
+            <a:schemeClr val="accent3"/>
+          </a:effectRef>
+          <a:fontRef idx="minor">
+            <a:schemeClr val="lt1"/>
+          </a:fontRef>
+        </p:style>
+        <p:txBody>
+          <a:bodyPr rtlCol="0" anchor="ctr"/>
+          <a:lstStyle/>
+          <a:p>
+            <a:pPr algn="ctr"/>
+            <a:endParaRPr lang="en-US" sz="1400" dirty="0"/>
+          </a:p>
+        </p:txBody>
+      </p:sp>
+      <p:sp>
+        <p:nvSpPr>
+          <p:cNvPr id="11" name="Oval 10">
+            <a:extLst>
+              <a:ext uri="{FF2B5EF4-FFF2-40B4-BE49-F238E27FC236}">
+                <a16:creationId xmlns:a16="http://schemas.microsoft.com/office/drawing/2014/main" id="{0B5C7311-108A-A4DE-6A47-EEAD78D25374}"/>
+              </a:ext>
+            </a:extLst>
+          </p:cNvPr>
+          <p:cNvSpPr/>
+          <p:nvPr/>
+        </p:nvSpPr>
+        <p:spPr>
+          <a:xfrm>
+            <a:off x="6576608" y="1967571"/>
+            <a:ext cx="140086" cy="140086"/>
+          </a:xfrm>
+          <a:prstGeom prst="ellipse">
+            <a:avLst/>
+          </a:prstGeom>
+          <a:solidFill>
+            <a:srgbClr val="FF0000"/>
+          </a:solidFill>
+          <a:ln>
+            <a:solidFill>
+              <a:schemeClr val="tx1"/>
+            </a:solidFill>
+          </a:ln>
+        </p:spPr>
+        <p:style>
+          <a:lnRef idx="2">
+            <a:schemeClr val="accent5">
+              <a:shade val="50000"/>
+            </a:schemeClr>
+          </a:lnRef>
+          <a:fillRef idx="1">
+            <a:schemeClr val="accent5"/>
+          </a:fillRef>
+          <a:effectRef idx="0">
+            <a:schemeClr val="accent5"/>
+          </a:effectRef>
+          <a:fontRef idx="minor">
+            <a:schemeClr val="lt1"/>
+          </a:fontRef>
+        </p:style>
+        <p:txBody>
+          <a:bodyPr rtlCol="0" anchor="ctr"/>
+          <a:lstStyle/>
+          <a:p>
+            <a:pPr algn="ctr"/>
+            <a:endParaRPr lang="en-US"/>
+          </a:p>
+        </p:txBody>
+      </p:sp>
+      <p:cxnSp>
+        <p:nvCxnSpPr>
+          <p:cNvPr id="12" name="Straight Connector 11">
+            <a:extLst>
+              <a:ext uri="{FF2B5EF4-FFF2-40B4-BE49-F238E27FC236}">
+                <a16:creationId xmlns:a16="http://schemas.microsoft.com/office/drawing/2014/main" id="{967D2C3F-B21F-2136-A6F5-485AAB2EF555}"/>
+              </a:ext>
+            </a:extLst>
+          </p:cNvPr>
+          <p:cNvCxnSpPr>
+            <a:stCxn id="11" idx="6"/>
+            <a:endCxn id="13" idx="2"/>
+          </p:cNvCxnSpPr>
+          <p:nvPr/>
+        </p:nvCxnSpPr>
+        <p:spPr>
+          <a:xfrm flipV="1">
+            <a:off x="6716694" y="2034326"/>
+            <a:ext cx="105890" cy="3288"/>
+          </a:xfrm>
+          <a:prstGeom prst="line">
+            <a:avLst/>
+          </a:prstGeom>
+          <a:ln>
+            <a:solidFill>
+              <a:schemeClr val="tx1"/>
+            </a:solidFill>
+          </a:ln>
+        </p:spPr>
+        <p:style>
+          <a:lnRef idx="3">
+            <a:schemeClr val="accent5"/>
+          </a:lnRef>
+          <a:fillRef idx="0">
+            <a:schemeClr val="accent5"/>
+          </a:fillRef>
+          <a:effectRef idx="2">
+            <a:schemeClr val="accent5"/>
+          </a:effectRef>
+          <a:fontRef idx="minor">
+            <a:schemeClr val="tx1"/>
+          </a:fontRef>
+        </p:style>
+      </p:cxnSp>
+      <p:sp>
+        <p:nvSpPr>
+          <p:cNvPr id="13" name="Oval 12">
+            <a:extLst>
+              <a:ext uri="{FF2B5EF4-FFF2-40B4-BE49-F238E27FC236}">
+                <a16:creationId xmlns:a16="http://schemas.microsoft.com/office/drawing/2014/main" id="{9C6B15B5-28FD-8448-E55A-311157140289}"/>
+              </a:ext>
+            </a:extLst>
+          </p:cNvPr>
+          <p:cNvSpPr/>
+          <p:nvPr/>
+        </p:nvSpPr>
+        <p:spPr>
+          <a:xfrm>
+            <a:off x="6822584" y="1964283"/>
+            <a:ext cx="140086" cy="140086"/>
+          </a:xfrm>
+          <a:prstGeom prst="ellipse">
+            <a:avLst/>
+          </a:prstGeom>
+          <a:solidFill>
+            <a:srgbClr val="FFFF00"/>
+          </a:solidFill>
+          <a:ln>
+            <a:solidFill>
+              <a:schemeClr val="tx1"/>
+            </a:solidFill>
+          </a:ln>
+        </p:spPr>
+        <p:style>
+          <a:lnRef idx="2">
+            <a:schemeClr val="accent5">
+              <a:shade val="50000"/>
+            </a:schemeClr>
+          </a:lnRef>
+          <a:fillRef idx="1">
+            <a:schemeClr val="accent5"/>
+          </a:fillRef>
+          <a:effectRef idx="0">
+            <a:schemeClr val="accent5"/>
+          </a:effectRef>
+          <a:fontRef idx="minor">
+            <a:schemeClr val="lt1"/>
+          </a:fontRef>
+        </p:style>
+        <p:txBody>
+          <a:bodyPr rtlCol="0" anchor="ctr"/>
+          <a:lstStyle/>
+          <a:p>
+            <a:pPr algn="ctr"/>
+            <a:endParaRPr lang="en-US"/>
+          </a:p>
+        </p:txBody>
+      </p:sp>
+      <p:sp>
+        <p:nvSpPr>
+          <p:cNvPr id="14" name="Oval 13">
+            <a:extLst>
+              <a:ext uri="{FF2B5EF4-FFF2-40B4-BE49-F238E27FC236}">
+                <a16:creationId xmlns:a16="http://schemas.microsoft.com/office/drawing/2014/main" id="{B86EDAF9-ADD5-7E7A-53C0-52931A010CC8}"/>
+              </a:ext>
+            </a:extLst>
+          </p:cNvPr>
+          <p:cNvSpPr/>
+          <p:nvPr/>
+        </p:nvSpPr>
+        <p:spPr>
+          <a:xfrm>
+            <a:off x="3850201" y="1963569"/>
+            <a:ext cx="140086" cy="140086"/>
+          </a:xfrm>
+          <a:prstGeom prst="ellipse">
+            <a:avLst/>
+          </a:prstGeom>
+          <a:solidFill>
+            <a:srgbClr val="FF0000"/>
+          </a:solidFill>
+          <a:ln>
+            <a:solidFill>
+              <a:schemeClr val="tx1"/>
+            </a:solidFill>
+          </a:ln>
+        </p:spPr>
+        <p:style>
+          <a:lnRef idx="2">
+            <a:schemeClr val="accent5">
+              <a:shade val="50000"/>
+            </a:schemeClr>
+          </a:lnRef>
+          <a:fillRef idx="1">
+            <a:schemeClr val="accent5"/>
+          </a:fillRef>
+          <a:effectRef idx="0">
+            <a:schemeClr val="accent5"/>
+          </a:effectRef>
+          <a:fontRef idx="minor">
+            <a:schemeClr val="lt1"/>
+          </a:fontRef>
+        </p:style>
+        <p:txBody>
+          <a:bodyPr rtlCol="0" anchor="ctr"/>
+          <a:lstStyle/>
+          <a:p>
+            <a:pPr algn="ctr"/>
+            <a:endParaRPr lang="en-US"/>
+          </a:p>
+        </p:txBody>
+      </p:sp>
+      <p:cxnSp>
+        <p:nvCxnSpPr>
+          <p:cNvPr id="15" name="Straight Connector 14">
+            <a:extLst>
+              <a:ext uri="{FF2B5EF4-FFF2-40B4-BE49-F238E27FC236}">
+                <a16:creationId xmlns:a16="http://schemas.microsoft.com/office/drawing/2014/main" id="{E6A07ED4-E384-F2BF-D7DF-7E674A0131E5}"/>
+              </a:ext>
+            </a:extLst>
+          </p:cNvPr>
+          <p:cNvCxnSpPr>
+            <a:stCxn id="14" idx="6"/>
+            <a:endCxn id="16" idx="2"/>
+          </p:cNvCxnSpPr>
+          <p:nvPr/>
+        </p:nvCxnSpPr>
+        <p:spPr>
+          <a:xfrm flipV="1">
+            <a:off x="3990287" y="2030324"/>
+            <a:ext cx="105890" cy="3288"/>
+          </a:xfrm>
+          <a:prstGeom prst="line">
+            <a:avLst/>
+          </a:prstGeom>
+          <a:ln>
+            <a:solidFill>
+              <a:schemeClr val="tx1"/>
+            </a:solidFill>
+          </a:ln>
+        </p:spPr>
+        <p:style>
+          <a:lnRef idx="3">
+            <a:schemeClr val="accent5"/>
+          </a:lnRef>
+          <a:fillRef idx="0">
+            <a:schemeClr val="accent5"/>
+          </a:fillRef>
+          <a:effectRef idx="2">
+            <a:schemeClr val="accent5"/>
+          </a:effectRef>
+          <a:fontRef idx="minor">
+            <a:schemeClr val="tx1"/>
+          </a:fontRef>
+        </p:style>
+      </p:cxnSp>
+      <p:sp>
+        <p:nvSpPr>
+          <p:cNvPr id="16" name="Oval 15">
+            <a:extLst>
+              <a:ext uri="{FF2B5EF4-FFF2-40B4-BE49-F238E27FC236}">
+                <a16:creationId xmlns:a16="http://schemas.microsoft.com/office/drawing/2014/main" id="{D28D57D8-8E3E-6362-183A-F7A40DAD243C}"/>
+              </a:ext>
+            </a:extLst>
+          </p:cNvPr>
+          <p:cNvSpPr/>
+          <p:nvPr/>
+        </p:nvSpPr>
+        <p:spPr>
+          <a:xfrm>
+            <a:off x="4096177" y="1960281"/>
+            <a:ext cx="140086" cy="140086"/>
+          </a:xfrm>
+          <a:prstGeom prst="ellipse">
+            <a:avLst/>
+          </a:prstGeom>
+          <a:solidFill>
+            <a:srgbClr val="FFFF00"/>
+          </a:solidFill>
+          <a:ln>
+            <a:solidFill>
+              <a:schemeClr val="tx1"/>
+            </a:solidFill>
+          </a:ln>
+        </p:spPr>
+        <p:style>
+          <a:lnRef idx="2">
+            <a:schemeClr val="accent5">
+              <a:shade val="50000"/>
+            </a:schemeClr>
+          </a:lnRef>
+          <a:fillRef idx="1">
+            <a:schemeClr val="accent5"/>
+          </a:fillRef>
+          <a:effectRef idx="0">
+            <a:schemeClr val="accent5"/>
+          </a:effectRef>
+          <a:fontRef idx="minor">
+            <a:schemeClr val="lt1"/>
+          </a:fontRef>
+        </p:style>
+        <p:txBody>
+          <a:bodyPr rtlCol="0" anchor="ctr"/>
+          <a:lstStyle/>
+          <a:p>
+            <a:pPr algn="ctr"/>
+            <a:endParaRPr lang="en-US"/>
+          </a:p>
+        </p:txBody>
+      </p:sp>
+      <p:sp>
+        <p:nvSpPr>
+          <p:cNvPr id="17" name="Oval 16">
+            <a:extLst>
+              <a:ext uri="{FF2B5EF4-FFF2-40B4-BE49-F238E27FC236}">
+                <a16:creationId xmlns:a16="http://schemas.microsoft.com/office/drawing/2014/main" id="{9AEC8522-C834-2956-CBDB-1AF3EA5B2E57}"/>
+              </a:ext>
+            </a:extLst>
+          </p:cNvPr>
+          <p:cNvSpPr/>
+          <p:nvPr/>
+        </p:nvSpPr>
+        <p:spPr>
+          <a:xfrm>
+            <a:off x="3850201" y="4669441"/>
+            <a:ext cx="140086" cy="140086"/>
+          </a:xfrm>
+          <a:prstGeom prst="ellipse">
+            <a:avLst/>
+          </a:prstGeom>
+          <a:solidFill>
+            <a:srgbClr val="FF0000"/>
+          </a:solidFill>
+          <a:ln>
+            <a:solidFill>
+              <a:schemeClr val="tx1"/>
+            </a:solidFill>
+          </a:ln>
+        </p:spPr>
+        <p:style>
+          <a:lnRef idx="2">
+            <a:schemeClr val="accent5">
+              <a:shade val="50000"/>
+            </a:schemeClr>
+          </a:lnRef>
+          <a:fillRef idx="1">
+            <a:schemeClr val="accent5"/>
+          </a:fillRef>
+          <a:effectRef idx="0">
+            <a:schemeClr val="accent5"/>
+          </a:effectRef>
+          <a:fontRef idx="minor">
+            <a:schemeClr val="lt1"/>
+          </a:fontRef>
+        </p:style>
+        <p:txBody>
+          <a:bodyPr rtlCol="0" anchor="ctr"/>
+          <a:lstStyle/>
+          <a:p>
+            <a:pPr algn="ctr"/>
+            <a:endParaRPr lang="en-US"/>
+          </a:p>
+        </p:txBody>
+      </p:sp>
+      <p:cxnSp>
+        <p:nvCxnSpPr>
+          <p:cNvPr id="18" name="Straight Connector 17">
+            <a:extLst>
+              <a:ext uri="{FF2B5EF4-FFF2-40B4-BE49-F238E27FC236}">
+                <a16:creationId xmlns:a16="http://schemas.microsoft.com/office/drawing/2014/main" id="{5C062246-A6EF-BD46-17A1-5CA8FD54B0CE}"/>
+              </a:ext>
+            </a:extLst>
+          </p:cNvPr>
+          <p:cNvCxnSpPr>
+            <a:stCxn id="17" idx="6"/>
+            <a:endCxn id="19" idx="2"/>
+          </p:cNvCxnSpPr>
+          <p:nvPr/>
+        </p:nvCxnSpPr>
+        <p:spPr>
+          <a:xfrm flipV="1">
+            <a:off x="3990287" y="4736196"/>
+            <a:ext cx="105890" cy="3288"/>
+          </a:xfrm>
+          <a:prstGeom prst="line">
+            <a:avLst/>
+          </a:prstGeom>
+          <a:ln>
+            <a:solidFill>
+              <a:schemeClr val="tx1"/>
+            </a:solidFill>
+          </a:ln>
+        </p:spPr>
+        <p:style>
+          <a:lnRef idx="3">
+            <a:schemeClr val="accent5"/>
+          </a:lnRef>
+          <a:fillRef idx="0">
+            <a:schemeClr val="accent5"/>
+          </a:fillRef>
+          <a:effectRef idx="2">
+            <a:schemeClr val="accent5"/>
+          </a:effectRef>
+          <a:fontRef idx="minor">
+            <a:schemeClr val="tx1"/>
+          </a:fontRef>
+        </p:style>
+      </p:cxnSp>
+      <p:sp>
+        <p:nvSpPr>
+          <p:cNvPr id="19" name="Oval 18">
+            <a:extLst>
+              <a:ext uri="{FF2B5EF4-FFF2-40B4-BE49-F238E27FC236}">
+                <a16:creationId xmlns:a16="http://schemas.microsoft.com/office/drawing/2014/main" id="{E5863D6A-5CF8-146C-EAD8-54882483A1B1}"/>
+              </a:ext>
+            </a:extLst>
+          </p:cNvPr>
+          <p:cNvSpPr/>
+          <p:nvPr/>
+        </p:nvSpPr>
+        <p:spPr>
+          <a:xfrm>
+            <a:off x="4096177" y="4666153"/>
+            <a:ext cx="140086" cy="140086"/>
+          </a:xfrm>
+          <a:prstGeom prst="ellipse">
+            <a:avLst/>
+          </a:prstGeom>
+          <a:solidFill>
+            <a:srgbClr val="FFFF00"/>
+          </a:solidFill>
+          <a:ln>
+            <a:solidFill>
+              <a:schemeClr val="tx1"/>
+            </a:solidFill>
+          </a:ln>
+        </p:spPr>
+        <p:style>
+          <a:lnRef idx="2">
+            <a:schemeClr val="accent5">
+              <a:shade val="50000"/>
+            </a:schemeClr>
+          </a:lnRef>
+          <a:fillRef idx="1">
+            <a:schemeClr val="accent5"/>
+          </a:fillRef>
+          <a:effectRef idx="0">
+            <a:schemeClr val="accent5"/>
+          </a:effectRef>
+          <a:fontRef idx="minor">
+            <a:schemeClr val="lt1"/>
+          </a:fontRef>
+        </p:style>
+        <p:txBody>
+          <a:bodyPr rtlCol="0" anchor="ctr"/>
+          <a:lstStyle/>
+          <a:p>
+            <a:pPr algn="ctr"/>
+            <a:endParaRPr lang="en-US"/>
+          </a:p>
+        </p:txBody>
+      </p:sp>
+      <p:sp>
+        <p:nvSpPr>
+          <p:cNvPr id="20" name="TextBox 19">
+            <a:extLst>
+              <a:ext uri="{FF2B5EF4-FFF2-40B4-BE49-F238E27FC236}">
+                <a16:creationId xmlns:a16="http://schemas.microsoft.com/office/drawing/2014/main" id="{3237ED74-5977-3653-EA59-B37332BBF109}"/>
+              </a:ext>
+            </a:extLst>
+          </p:cNvPr>
+          <p:cNvSpPr txBox="1"/>
+          <p:nvPr/>
+        </p:nvSpPr>
+        <p:spPr>
+          <a:xfrm>
+            <a:off x="6128829" y="3337064"/>
+            <a:ext cx="2435667" cy="369332"/>
+          </a:xfrm>
+          <a:prstGeom prst="rect">
+            <a:avLst/>
+          </a:prstGeom>
+          <a:noFill/>
+        </p:spPr>
+        <p:txBody>
+          <a:bodyPr wrap="none" rtlCol="0">
+            <a:spAutoFit/>
+          </a:bodyPr>
+          <a:lstStyle/>
+          <a:p>
+            <a:r>
+              <a:rPr lang="en-US" dirty="0"/>
+              <a:t>On GitHub (Browser)</a:t>
+            </a:r>
+          </a:p>
+        </p:txBody>
+      </p:sp>
+      <p:sp>
+        <p:nvSpPr>
+          <p:cNvPr id="21" name="TextBox 20">
+            <a:extLst>
+              <a:ext uri="{FF2B5EF4-FFF2-40B4-BE49-F238E27FC236}">
+                <a16:creationId xmlns:a16="http://schemas.microsoft.com/office/drawing/2014/main" id="{89223112-2D70-FE4F-8FC4-B411494E2586}"/>
+              </a:ext>
+            </a:extLst>
+          </p:cNvPr>
+          <p:cNvSpPr txBox="1"/>
+          <p:nvPr/>
+        </p:nvSpPr>
+        <p:spPr>
+          <a:xfrm>
+            <a:off x="5578999" y="3845683"/>
+            <a:ext cx="2985497" cy="369332"/>
+          </a:xfrm>
+          <a:prstGeom prst="rect">
+            <a:avLst/>
+          </a:prstGeom>
+          <a:noFill/>
+        </p:spPr>
+        <p:txBody>
+          <a:bodyPr wrap="none" rtlCol="0">
+            <a:spAutoFit/>
+          </a:bodyPr>
+          <a:lstStyle/>
+          <a:p>
+            <a:r>
+              <a:rPr lang="en-US" dirty="0"/>
+              <a:t>On Your Machine (git/CLI)</a:t>
+            </a:r>
+          </a:p>
+        </p:txBody>
+      </p:sp>
+      <p:sp>
+        <p:nvSpPr>
+          <p:cNvPr id="22" name="TextBox 21">
+            <a:extLst>
+              <a:ext uri="{FF2B5EF4-FFF2-40B4-BE49-F238E27FC236}">
+                <a16:creationId xmlns:a16="http://schemas.microsoft.com/office/drawing/2014/main" id="{18836F01-5EB9-DA15-F69A-5DA37C913F02}"/>
+              </a:ext>
+            </a:extLst>
+          </p:cNvPr>
+          <p:cNvSpPr txBox="1"/>
+          <p:nvPr/>
+        </p:nvSpPr>
+        <p:spPr>
+          <a:xfrm>
+            <a:off x="2421866" y="3330463"/>
+            <a:ext cx="1013419" cy="369332"/>
+          </a:xfrm>
+          <a:prstGeom prst="rect">
+            <a:avLst/>
+          </a:prstGeom>
+          <a:noFill/>
+        </p:spPr>
+        <p:txBody>
+          <a:bodyPr wrap="none" rtlCol="0">
+            <a:spAutoFit/>
+          </a:bodyPr>
+          <a:lstStyle/>
+          <a:p>
+            <a:r>
+              <a:rPr lang="en-US" dirty="0"/>
+              <a:t>Remote</a:t>
+            </a:r>
+          </a:p>
+        </p:txBody>
+      </p:sp>
+      <p:sp>
+        <p:nvSpPr>
+          <p:cNvPr id="23" name="TextBox 22">
+            <a:extLst>
+              <a:ext uri="{FF2B5EF4-FFF2-40B4-BE49-F238E27FC236}">
+                <a16:creationId xmlns:a16="http://schemas.microsoft.com/office/drawing/2014/main" id="{91A6F7C2-13DC-58B2-554D-D032E1DBB748}"/>
+              </a:ext>
+            </a:extLst>
+          </p:cNvPr>
+          <p:cNvSpPr txBox="1"/>
+          <p:nvPr/>
+        </p:nvSpPr>
+        <p:spPr>
+          <a:xfrm>
+            <a:off x="2564741" y="3872189"/>
+            <a:ext cx="748923" cy="369332"/>
+          </a:xfrm>
+          <a:prstGeom prst="rect">
+            <a:avLst/>
+          </a:prstGeom>
+          <a:noFill/>
+        </p:spPr>
+        <p:txBody>
+          <a:bodyPr wrap="none" rtlCol="0">
+            <a:spAutoFit/>
+          </a:bodyPr>
+          <a:lstStyle/>
+          <a:p>
+            <a:r>
+              <a:rPr lang="en-US" dirty="0"/>
+              <a:t>Local</a:t>
+            </a:r>
+          </a:p>
+        </p:txBody>
+      </p:sp>
+      <p:cxnSp>
+        <p:nvCxnSpPr>
+          <p:cNvPr id="24" name="Curved Connector 23">
+            <a:extLst>
+              <a:ext uri="{FF2B5EF4-FFF2-40B4-BE49-F238E27FC236}">
+                <a16:creationId xmlns:a16="http://schemas.microsoft.com/office/drawing/2014/main" id="{1427B05F-2E59-6D2E-DE30-FFEE8BD3CE6D}"/>
+              </a:ext>
+            </a:extLst>
+          </p:cNvPr>
+          <p:cNvCxnSpPr>
+            <a:cxnSpLocks/>
+          </p:cNvCxnSpPr>
+          <p:nvPr/>
+        </p:nvCxnSpPr>
+        <p:spPr>
+          <a:xfrm rot="5400000" flipH="1" flipV="1">
+            <a:off x="5777131" y="149525"/>
+            <a:ext cx="19660" cy="2734056"/>
+          </a:xfrm>
+          <a:prstGeom prst="curvedConnector3">
+            <a:avLst>
+              <a:gd name="adj1" fmla="val 1838622"/>
+            </a:avLst>
+          </a:prstGeom>
+          <a:ln w="63500">
+            <a:solidFill>
+              <a:schemeClr val="accent4"/>
+            </a:solidFill>
+            <a:prstDash val="sysDot"/>
+            <a:tailEnd type="triangle"/>
+          </a:ln>
+        </p:spPr>
+        <p:style>
+          <a:lnRef idx="2">
+            <a:schemeClr val="accent1"/>
+          </a:lnRef>
+          <a:fillRef idx="0">
+            <a:schemeClr val="accent1"/>
+          </a:fillRef>
+          <a:effectRef idx="1">
+            <a:schemeClr val="accent1"/>
+          </a:effectRef>
+          <a:fontRef idx="minor">
+            <a:schemeClr val="tx1"/>
+          </a:fontRef>
+        </p:style>
+      </p:cxnSp>
+      <p:cxnSp>
+        <p:nvCxnSpPr>
+          <p:cNvPr id="25" name="Curved Connector 24">
+            <a:extLst>
+              <a:ext uri="{FF2B5EF4-FFF2-40B4-BE49-F238E27FC236}">
+                <a16:creationId xmlns:a16="http://schemas.microsoft.com/office/drawing/2014/main" id="{570DE214-2E3A-09A2-F0A7-593389DCFB45}"/>
+              </a:ext>
+            </a:extLst>
+          </p:cNvPr>
+          <p:cNvCxnSpPr>
+            <a:cxnSpLocks/>
+          </p:cNvCxnSpPr>
+          <p:nvPr/>
+        </p:nvCxnSpPr>
+        <p:spPr>
+          <a:xfrm rot="10800000" flipH="1">
+            <a:off x="3719761" y="2126548"/>
+            <a:ext cx="21649" cy="2932304"/>
+          </a:xfrm>
+          <a:prstGeom prst="curvedConnector3">
+            <a:avLst>
+              <a:gd name="adj1" fmla="val -1055938"/>
+            </a:avLst>
+          </a:prstGeom>
+          <a:ln w="63500">
+            <a:solidFill>
+              <a:schemeClr val="accent4"/>
+            </a:solidFill>
+            <a:prstDash val="sysDot"/>
+            <a:tailEnd type="triangle"/>
+          </a:ln>
+        </p:spPr>
+        <p:style>
+          <a:lnRef idx="2">
+            <a:schemeClr val="accent1"/>
+          </a:lnRef>
+          <a:fillRef idx="0">
+            <a:schemeClr val="accent1"/>
+          </a:fillRef>
+          <a:effectRef idx="1">
+            <a:schemeClr val="accent1"/>
+          </a:effectRef>
+          <a:fontRef idx="minor">
+            <a:schemeClr val="tx1"/>
+          </a:fontRef>
+        </p:style>
+      </p:cxnSp>
+      <p:cxnSp>
+        <p:nvCxnSpPr>
+          <p:cNvPr id="26" name="Straight Connector 25">
+            <a:extLst>
+              <a:ext uri="{FF2B5EF4-FFF2-40B4-BE49-F238E27FC236}">
+                <a16:creationId xmlns:a16="http://schemas.microsoft.com/office/drawing/2014/main" id="{CE895954-CFC6-00C7-8A2A-1ACE5F45D4CF}"/>
+              </a:ext>
+            </a:extLst>
+          </p:cNvPr>
+          <p:cNvCxnSpPr>
+            <a:endCxn id="27" idx="2"/>
+          </p:cNvCxnSpPr>
+          <p:nvPr/>
+        </p:nvCxnSpPr>
+        <p:spPr>
+          <a:xfrm flipV="1">
+            <a:off x="4242703" y="2032281"/>
+            <a:ext cx="105890" cy="3288"/>
+          </a:xfrm>
+          <a:prstGeom prst="line">
+            <a:avLst/>
+          </a:prstGeom>
+          <a:ln>
+            <a:solidFill>
+              <a:schemeClr val="tx1"/>
+            </a:solidFill>
+          </a:ln>
+        </p:spPr>
+        <p:style>
+          <a:lnRef idx="3">
+            <a:schemeClr val="accent5"/>
+          </a:lnRef>
+          <a:fillRef idx="0">
+            <a:schemeClr val="accent5"/>
+          </a:fillRef>
+          <a:effectRef idx="2">
+            <a:schemeClr val="accent5"/>
+          </a:effectRef>
+          <a:fontRef idx="minor">
+            <a:schemeClr val="tx1"/>
+          </a:fontRef>
+        </p:style>
+      </p:cxnSp>
+      <p:sp>
+        <p:nvSpPr>
+          <p:cNvPr id="27" name="Oval 26">
+            <a:extLst>
+              <a:ext uri="{FF2B5EF4-FFF2-40B4-BE49-F238E27FC236}">
+                <a16:creationId xmlns:a16="http://schemas.microsoft.com/office/drawing/2014/main" id="{FE8807C8-6AEA-170B-3A8C-4AD10A49DA34}"/>
+              </a:ext>
+            </a:extLst>
+          </p:cNvPr>
+          <p:cNvSpPr/>
+          <p:nvPr/>
+        </p:nvSpPr>
+        <p:spPr>
+          <a:xfrm>
+            <a:off x="4348593" y="1962238"/>
+            <a:ext cx="140086" cy="140086"/>
+          </a:xfrm>
+          <a:prstGeom prst="ellipse">
+            <a:avLst/>
+          </a:prstGeom>
+          <a:solidFill>
+            <a:srgbClr val="00B050"/>
+          </a:solidFill>
+          <a:ln>
+            <a:solidFill>
+              <a:schemeClr val="tx1"/>
+            </a:solidFill>
+          </a:ln>
+        </p:spPr>
+        <p:style>
+          <a:lnRef idx="2">
+            <a:schemeClr val="accent5">
+              <a:shade val="50000"/>
+            </a:schemeClr>
+          </a:lnRef>
+          <a:fillRef idx="1">
+            <a:schemeClr val="accent5"/>
+          </a:fillRef>
+          <a:effectRef idx="0">
+            <a:schemeClr val="accent5"/>
+          </a:effectRef>
+          <a:fontRef idx="minor">
+            <a:schemeClr val="lt1"/>
+          </a:fontRef>
+        </p:style>
+        <p:txBody>
+          <a:bodyPr rtlCol="0" anchor="ctr"/>
+          <a:lstStyle/>
+          <a:p>
+            <a:pPr algn="ctr"/>
+            <a:endParaRPr lang="en-US"/>
+          </a:p>
+        </p:txBody>
+      </p:sp>
+      <p:cxnSp>
+        <p:nvCxnSpPr>
+          <p:cNvPr id="28" name="Straight Connector 27">
+            <a:extLst>
+              <a:ext uri="{FF2B5EF4-FFF2-40B4-BE49-F238E27FC236}">
+                <a16:creationId xmlns:a16="http://schemas.microsoft.com/office/drawing/2014/main" id="{D751C283-931F-F96C-126F-D04F74628287}"/>
+              </a:ext>
+            </a:extLst>
+          </p:cNvPr>
+          <p:cNvCxnSpPr>
+            <a:endCxn id="29" idx="2"/>
+          </p:cNvCxnSpPr>
+          <p:nvPr/>
+        </p:nvCxnSpPr>
+        <p:spPr>
+          <a:xfrm flipV="1">
+            <a:off x="6962670" y="2030324"/>
+            <a:ext cx="105890" cy="3288"/>
+          </a:xfrm>
+          <a:prstGeom prst="line">
+            <a:avLst/>
+          </a:prstGeom>
+          <a:ln>
+            <a:solidFill>
+              <a:schemeClr val="tx1"/>
+            </a:solidFill>
+          </a:ln>
+        </p:spPr>
+        <p:style>
+          <a:lnRef idx="3">
+            <a:schemeClr val="accent5"/>
+          </a:lnRef>
+          <a:fillRef idx="0">
+            <a:schemeClr val="accent5"/>
+          </a:fillRef>
+          <a:effectRef idx="2">
+            <a:schemeClr val="accent5"/>
+          </a:effectRef>
+          <a:fontRef idx="minor">
+            <a:schemeClr val="tx1"/>
+          </a:fontRef>
+        </p:style>
+      </p:cxnSp>
+      <p:sp>
+        <p:nvSpPr>
+          <p:cNvPr id="29" name="Oval 28">
+            <a:extLst>
+              <a:ext uri="{FF2B5EF4-FFF2-40B4-BE49-F238E27FC236}">
+                <a16:creationId xmlns:a16="http://schemas.microsoft.com/office/drawing/2014/main" id="{CE4994B9-9ED5-92E4-6F7C-1422248D7C2F}"/>
+              </a:ext>
+            </a:extLst>
+          </p:cNvPr>
+          <p:cNvSpPr/>
+          <p:nvPr/>
+        </p:nvSpPr>
+        <p:spPr>
+          <a:xfrm>
+            <a:off x="7068560" y="1960281"/>
+            <a:ext cx="140086" cy="140086"/>
+          </a:xfrm>
+          <a:prstGeom prst="ellipse">
+            <a:avLst/>
+          </a:prstGeom>
+          <a:solidFill>
+            <a:srgbClr val="00B050"/>
+          </a:solidFill>
+          <a:ln>
+            <a:solidFill>
+              <a:schemeClr val="tx1"/>
+            </a:solidFill>
+          </a:ln>
+        </p:spPr>
+        <p:style>
+          <a:lnRef idx="2">
+            <a:schemeClr val="accent5">
+              <a:shade val="50000"/>
+            </a:schemeClr>
+          </a:lnRef>
+          <a:fillRef idx="1">
+            <a:schemeClr val="accent5"/>
+          </a:fillRef>
+          <a:effectRef idx="0">
+            <a:schemeClr val="accent5"/>
+          </a:effectRef>
+          <a:fontRef idx="minor">
+            <a:schemeClr val="lt1"/>
+          </a:fontRef>
+        </p:style>
+        <p:txBody>
+          <a:bodyPr rtlCol="0" anchor="ctr"/>
+          <a:lstStyle/>
+          <a:p>
+            <a:pPr algn="ctr"/>
+            <a:endParaRPr lang="en-US"/>
+          </a:p>
+        </p:txBody>
+      </p:sp>
+      <p:cxnSp>
+        <p:nvCxnSpPr>
+          <p:cNvPr id="30" name="Straight Connector 29">
+            <a:extLst>
+              <a:ext uri="{FF2B5EF4-FFF2-40B4-BE49-F238E27FC236}">
+                <a16:creationId xmlns:a16="http://schemas.microsoft.com/office/drawing/2014/main" id="{9800AD63-CA12-5169-2DE4-77CB2955027E}"/>
+              </a:ext>
+            </a:extLst>
+          </p:cNvPr>
+          <p:cNvCxnSpPr>
+            <a:endCxn id="31" idx="2"/>
+          </p:cNvCxnSpPr>
+          <p:nvPr/>
+        </p:nvCxnSpPr>
+        <p:spPr>
+          <a:xfrm flipV="1">
+            <a:off x="4236263" y="4736196"/>
+            <a:ext cx="105890" cy="3288"/>
+          </a:xfrm>
+          <a:prstGeom prst="line">
+            <a:avLst/>
+          </a:prstGeom>
+          <a:ln>
+            <a:solidFill>
+              <a:schemeClr val="tx1"/>
+            </a:solidFill>
+          </a:ln>
+        </p:spPr>
+        <p:style>
+          <a:lnRef idx="3">
+            <a:schemeClr val="accent5"/>
+          </a:lnRef>
+          <a:fillRef idx="0">
+            <a:schemeClr val="accent5"/>
+          </a:fillRef>
+          <a:effectRef idx="2">
+            <a:schemeClr val="accent5"/>
+          </a:effectRef>
+          <a:fontRef idx="minor">
+            <a:schemeClr val="tx1"/>
+          </a:fontRef>
+        </p:style>
+      </p:cxnSp>
+      <p:sp>
+        <p:nvSpPr>
+          <p:cNvPr id="31" name="Oval 30">
+            <a:extLst>
+              <a:ext uri="{FF2B5EF4-FFF2-40B4-BE49-F238E27FC236}">
+                <a16:creationId xmlns:a16="http://schemas.microsoft.com/office/drawing/2014/main" id="{C1A05DA3-1359-E63B-540D-5C8A7B623693}"/>
+              </a:ext>
+            </a:extLst>
+          </p:cNvPr>
+          <p:cNvSpPr/>
+          <p:nvPr/>
+        </p:nvSpPr>
+        <p:spPr>
+          <a:xfrm>
+            <a:off x="4342153" y="4666153"/>
+            <a:ext cx="140086" cy="140086"/>
+          </a:xfrm>
+          <a:prstGeom prst="ellipse">
+            <a:avLst/>
+          </a:prstGeom>
+          <a:solidFill>
+            <a:srgbClr val="00B050"/>
+          </a:solidFill>
+          <a:ln>
+            <a:solidFill>
+              <a:schemeClr val="tx1"/>
+            </a:solidFill>
+          </a:ln>
+        </p:spPr>
+        <p:style>
+          <a:lnRef idx="2">
+            <a:schemeClr val="accent5">
+              <a:shade val="50000"/>
+            </a:schemeClr>
+          </a:lnRef>
+          <a:fillRef idx="1">
+            <a:schemeClr val="accent5"/>
+          </a:fillRef>
+          <a:effectRef idx="0">
+            <a:schemeClr val="accent5"/>
+          </a:effectRef>
+          <a:fontRef idx="minor">
+            <a:schemeClr val="lt1"/>
+          </a:fontRef>
+        </p:style>
+        <p:txBody>
+          <a:bodyPr rtlCol="0" anchor="ctr"/>
+          <a:lstStyle/>
+          <a:p>
+            <a:pPr algn="ctr"/>
+            <a:endParaRPr lang="en-US"/>
+          </a:p>
+        </p:txBody>
+      </p:sp>
+      <p:sp>
+        <p:nvSpPr>
+          <p:cNvPr id="32" name="Rounded Rectangle 31">
+            <a:extLst>
+              <a:ext uri="{FF2B5EF4-FFF2-40B4-BE49-F238E27FC236}">
+                <a16:creationId xmlns:a16="http://schemas.microsoft.com/office/drawing/2014/main" id="{2844D770-13E9-863C-75C1-383AF2A9AD1F}"/>
+              </a:ext>
+            </a:extLst>
+          </p:cNvPr>
+          <p:cNvSpPr/>
+          <p:nvPr/>
+        </p:nvSpPr>
+        <p:spPr>
+          <a:xfrm>
+            <a:off x="6822584" y="4226994"/>
+            <a:ext cx="1471845" cy="239921"/>
+          </a:xfrm>
+          <a:prstGeom prst="roundRect">
+            <a:avLst/>
+          </a:prstGeom>
+        </p:spPr>
+        <p:style>
+          <a:lnRef idx="3">
+            <a:schemeClr val="lt1"/>
+          </a:lnRef>
+          <a:fillRef idx="1">
+            <a:schemeClr val="accent3"/>
+          </a:fillRef>
+          <a:effectRef idx="1">
+            <a:schemeClr val="accent3"/>
+          </a:effectRef>
+          <a:fontRef idx="minor">
+            <a:schemeClr val="lt1"/>
+          </a:fontRef>
+        </p:style>
+        <p:txBody>
+          <a:bodyPr rtlCol="0" anchor="ctr"/>
+          <a:lstStyle/>
+          <a:p>
+            <a:pPr algn="ctr"/>
+            <a:r>
+              <a:rPr lang="en-US" sz="1200" dirty="0"/>
+              <a:t>main branch</a:t>
+            </a:r>
+          </a:p>
+        </p:txBody>
+      </p:sp>
+      <p:sp>
+        <p:nvSpPr>
+          <p:cNvPr id="33" name="Parallelogram 32">
+            <a:extLst>
+              <a:ext uri="{FF2B5EF4-FFF2-40B4-BE49-F238E27FC236}">
+                <a16:creationId xmlns:a16="http://schemas.microsoft.com/office/drawing/2014/main" id="{8384C9FC-7B6B-2AC6-7EEE-EFB0469E3503}"/>
+              </a:ext>
+            </a:extLst>
+          </p:cNvPr>
+          <p:cNvSpPr/>
+          <p:nvPr/>
+        </p:nvSpPr>
+        <p:spPr>
+          <a:xfrm>
+            <a:off x="5988209" y="4936620"/>
+            <a:ext cx="1104476" cy="587856"/>
+          </a:xfrm>
+          <a:prstGeom prst="parallelogram">
+            <a:avLst/>
+          </a:prstGeom>
+        </p:spPr>
+        <p:style>
+          <a:lnRef idx="1">
+            <a:schemeClr val="accent1"/>
+          </a:lnRef>
+          <a:fillRef idx="3">
+            <a:schemeClr val="accent1"/>
+          </a:fillRef>
+          <a:effectRef idx="2">
+            <a:schemeClr val="accent1"/>
+          </a:effectRef>
+          <a:fontRef idx="minor">
+            <a:schemeClr val="lt1"/>
+          </a:fontRef>
+        </p:style>
+        <p:txBody>
+          <a:bodyPr rtlCol="0" anchor="ctr"/>
+          <a:lstStyle/>
+          <a:p>
+            <a:pPr algn="ctr"/>
+            <a:endParaRPr lang="en-US" dirty="0">
+              <a:solidFill>
+                <a:srgbClr val="000000"/>
+              </a:solidFill>
+            </a:endParaRPr>
+          </a:p>
+        </p:txBody>
+      </p:sp>
+      <p:sp>
+        <p:nvSpPr>
+          <p:cNvPr id="34" name="Rounded Rectangle 33">
+            <a:extLst>
+              <a:ext uri="{FF2B5EF4-FFF2-40B4-BE49-F238E27FC236}">
+                <a16:creationId xmlns:a16="http://schemas.microsoft.com/office/drawing/2014/main" id="{2D623027-A2A4-C7CD-F94C-90F19A0EADA3}"/>
+              </a:ext>
+            </a:extLst>
+          </p:cNvPr>
+          <p:cNvSpPr/>
+          <p:nvPr/>
+        </p:nvSpPr>
+        <p:spPr>
+          <a:xfrm>
+            <a:off x="6246942" y="5104497"/>
+            <a:ext cx="526199" cy="239921"/>
+          </a:xfrm>
+          <a:prstGeom prst="roundRect">
+            <a:avLst/>
+          </a:prstGeom>
+        </p:spPr>
+        <p:style>
+          <a:lnRef idx="3">
+            <a:schemeClr val="lt1"/>
+          </a:lnRef>
+          <a:fillRef idx="1">
+            <a:schemeClr val="accent4"/>
+          </a:fillRef>
+          <a:effectRef idx="1">
+            <a:schemeClr val="accent4"/>
+          </a:effectRef>
+          <a:fontRef idx="minor">
+            <a:schemeClr val="lt1"/>
+          </a:fontRef>
+        </p:style>
+        <p:txBody>
+          <a:bodyPr rtlCol="0" anchor="ctr"/>
+          <a:lstStyle/>
+          <a:p>
+            <a:pPr algn="ctr"/>
+            <a:endParaRPr lang="en-US" sz="1200" dirty="0"/>
+          </a:p>
+        </p:txBody>
+      </p:sp>
+      <p:sp>
+        <p:nvSpPr>
+          <p:cNvPr id="35" name="Oval 34">
+            <a:extLst>
+              <a:ext uri="{FF2B5EF4-FFF2-40B4-BE49-F238E27FC236}">
+                <a16:creationId xmlns:a16="http://schemas.microsoft.com/office/drawing/2014/main" id="{A5448CEF-EB52-CE8E-8AD1-F8D5AFEF4CA0}"/>
+              </a:ext>
+            </a:extLst>
+          </p:cNvPr>
+          <p:cNvSpPr/>
+          <p:nvPr/>
+        </p:nvSpPr>
+        <p:spPr>
+          <a:xfrm>
+            <a:off x="6454470" y="5165484"/>
+            <a:ext cx="140086" cy="140086"/>
+          </a:xfrm>
+          <a:prstGeom prst="ellipse">
+            <a:avLst/>
+          </a:prstGeom>
+          <a:solidFill>
+            <a:schemeClr val="accent5">
+              <a:lumMod val="60000"/>
+              <a:lumOff val="40000"/>
+            </a:schemeClr>
+          </a:solidFill>
+          <a:ln>
+            <a:solidFill>
+              <a:schemeClr val="tx1"/>
+            </a:solidFill>
+          </a:ln>
+        </p:spPr>
+        <p:style>
+          <a:lnRef idx="2">
+            <a:schemeClr val="accent5">
+              <a:shade val="50000"/>
+            </a:schemeClr>
+          </a:lnRef>
+          <a:fillRef idx="1">
+            <a:schemeClr val="accent5"/>
+          </a:fillRef>
+          <a:effectRef idx="0">
+            <a:schemeClr val="accent5"/>
+          </a:effectRef>
+          <a:fontRef idx="minor">
+            <a:schemeClr val="lt1"/>
+          </a:fontRef>
+        </p:style>
+        <p:txBody>
+          <a:bodyPr rtlCol="0" anchor="ctr"/>
+          <a:lstStyle/>
+          <a:p>
+            <a:pPr algn="ctr"/>
+            <a:endParaRPr lang="en-US"/>
+          </a:p>
+        </p:txBody>
+      </p:sp>
+      <p:sp>
+        <p:nvSpPr>
+          <p:cNvPr id="36" name="Rounded Rectangle 35">
+            <a:extLst>
+              <a:ext uri="{FF2B5EF4-FFF2-40B4-BE49-F238E27FC236}">
+                <a16:creationId xmlns:a16="http://schemas.microsoft.com/office/drawing/2014/main" id="{A5E77E62-C950-0C75-38AE-05CC99696E6B}"/>
+              </a:ext>
+            </a:extLst>
+          </p:cNvPr>
+          <p:cNvSpPr/>
+          <p:nvPr/>
+        </p:nvSpPr>
+        <p:spPr>
+          <a:xfrm>
+            <a:off x="4166220" y="5551566"/>
+            <a:ext cx="871375" cy="210376"/>
+          </a:xfrm>
+          <a:prstGeom prst="roundRect">
+            <a:avLst/>
+          </a:prstGeom>
+        </p:spPr>
+        <p:style>
+          <a:lnRef idx="3">
+            <a:schemeClr val="lt1"/>
+          </a:lnRef>
+          <a:fillRef idx="1">
+            <a:schemeClr val="accent5"/>
+          </a:fillRef>
+          <a:effectRef idx="1">
+            <a:schemeClr val="accent5"/>
+          </a:effectRef>
+          <a:fontRef idx="minor">
+            <a:schemeClr val="lt1"/>
+          </a:fontRef>
+        </p:style>
+        <p:txBody>
+          <a:bodyPr rtlCol="0" anchor="ctr"/>
+          <a:lstStyle/>
+          <a:p>
+            <a:pPr algn="ctr"/>
+            <a:r>
+              <a:rPr lang="en-US" sz="1400" dirty="0"/>
+              <a:t>Stage</a:t>
+            </a:r>
+          </a:p>
+        </p:txBody>
+      </p:sp>
+      <p:sp>
+        <p:nvSpPr>
+          <p:cNvPr id="37" name="TextBox 36">
+            <a:extLst>
+              <a:ext uri="{FF2B5EF4-FFF2-40B4-BE49-F238E27FC236}">
+                <a16:creationId xmlns:a16="http://schemas.microsoft.com/office/drawing/2014/main" id="{A8B3730B-1F18-717C-8F97-9D1CE1E43B52}"/>
+              </a:ext>
+            </a:extLst>
+          </p:cNvPr>
+          <p:cNvSpPr txBox="1"/>
+          <p:nvPr/>
+        </p:nvSpPr>
+        <p:spPr>
+          <a:xfrm>
+            <a:off x="6100253" y="4663523"/>
+            <a:ext cx="1056700" cy="307777"/>
+          </a:xfrm>
+          <a:prstGeom prst="rect">
+            <a:avLst/>
+          </a:prstGeom>
+          <a:noFill/>
+        </p:spPr>
+        <p:txBody>
+          <a:bodyPr wrap="none" rtlCol="0">
+            <a:spAutoFit/>
+          </a:bodyPr>
+          <a:lstStyle/>
+          <a:p>
+            <a:r>
+              <a:rPr lang="en-US" sz="1400" dirty="0"/>
+              <a:t>Local Files</a:t>
+            </a:r>
+          </a:p>
+        </p:txBody>
+      </p:sp>
+      <p:cxnSp>
+        <p:nvCxnSpPr>
+          <p:cNvPr id="38" name="Straight Connector 37">
+            <a:extLst>
+              <a:ext uri="{FF2B5EF4-FFF2-40B4-BE49-F238E27FC236}">
+                <a16:creationId xmlns:a16="http://schemas.microsoft.com/office/drawing/2014/main" id="{EB4E4B06-E4C9-A215-8628-B074EDCEC4E6}"/>
+              </a:ext>
+            </a:extLst>
+          </p:cNvPr>
+          <p:cNvCxnSpPr/>
+          <p:nvPr/>
+        </p:nvCxnSpPr>
+        <p:spPr>
+          <a:xfrm flipV="1">
+            <a:off x="7215083" y="2025558"/>
+            <a:ext cx="105890" cy="3288"/>
+          </a:xfrm>
+          <a:prstGeom prst="line">
+            <a:avLst/>
+          </a:prstGeom>
+          <a:ln>
+            <a:solidFill>
+              <a:schemeClr val="tx1"/>
+            </a:solidFill>
+          </a:ln>
+        </p:spPr>
+        <p:style>
+          <a:lnRef idx="3">
+            <a:schemeClr val="accent5"/>
+          </a:lnRef>
+          <a:fillRef idx="0">
+            <a:schemeClr val="accent5"/>
+          </a:fillRef>
+          <a:effectRef idx="2">
+            <a:schemeClr val="accent5"/>
+          </a:effectRef>
+          <a:fontRef idx="minor">
+            <a:schemeClr val="tx1"/>
+          </a:fontRef>
+        </p:style>
+      </p:cxnSp>
+      <p:sp>
+        <p:nvSpPr>
+          <p:cNvPr id="39" name="Oval 38">
+            <a:extLst>
+              <a:ext uri="{FF2B5EF4-FFF2-40B4-BE49-F238E27FC236}">
+                <a16:creationId xmlns:a16="http://schemas.microsoft.com/office/drawing/2014/main" id="{E0BDCE9E-CC3A-54B1-9DEC-1B78C6883FCC}"/>
+              </a:ext>
+            </a:extLst>
+          </p:cNvPr>
+          <p:cNvSpPr/>
+          <p:nvPr/>
+        </p:nvSpPr>
+        <p:spPr>
+          <a:xfrm>
+            <a:off x="7315599" y="1954836"/>
+            <a:ext cx="140086" cy="140086"/>
+          </a:xfrm>
+          <a:prstGeom prst="ellipse">
+            <a:avLst/>
+          </a:prstGeom>
+          <a:solidFill>
+            <a:srgbClr val="00B0F0"/>
+          </a:solidFill>
+          <a:ln>
+            <a:solidFill>
+              <a:schemeClr val="tx1"/>
+            </a:solidFill>
+          </a:ln>
+        </p:spPr>
+        <p:style>
+          <a:lnRef idx="3">
+            <a:schemeClr val="lt1"/>
+          </a:lnRef>
+          <a:fillRef idx="1">
+            <a:schemeClr val="accent6"/>
+          </a:fillRef>
+          <a:effectRef idx="1">
+            <a:schemeClr val="accent6"/>
+          </a:effectRef>
+          <a:fontRef idx="minor">
+            <a:schemeClr val="lt1"/>
+          </a:fontRef>
+        </p:style>
+        <p:txBody>
+          <a:bodyPr rtlCol="0" anchor="ctr"/>
+          <a:lstStyle/>
+          <a:p>
+            <a:pPr algn="ctr"/>
+            <a:endParaRPr lang="en-US"/>
+          </a:p>
+        </p:txBody>
+      </p:sp>
+      <p:cxnSp>
+        <p:nvCxnSpPr>
+          <p:cNvPr id="40" name="Straight Connector 39">
+            <a:extLst>
+              <a:ext uri="{FF2B5EF4-FFF2-40B4-BE49-F238E27FC236}">
+                <a16:creationId xmlns:a16="http://schemas.microsoft.com/office/drawing/2014/main" id="{484B8BF8-BAA9-5ABD-178B-0DC6844108E1}"/>
+              </a:ext>
+            </a:extLst>
+          </p:cNvPr>
+          <p:cNvCxnSpPr/>
+          <p:nvPr/>
+        </p:nvCxnSpPr>
+        <p:spPr>
+          <a:xfrm flipV="1">
+            <a:off x="4495685" y="2035080"/>
+            <a:ext cx="105890" cy="3288"/>
+          </a:xfrm>
+          <a:prstGeom prst="line">
+            <a:avLst/>
+          </a:prstGeom>
+          <a:ln>
+            <a:solidFill>
+              <a:schemeClr val="tx1"/>
+            </a:solidFill>
+          </a:ln>
+        </p:spPr>
+        <p:style>
+          <a:lnRef idx="3">
+            <a:schemeClr val="accent5"/>
+          </a:lnRef>
+          <a:fillRef idx="0">
+            <a:schemeClr val="accent5"/>
+          </a:fillRef>
+          <a:effectRef idx="2">
+            <a:schemeClr val="accent5"/>
+          </a:effectRef>
+          <a:fontRef idx="minor">
+            <a:schemeClr val="tx1"/>
+          </a:fontRef>
+        </p:style>
+      </p:cxnSp>
+      <p:sp>
+        <p:nvSpPr>
+          <p:cNvPr id="41" name="Oval 40">
+            <a:extLst>
+              <a:ext uri="{FF2B5EF4-FFF2-40B4-BE49-F238E27FC236}">
+                <a16:creationId xmlns:a16="http://schemas.microsoft.com/office/drawing/2014/main" id="{D92B3D46-C7F4-E8F5-D0C0-402F96C46710}"/>
+              </a:ext>
+            </a:extLst>
+          </p:cNvPr>
+          <p:cNvSpPr/>
+          <p:nvPr/>
+        </p:nvSpPr>
+        <p:spPr>
+          <a:xfrm>
+            <a:off x="4596201" y="1964358"/>
+            <a:ext cx="140086" cy="140086"/>
+          </a:xfrm>
+          <a:prstGeom prst="ellipse">
+            <a:avLst/>
+          </a:prstGeom>
+          <a:solidFill>
+            <a:srgbClr val="00B0F0"/>
+          </a:solidFill>
+          <a:ln>
+            <a:solidFill>
+              <a:schemeClr val="tx1"/>
+            </a:solidFill>
+          </a:ln>
+        </p:spPr>
+        <p:style>
+          <a:lnRef idx="3">
+            <a:schemeClr val="lt1"/>
+          </a:lnRef>
+          <a:fillRef idx="1">
+            <a:schemeClr val="accent6"/>
+          </a:fillRef>
+          <a:effectRef idx="1">
+            <a:schemeClr val="accent6"/>
+          </a:effectRef>
+          <a:fontRef idx="minor">
+            <a:schemeClr val="lt1"/>
+          </a:fontRef>
+        </p:style>
+        <p:txBody>
+          <a:bodyPr rtlCol="0" anchor="ctr"/>
+          <a:lstStyle/>
+          <a:p>
+            <a:pPr algn="ctr"/>
+            <a:endParaRPr lang="en-US"/>
+          </a:p>
+        </p:txBody>
+      </p:sp>
+      <p:sp>
+        <p:nvSpPr>
+          <p:cNvPr id="42" name="Up Arrow 41">
+            <a:extLst>
+              <a:ext uri="{FF2B5EF4-FFF2-40B4-BE49-F238E27FC236}">
+                <a16:creationId xmlns:a16="http://schemas.microsoft.com/office/drawing/2014/main" id="{1174AF6A-080B-84C3-3A50-60432871CF1D}"/>
+              </a:ext>
+            </a:extLst>
+          </p:cNvPr>
+          <p:cNvSpPr/>
+          <p:nvPr/>
+        </p:nvSpPr>
+        <p:spPr>
+          <a:xfrm rot="2683904" flipV="1">
+            <a:off x="5151097" y="2085623"/>
+            <a:ext cx="1363560" cy="2762219"/>
+          </a:xfrm>
+          <a:prstGeom prst="upArrow">
+            <a:avLst/>
+          </a:prstGeom>
+        </p:spPr>
+        <p:style>
+          <a:lnRef idx="3">
+            <a:schemeClr val="lt1"/>
+          </a:lnRef>
+          <a:fillRef idx="1">
+            <a:schemeClr val="accent1"/>
+          </a:fillRef>
+          <a:effectRef idx="1">
+            <a:schemeClr val="accent1"/>
+          </a:effectRef>
+          <a:fontRef idx="minor">
+            <a:schemeClr val="lt1"/>
+          </a:fontRef>
+        </p:style>
+        <p:txBody>
+          <a:bodyPr vert="vert" rtlCol="0" anchor="ctr"/>
+          <a:lstStyle/>
+          <a:p>
+            <a:pPr algn="ctr"/>
+            <a:r>
+              <a:rPr lang="en-US" sz="3200" b="1" dirty="0">
+                <a:solidFill>
+                  <a:srgbClr val="FFFF00"/>
+                </a:solidFill>
+              </a:rPr>
+              <a:t>pull</a:t>
+            </a:r>
+          </a:p>
+        </p:txBody>
+      </p:sp>
+      <p:cxnSp>
+        <p:nvCxnSpPr>
+          <p:cNvPr id="43" name="Straight Connector 42">
+            <a:extLst>
+              <a:ext uri="{FF2B5EF4-FFF2-40B4-BE49-F238E27FC236}">
+                <a16:creationId xmlns:a16="http://schemas.microsoft.com/office/drawing/2014/main" id="{AD27593D-291B-ECF7-0F45-BD29A62F3495}"/>
+              </a:ext>
+            </a:extLst>
+          </p:cNvPr>
+          <p:cNvCxnSpPr/>
+          <p:nvPr/>
+        </p:nvCxnSpPr>
+        <p:spPr>
+          <a:xfrm flipV="1">
+            <a:off x="4490919" y="4730680"/>
+            <a:ext cx="105890" cy="3288"/>
+          </a:xfrm>
+          <a:prstGeom prst="line">
+            <a:avLst/>
+          </a:prstGeom>
+          <a:ln>
+            <a:solidFill>
+              <a:schemeClr val="tx1"/>
+            </a:solidFill>
+          </a:ln>
+        </p:spPr>
+        <p:style>
+          <a:lnRef idx="3">
+            <a:schemeClr val="accent5"/>
+          </a:lnRef>
+          <a:fillRef idx="0">
+            <a:schemeClr val="accent5"/>
+          </a:fillRef>
+          <a:effectRef idx="2">
+            <a:schemeClr val="accent5"/>
+          </a:effectRef>
+          <a:fontRef idx="minor">
+            <a:schemeClr val="tx1"/>
+          </a:fontRef>
+        </p:style>
+      </p:cxnSp>
+      <p:sp>
+        <p:nvSpPr>
+          <p:cNvPr id="44" name="Oval 43">
+            <a:extLst>
+              <a:ext uri="{FF2B5EF4-FFF2-40B4-BE49-F238E27FC236}">
+                <a16:creationId xmlns:a16="http://schemas.microsoft.com/office/drawing/2014/main" id="{419AFB03-4DF6-66B4-D637-6EE6D681A4B9}"/>
+              </a:ext>
+            </a:extLst>
+          </p:cNvPr>
+          <p:cNvSpPr/>
+          <p:nvPr/>
+        </p:nvSpPr>
+        <p:spPr>
+          <a:xfrm>
+            <a:off x="4591435" y="4674246"/>
+            <a:ext cx="140086" cy="140086"/>
+          </a:xfrm>
+          <a:prstGeom prst="ellipse">
+            <a:avLst/>
+          </a:prstGeom>
+          <a:solidFill>
+            <a:srgbClr val="00B0F0"/>
+          </a:solidFill>
+          <a:ln>
+            <a:solidFill>
+              <a:schemeClr val="tx1"/>
+            </a:solidFill>
+          </a:ln>
+        </p:spPr>
+        <p:style>
+          <a:lnRef idx="3">
+            <a:schemeClr val="lt1"/>
+          </a:lnRef>
+          <a:fillRef idx="1">
+            <a:schemeClr val="accent6"/>
+          </a:fillRef>
+          <a:effectRef idx="1">
+            <a:schemeClr val="accent6"/>
+          </a:effectRef>
+          <a:fontRef idx="minor">
+            <a:schemeClr val="lt1"/>
+          </a:fontRef>
+        </p:style>
+        <p:txBody>
+          <a:bodyPr rtlCol="0" anchor="ctr"/>
+          <a:lstStyle/>
+          <a:p>
+            <a:pPr algn="ctr"/>
+            <a:endParaRPr lang="en-US"/>
+          </a:p>
+        </p:txBody>
+      </p:sp>
+      <p:sp>
+        <p:nvSpPr>
+          <p:cNvPr id="45" name="Rounded Rectangle 44">
+            <a:extLst>
+              <a:ext uri="{FF2B5EF4-FFF2-40B4-BE49-F238E27FC236}">
+                <a16:creationId xmlns:a16="http://schemas.microsoft.com/office/drawing/2014/main" id="{932745D9-79FA-4AF9-2B52-191B6DF86930}"/>
+              </a:ext>
+            </a:extLst>
+          </p:cNvPr>
+          <p:cNvSpPr/>
+          <p:nvPr/>
+        </p:nvSpPr>
+        <p:spPr>
+          <a:xfrm>
+            <a:off x="3815527" y="2217208"/>
+            <a:ext cx="1253994" cy="239921"/>
+          </a:xfrm>
+          <a:prstGeom prst="roundRect">
+            <a:avLst/>
+          </a:prstGeom>
+        </p:spPr>
+        <p:style>
+          <a:lnRef idx="3">
+            <a:schemeClr val="lt1"/>
+          </a:lnRef>
+          <a:fillRef idx="1">
+            <a:schemeClr val="accent4"/>
+          </a:fillRef>
+          <a:effectRef idx="1">
+            <a:schemeClr val="accent4"/>
+          </a:effectRef>
+          <a:fontRef idx="minor">
+            <a:schemeClr val="lt1"/>
+          </a:fontRef>
+        </p:style>
+        <p:txBody>
+          <a:bodyPr rtlCol="0" anchor="ctr"/>
+          <a:lstStyle/>
+          <a:p>
+            <a:pPr algn="ctr"/>
+            <a:endParaRPr lang="en-US" sz="1200" dirty="0"/>
+          </a:p>
+        </p:txBody>
+      </p:sp>
+      <p:cxnSp>
+        <p:nvCxnSpPr>
+          <p:cNvPr id="46" name="Curved Connector 45">
+            <a:extLst>
+              <a:ext uri="{FF2B5EF4-FFF2-40B4-BE49-F238E27FC236}">
+                <a16:creationId xmlns:a16="http://schemas.microsoft.com/office/drawing/2014/main" id="{4F739E63-9015-D9BE-7BF1-C7E8594D1F1B}"/>
+              </a:ext>
+            </a:extLst>
+          </p:cNvPr>
+          <p:cNvCxnSpPr>
+            <a:cxnSpLocks/>
+          </p:cNvCxnSpPr>
+          <p:nvPr/>
+        </p:nvCxnSpPr>
+        <p:spPr>
+          <a:xfrm rot="16200000" flipH="1">
+            <a:off x="4378089" y="2130456"/>
+            <a:ext cx="238783" cy="151524"/>
+          </a:xfrm>
+          <a:prstGeom prst="curvedConnector2">
+            <a:avLst/>
+          </a:prstGeom>
+          <a:ln>
+            <a:solidFill>
+              <a:schemeClr val="tx1"/>
+            </a:solidFill>
+            <a:tailEnd type="triangle"/>
+          </a:ln>
+        </p:spPr>
+        <p:style>
+          <a:lnRef idx="2">
+            <a:schemeClr val="accent1"/>
+          </a:lnRef>
+          <a:fillRef idx="0">
+            <a:schemeClr val="accent1"/>
+          </a:fillRef>
+          <a:effectRef idx="1">
+            <a:schemeClr val="accent1"/>
+          </a:effectRef>
+          <a:fontRef idx="minor">
+            <a:schemeClr val="tx1"/>
+          </a:fontRef>
+        </p:style>
+      </p:cxnSp>
+      <p:sp>
+        <p:nvSpPr>
+          <p:cNvPr id="47" name="Oval 46">
+            <a:extLst>
+              <a:ext uri="{FF2B5EF4-FFF2-40B4-BE49-F238E27FC236}">
+                <a16:creationId xmlns:a16="http://schemas.microsoft.com/office/drawing/2014/main" id="{D4043D98-1853-C80A-EF94-1FD441ADE1DC}"/>
+              </a:ext>
+            </a:extLst>
+          </p:cNvPr>
+          <p:cNvSpPr/>
+          <p:nvPr/>
+        </p:nvSpPr>
+        <p:spPr>
+          <a:xfrm>
+            <a:off x="4577128" y="2259647"/>
+            <a:ext cx="140086" cy="140086"/>
+          </a:xfrm>
+          <a:prstGeom prst="ellipse">
+            <a:avLst/>
+          </a:prstGeom>
+          <a:solidFill>
+            <a:srgbClr val="00B0F0"/>
+          </a:solidFill>
+          <a:ln>
+            <a:solidFill>
+              <a:schemeClr val="tx1"/>
+            </a:solidFill>
+          </a:ln>
+        </p:spPr>
+        <p:style>
+          <a:lnRef idx="3">
+            <a:schemeClr val="lt1"/>
+          </a:lnRef>
+          <a:fillRef idx="1">
+            <a:schemeClr val="accent6"/>
+          </a:fillRef>
+          <a:effectRef idx="1">
+            <a:schemeClr val="accent6"/>
+          </a:effectRef>
+          <a:fontRef idx="minor">
+            <a:schemeClr val="lt1"/>
+          </a:fontRef>
+        </p:style>
+        <p:txBody>
+          <a:bodyPr rtlCol="0" anchor="ctr"/>
+          <a:lstStyle/>
+          <a:p>
+            <a:pPr algn="ctr"/>
+            <a:endParaRPr lang="en-US"/>
+          </a:p>
+        </p:txBody>
+      </p:sp>
+      <p:sp>
+        <p:nvSpPr>
+          <p:cNvPr id="48" name="Rounded Rectangle 47">
+            <a:extLst>
+              <a:ext uri="{FF2B5EF4-FFF2-40B4-BE49-F238E27FC236}">
+                <a16:creationId xmlns:a16="http://schemas.microsoft.com/office/drawing/2014/main" id="{E60AF3DA-6178-0C07-C7F0-AE05470AA3AA}"/>
+              </a:ext>
+            </a:extLst>
+          </p:cNvPr>
+          <p:cNvSpPr/>
+          <p:nvPr/>
+        </p:nvSpPr>
+        <p:spPr>
+          <a:xfrm>
+            <a:off x="3806005" y="4936620"/>
+            <a:ext cx="1253994" cy="239921"/>
+          </a:xfrm>
+          <a:prstGeom prst="roundRect">
+            <a:avLst/>
+          </a:prstGeom>
+        </p:spPr>
+        <p:style>
+          <a:lnRef idx="3">
+            <a:schemeClr val="lt1"/>
+          </a:lnRef>
+          <a:fillRef idx="1">
+            <a:schemeClr val="accent4"/>
+          </a:fillRef>
+          <a:effectRef idx="1">
+            <a:schemeClr val="accent4"/>
+          </a:effectRef>
+          <a:fontRef idx="minor">
+            <a:schemeClr val="lt1"/>
+          </a:fontRef>
+        </p:style>
+        <p:txBody>
+          <a:bodyPr rtlCol="0" anchor="ctr"/>
+          <a:lstStyle/>
+          <a:p>
+            <a:pPr algn="ctr"/>
+            <a:endParaRPr lang="en-US" sz="1200" dirty="0"/>
+          </a:p>
+        </p:txBody>
+      </p:sp>
+      <p:cxnSp>
+        <p:nvCxnSpPr>
+          <p:cNvPr id="49" name="Curved Connector 48">
+            <a:extLst>
+              <a:ext uri="{FF2B5EF4-FFF2-40B4-BE49-F238E27FC236}">
+                <a16:creationId xmlns:a16="http://schemas.microsoft.com/office/drawing/2014/main" id="{CB5AD055-E56B-3A35-84E4-985093CF962D}"/>
+              </a:ext>
+            </a:extLst>
+          </p:cNvPr>
+          <p:cNvCxnSpPr>
+            <a:cxnSpLocks/>
+          </p:cNvCxnSpPr>
+          <p:nvPr/>
+        </p:nvCxnSpPr>
+        <p:spPr>
+          <a:xfrm rot="16200000" flipH="1">
+            <a:off x="4368567" y="4849868"/>
+            <a:ext cx="238783" cy="151524"/>
+          </a:xfrm>
+          <a:prstGeom prst="curvedConnector2">
+            <a:avLst/>
+          </a:prstGeom>
+          <a:ln>
+            <a:solidFill>
+              <a:schemeClr val="tx1"/>
+            </a:solidFill>
+            <a:tailEnd type="triangle"/>
+          </a:ln>
+        </p:spPr>
+        <p:style>
+          <a:lnRef idx="2">
+            <a:schemeClr val="accent1"/>
+          </a:lnRef>
+          <a:fillRef idx="0">
+            <a:schemeClr val="accent1"/>
+          </a:fillRef>
+          <a:effectRef idx="1">
+            <a:schemeClr val="accent1"/>
+          </a:effectRef>
+          <a:fontRef idx="minor">
+            <a:schemeClr val="tx1"/>
+          </a:fontRef>
+        </p:style>
+      </p:cxnSp>
+      <p:sp>
+        <p:nvSpPr>
+          <p:cNvPr id="50" name="Oval 49">
+            <a:extLst>
+              <a:ext uri="{FF2B5EF4-FFF2-40B4-BE49-F238E27FC236}">
+                <a16:creationId xmlns:a16="http://schemas.microsoft.com/office/drawing/2014/main" id="{93808A74-11ED-7EA9-C3D4-614E5CEA94C5}"/>
+              </a:ext>
+            </a:extLst>
+          </p:cNvPr>
+          <p:cNvSpPr/>
+          <p:nvPr/>
+        </p:nvSpPr>
+        <p:spPr>
+          <a:xfrm>
+            <a:off x="4567606" y="4979059"/>
+            <a:ext cx="140086" cy="140086"/>
+          </a:xfrm>
+          <a:prstGeom prst="ellipse">
+            <a:avLst/>
+          </a:prstGeom>
+          <a:solidFill>
+            <a:srgbClr val="00B0F0"/>
+          </a:solidFill>
+          <a:ln>
+            <a:solidFill>
+              <a:schemeClr val="tx1"/>
+            </a:solidFill>
+          </a:ln>
+        </p:spPr>
+        <p:style>
+          <a:lnRef idx="3">
+            <a:schemeClr val="lt1"/>
+          </a:lnRef>
+          <a:fillRef idx="1">
+            <a:schemeClr val="accent6"/>
+          </a:fillRef>
+          <a:effectRef idx="1">
+            <a:schemeClr val="accent6"/>
+          </a:effectRef>
+          <a:fontRef idx="minor">
+            <a:schemeClr val="lt1"/>
+          </a:fontRef>
+        </p:style>
+        <p:txBody>
+          <a:bodyPr rtlCol="0" anchor="ctr"/>
+          <a:lstStyle/>
+          <a:p>
+            <a:pPr algn="ctr"/>
+            <a:endParaRPr lang="en-US"/>
+          </a:p>
+        </p:txBody>
+      </p:sp>
+      <p:sp>
+        <p:nvSpPr>
+          <p:cNvPr id="51" name="Rounded Rectangle 50">
+            <a:extLst>
+              <a:ext uri="{FF2B5EF4-FFF2-40B4-BE49-F238E27FC236}">
+                <a16:creationId xmlns:a16="http://schemas.microsoft.com/office/drawing/2014/main" id="{4AA1015D-C35D-F312-3DC6-7C985374337D}"/>
+              </a:ext>
+            </a:extLst>
+          </p:cNvPr>
+          <p:cNvSpPr/>
+          <p:nvPr/>
+        </p:nvSpPr>
+        <p:spPr>
+          <a:xfrm>
+            <a:off x="6822584" y="4487772"/>
+            <a:ext cx="1471845" cy="239921"/>
+          </a:xfrm>
+          <a:prstGeom prst="roundRect">
+            <a:avLst/>
+          </a:prstGeom>
+        </p:spPr>
+        <p:style>
+          <a:lnRef idx="3">
+            <a:schemeClr val="lt1"/>
+          </a:lnRef>
+          <a:fillRef idx="1">
+            <a:schemeClr val="accent4"/>
+          </a:fillRef>
+          <a:effectRef idx="1">
+            <a:schemeClr val="accent4"/>
+          </a:effectRef>
+          <a:fontRef idx="minor">
+            <a:schemeClr val="lt1"/>
+          </a:fontRef>
+        </p:style>
+        <p:txBody>
+          <a:bodyPr rtlCol="0" anchor="ctr"/>
+          <a:lstStyle/>
+          <a:p>
+            <a:pPr algn="ctr"/>
+            <a:r>
+              <a:rPr lang="en-US" sz="1200" dirty="0"/>
+              <a:t>feature branch</a:t>
+            </a:r>
+          </a:p>
+        </p:txBody>
+      </p:sp>
+      <p:cxnSp>
+        <p:nvCxnSpPr>
+          <p:cNvPr id="53" name="Curved Connector 52">
+            <a:extLst>
+              <a:ext uri="{FF2B5EF4-FFF2-40B4-BE49-F238E27FC236}">
+                <a16:creationId xmlns:a16="http://schemas.microsoft.com/office/drawing/2014/main" id="{7C0F50D3-8D5F-2F44-A3C3-14B8EFE1B6C1}"/>
+              </a:ext>
+            </a:extLst>
+          </p:cNvPr>
+          <p:cNvCxnSpPr>
+            <a:cxnSpLocks/>
+            <a:stCxn id="2" idx="4"/>
+          </p:cNvCxnSpPr>
+          <p:nvPr/>
+        </p:nvCxnSpPr>
+        <p:spPr>
+          <a:xfrm flipV="1">
+            <a:off x="5146239" y="2701363"/>
+            <a:ext cx="2093022" cy="2357489"/>
+          </a:xfrm>
+          <a:prstGeom prst="curvedConnector2">
+            <a:avLst/>
+          </a:prstGeom>
+          <a:ln w="63500">
+            <a:solidFill>
+              <a:schemeClr val="accent4"/>
+            </a:solidFill>
+            <a:prstDash val="sysDot"/>
+            <a:tailEnd type="triangle"/>
+          </a:ln>
+        </p:spPr>
+        <p:style>
+          <a:lnRef idx="2">
+            <a:schemeClr val="accent1"/>
+          </a:lnRef>
+          <a:fillRef idx="0">
+            <a:schemeClr val="accent1"/>
+          </a:fillRef>
+          <a:effectRef idx="1">
+            <a:schemeClr val="accent1"/>
+          </a:effectRef>
+          <a:fontRef idx="minor">
+            <a:schemeClr val="tx1"/>
+          </a:fontRef>
+        </p:style>
+      </p:cxnSp>
+      <p:sp>
+        <p:nvSpPr>
+          <p:cNvPr id="54" name="Oval 53">
+            <a:extLst>
+              <a:ext uri="{FF2B5EF4-FFF2-40B4-BE49-F238E27FC236}">
+                <a16:creationId xmlns:a16="http://schemas.microsoft.com/office/drawing/2014/main" id="{961F33BF-79F6-8B86-4E56-C073EE10A724}"/>
+              </a:ext>
+            </a:extLst>
+          </p:cNvPr>
+          <p:cNvSpPr/>
+          <p:nvPr/>
+        </p:nvSpPr>
+        <p:spPr>
+          <a:xfrm>
+            <a:off x="7472759" y="1954838"/>
+            <a:ext cx="140086" cy="140086"/>
+          </a:xfrm>
+          <a:prstGeom prst="ellipse">
+            <a:avLst/>
+          </a:prstGeom>
+          <a:solidFill>
+            <a:schemeClr val="accent6">
+              <a:lumMod val="40000"/>
+              <a:lumOff val="60000"/>
+            </a:schemeClr>
+          </a:solidFill>
+          <a:ln>
+            <a:solidFill>
+              <a:schemeClr val="tx1"/>
+            </a:solidFill>
+          </a:ln>
+        </p:spPr>
+        <p:style>
+          <a:lnRef idx="3">
+            <a:schemeClr val="lt1"/>
+          </a:lnRef>
+          <a:fillRef idx="1">
+            <a:schemeClr val="accent6"/>
+          </a:fillRef>
+          <a:effectRef idx="1">
+            <a:schemeClr val="accent6"/>
+          </a:effectRef>
+          <a:fontRef idx="minor">
+            <a:schemeClr val="lt1"/>
+          </a:fontRef>
+        </p:style>
+        <p:txBody>
+          <a:bodyPr rtlCol="0" anchor="ctr"/>
+          <a:lstStyle/>
+          <a:p>
+            <a:pPr algn="ctr"/>
+            <a:endParaRPr lang="en-US"/>
+          </a:p>
+        </p:txBody>
+      </p:sp>
+      <p:sp>
+        <p:nvSpPr>
+          <p:cNvPr id="55" name="Oval 54">
+            <a:extLst>
+              <a:ext uri="{FF2B5EF4-FFF2-40B4-BE49-F238E27FC236}">
+                <a16:creationId xmlns:a16="http://schemas.microsoft.com/office/drawing/2014/main" id="{B77ADBB6-C994-3F4A-A0CA-4CF9C47ECE1E}"/>
+              </a:ext>
+            </a:extLst>
+          </p:cNvPr>
+          <p:cNvSpPr/>
+          <p:nvPr/>
+        </p:nvSpPr>
+        <p:spPr>
+          <a:xfrm>
+            <a:off x="7639447" y="1950071"/>
+            <a:ext cx="140086" cy="140086"/>
+          </a:xfrm>
+          <a:prstGeom prst="ellipse">
+            <a:avLst/>
+          </a:prstGeom>
+          <a:solidFill>
+            <a:schemeClr val="accent5">
+              <a:lumMod val="60000"/>
+              <a:lumOff val="40000"/>
+            </a:schemeClr>
+          </a:solidFill>
+          <a:ln>
+            <a:solidFill>
+              <a:schemeClr val="tx1"/>
+            </a:solidFill>
+          </a:ln>
+        </p:spPr>
+        <p:style>
+          <a:lnRef idx="3">
+            <a:schemeClr val="lt1"/>
+          </a:lnRef>
+          <a:fillRef idx="1">
+            <a:schemeClr val="accent6"/>
+          </a:fillRef>
+          <a:effectRef idx="1">
+            <a:schemeClr val="accent6"/>
+          </a:effectRef>
+          <a:fontRef idx="minor">
+            <a:schemeClr val="lt1"/>
+          </a:fontRef>
+        </p:style>
+        <p:txBody>
+          <a:bodyPr rtlCol="0" anchor="ctr"/>
+          <a:lstStyle/>
+          <a:p>
+            <a:pPr algn="ctr"/>
+            <a:endParaRPr lang="en-US"/>
+          </a:p>
+        </p:txBody>
+      </p:sp>
+      <p:sp>
+        <p:nvSpPr>
+          <p:cNvPr id="56" name="Oval 55">
+            <a:extLst>
+              <a:ext uri="{FF2B5EF4-FFF2-40B4-BE49-F238E27FC236}">
+                <a16:creationId xmlns:a16="http://schemas.microsoft.com/office/drawing/2014/main" id="{3F7614D7-D0DA-1588-3795-783600B30733}"/>
+              </a:ext>
+            </a:extLst>
+          </p:cNvPr>
+          <p:cNvSpPr/>
+          <p:nvPr/>
+        </p:nvSpPr>
+        <p:spPr>
+          <a:xfrm>
+            <a:off x="4767644" y="4679003"/>
+            <a:ext cx="140086" cy="140086"/>
+          </a:xfrm>
+          <a:prstGeom prst="ellipse">
+            <a:avLst/>
+          </a:prstGeom>
+          <a:solidFill>
+            <a:schemeClr val="accent6">
+              <a:lumMod val="40000"/>
+              <a:lumOff val="60000"/>
+            </a:schemeClr>
+          </a:solidFill>
+          <a:ln>
+            <a:solidFill>
+              <a:schemeClr val="tx1"/>
+            </a:solidFill>
+          </a:ln>
+        </p:spPr>
+        <p:style>
+          <a:lnRef idx="3">
+            <a:schemeClr val="lt1"/>
+          </a:lnRef>
+          <a:fillRef idx="1">
+            <a:schemeClr val="accent6"/>
+          </a:fillRef>
+          <a:effectRef idx="1">
+            <a:schemeClr val="accent6"/>
+          </a:effectRef>
+          <a:fontRef idx="minor">
+            <a:schemeClr val="lt1"/>
+          </a:fontRef>
+        </p:style>
+        <p:txBody>
+          <a:bodyPr rtlCol="0" anchor="ctr"/>
+          <a:lstStyle/>
+          <a:p>
+            <a:pPr algn="ctr"/>
+            <a:endParaRPr lang="en-US"/>
+          </a:p>
+        </p:txBody>
+      </p:sp>
+      <p:sp>
+        <p:nvSpPr>
+          <p:cNvPr id="57" name="Oval 56">
+            <a:extLst>
+              <a:ext uri="{FF2B5EF4-FFF2-40B4-BE49-F238E27FC236}">
+                <a16:creationId xmlns:a16="http://schemas.microsoft.com/office/drawing/2014/main" id="{A3FB79E4-76C4-05EA-20AD-41DC48721BFB}"/>
+              </a:ext>
+            </a:extLst>
+          </p:cNvPr>
+          <p:cNvSpPr/>
+          <p:nvPr/>
+        </p:nvSpPr>
+        <p:spPr>
+          <a:xfrm>
+            <a:off x="4934332" y="4674236"/>
+            <a:ext cx="140086" cy="140086"/>
+          </a:xfrm>
+          <a:prstGeom prst="ellipse">
+            <a:avLst/>
+          </a:prstGeom>
+          <a:solidFill>
+            <a:schemeClr val="accent5">
+              <a:lumMod val="60000"/>
+              <a:lumOff val="40000"/>
+            </a:schemeClr>
+          </a:solidFill>
+          <a:ln>
+            <a:solidFill>
+              <a:schemeClr val="tx1"/>
+            </a:solidFill>
+          </a:ln>
+        </p:spPr>
+        <p:style>
+          <a:lnRef idx="3">
+            <a:schemeClr val="lt1"/>
+          </a:lnRef>
+          <a:fillRef idx="1">
+            <a:schemeClr val="accent6"/>
+          </a:fillRef>
+          <a:effectRef idx="1">
+            <a:schemeClr val="accent6"/>
+          </a:effectRef>
+          <a:fontRef idx="minor">
+            <a:schemeClr val="lt1"/>
+          </a:fontRef>
+        </p:style>
+        <p:txBody>
+          <a:bodyPr rtlCol="0" anchor="ctr"/>
+          <a:lstStyle/>
+          <a:p>
+            <a:pPr algn="ctr"/>
+            <a:endParaRPr lang="en-US"/>
+          </a:p>
+        </p:txBody>
+      </p:sp>
+      <p:sp>
+        <p:nvSpPr>
+          <p:cNvPr id="58" name="Oval 57">
+            <a:extLst>
+              <a:ext uri="{FF2B5EF4-FFF2-40B4-BE49-F238E27FC236}">
+                <a16:creationId xmlns:a16="http://schemas.microsoft.com/office/drawing/2014/main" id="{8A711A4D-FC20-6662-D84D-705BC85C4974}"/>
+              </a:ext>
+            </a:extLst>
+          </p:cNvPr>
+          <p:cNvSpPr/>
+          <p:nvPr/>
+        </p:nvSpPr>
+        <p:spPr>
+          <a:xfrm>
+            <a:off x="4767643" y="1964358"/>
+            <a:ext cx="140086" cy="140086"/>
+          </a:xfrm>
+          <a:prstGeom prst="ellipse">
+            <a:avLst/>
+          </a:prstGeom>
+          <a:solidFill>
+            <a:schemeClr val="accent6">
+              <a:lumMod val="40000"/>
+              <a:lumOff val="60000"/>
+            </a:schemeClr>
+          </a:solidFill>
+          <a:ln>
+            <a:solidFill>
+              <a:schemeClr val="tx1"/>
+            </a:solidFill>
+          </a:ln>
+        </p:spPr>
+        <p:style>
+          <a:lnRef idx="3">
+            <a:schemeClr val="lt1"/>
+          </a:lnRef>
+          <a:fillRef idx="1">
+            <a:schemeClr val="accent6"/>
+          </a:fillRef>
+          <a:effectRef idx="1">
+            <a:schemeClr val="accent6"/>
+          </a:effectRef>
+          <a:fontRef idx="minor">
+            <a:schemeClr val="lt1"/>
+          </a:fontRef>
+        </p:style>
+        <p:txBody>
+          <a:bodyPr rtlCol="0" anchor="ctr"/>
+          <a:lstStyle/>
+          <a:p>
+            <a:pPr algn="ctr"/>
+            <a:endParaRPr lang="en-US"/>
+          </a:p>
+        </p:txBody>
+      </p:sp>
+      <p:sp>
+        <p:nvSpPr>
+          <p:cNvPr id="59" name="Oval 58">
+            <a:extLst>
+              <a:ext uri="{FF2B5EF4-FFF2-40B4-BE49-F238E27FC236}">
+                <a16:creationId xmlns:a16="http://schemas.microsoft.com/office/drawing/2014/main" id="{318541E5-A33C-7F52-D7F7-E116DDE81EA7}"/>
+              </a:ext>
+            </a:extLst>
+          </p:cNvPr>
+          <p:cNvSpPr/>
+          <p:nvPr/>
+        </p:nvSpPr>
+        <p:spPr>
+          <a:xfrm>
+            <a:off x="4934331" y="1959591"/>
+            <a:ext cx="140086" cy="140086"/>
+          </a:xfrm>
+          <a:prstGeom prst="ellipse">
+            <a:avLst/>
+          </a:prstGeom>
+          <a:solidFill>
+            <a:schemeClr val="accent5">
+              <a:lumMod val="60000"/>
+              <a:lumOff val="40000"/>
+            </a:schemeClr>
+          </a:solidFill>
+          <a:ln>
+            <a:solidFill>
+              <a:schemeClr val="tx1"/>
+            </a:solidFill>
+          </a:ln>
+        </p:spPr>
+        <p:style>
+          <a:lnRef idx="3">
+            <a:schemeClr val="lt1"/>
+          </a:lnRef>
+          <a:fillRef idx="1">
+            <a:schemeClr val="accent6"/>
+          </a:fillRef>
+          <a:effectRef idx="1">
+            <a:schemeClr val="accent6"/>
+          </a:effectRef>
+          <a:fontRef idx="minor">
+            <a:schemeClr val="lt1"/>
+          </a:fontRef>
+        </p:style>
+        <p:txBody>
+          <a:bodyPr rtlCol="0" anchor="ctr"/>
+          <a:lstStyle/>
+          <a:p>
+            <a:pPr algn="ctr"/>
+            <a:endParaRPr lang="en-US"/>
+          </a:p>
+        </p:txBody>
+      </p:sp>
+      <p:sp>
+        <p:nvSpPr>
+          <p:cNvPr id="60" name="Right Arrow 59">
+            <a:extLst>
+              <a:ext uri="{FF2B5EF4-FFF2-40B4-BE49-F238E27FC236}">
+                <a16:creationId xmlns:a16="http://schemas.microsoft.com/office/drawing/2014/main" id="{706BE843-20E9-A0DD-FCDE-D4762CEA37EC}"/>
+              </a:ext>
+            </a:extLst>
+          </p:cNvPr>
+          <p:cNvSpPr/>
+          <p:nvPr/>
+        </p:nvSpPr>
+        <p:spPr>
+          <a:xfrm rot="1456893">
+            <a:off x="5073497" y="4727195"/>
+            <a:ext cx="1141566" cy="486914"/>
+          </a:xfrm>
+          <a:prstGeom prst="rightArrow">
+            <a:avLst/>
+          </a:prstGeom>
+        </p:spPr>
+        <p:style>
+          <a:lnRef idx="1">
+            <a:schemeClr val="accent1"/>
+          </a:lnRef>
+          <a:fillRef idx="3">
+            <a:schemeClr val="accent1"/>
+          </a:fillRef>
+          <a:effectRef idx="2">
+            <a:schemeClr val="accent1"/>
+          </a:effectRef>
+          <a:fontRef idx="minor">
+            <a:schemeClr val="lt1"/>
+          </a:fontRef>
+        </p:style>
+        <p:txBody>
+          <a:bodyPr rtlCol="0" anchor="ctr"/>
+          <a:lstStyle/>
+          <a:p>
+            <a:pPr algn="ctr"/>
+            <a:endParaRPr lang="en-US" sz="2000" b="1" dirty="0">
+              <a:solidFill>
+                <a:srgbClr val="FFFF00"/>
+              </a:solidFill>
+            </a:endParaRPr>
+          </a:p>
+        </p:txBody>
+      </p:sp>
+    </p:spTree>
+    <p:extLst>
+      <p:ext uri="{BB962C8B-B14F-4D97-AF65-F5344CB8AC3E}">
+        <p14:creationId xmlns:p14="http://schemas.microsoft.com/office/powerpoint/2010/main" val="1658481695"/>
+      </p:ext>
+    </p:extLst>
+  </p:cSld>
+  <p:clrMapOvr>
+    <a:masterClrMapping/>
+  </p:clrMapOvr>
+</p:sld>
+</file>
+
+<file path=ppt/slides/slide18.xml><?xml version="1.0" encoding="utf-8"?>
+<p:sld xmlns:a="http://schemas.openxmlformats.org/drawingml/2006/main" xmlns:r="http://schemas.openxmlformats.org/officeDocument/2006/relationships" xmlns:p="http://schemas.openxmlformats.org/presentationml/2006/main">
+  <p:cSld>
+    <p:spTree>
+      <p:nvGrpSpPr>
         <p:cNvPr id="1" name=""/>
         <p:cNvGrpSpPr/>
         <p:nvPr/>
@@ -19934,7 +22712,7 @@
 </p:sld>
 </file>
 
-<file path=ppt/slides/slide18.xml><?xml version="1.0" encoding="utf-8"?>
+<file path=ppt/slides/slide19.xml><?xml version="1.0" encoding="utf-8"?>
 <p:sld xmlns:a="http://schemas.openxmlformats.org/drawingml/2006/main" xmlns:r="http://schemas.openxmlformats.org/officeDocument/2006/relationships" xmlns:p="http://schemas.openxmlformats.org/presentationml/2006/main">
   <p:cSld>
     <p:spTree>
@@ -19992,7 +22770,1012 @@
 </p:sld>
 </file>
 
-<file path=ppt/slides/slide19.xml><?xml version="1.0" encoding="utf-8"?>
+<file path=ppt/slides/slide2.xml><?xml version="1.0" encoding="utf-8"?>
+<p:sld xmlns:a="http://schemas.openxmlformats.org/drawingml/2006/main" xmlns:r="http://schemas.openxmlformats.org/officeDocument/2006/relationships" xmlns:p="http://schemas.openxmlformats.org/presentationml/2006/main">
+  <p:cSld>
+    <p:spTree>
+      <p:nvGrpSpPr>
+        <p:cNvPr id="1" name=""/>
+        <p:cNvGrpSpPr/>
+        <p:nvPr/>
+      </p:nvGrpSpPr>
+      <p:grpSpPr>
+        <a:xfrm>
+          <a:off x="0" y="0"/>
+          <a:ext cx="0" cy="0"/>
+          <a:chOff x="0" y="0"/>
+          <a:chExt cx="0" cy="0"/>
+        </a:xfrm>
+      </p:grpSpPr>
+      <p:cxnSp>
+        <p:nvCxnSpPr>
+          <p:cNvPr id="2" name="Straight Connector 1">
+            <a:extLst>
+              <a:ext uri="{FF2B5EF4-FFF2-40B4-BE49-F238E27FC236}">
+                <a16:creationId xmlns:a16="http://schemas.microsoft.com/office/drawing/2014/main" id="{A542FD0C-BB34-EB15-DD80-19B02199C2EB}"/>
+              </a:ext>
+            </a:extLst>
+          </p:cNvPr>
+          <p:cNvCxnSpPr/>
+          <p:nvPr/>
+        </p:nvCxnSpPr>
+        <p:spPr>
+          <a:xfrm>
+            <a:off x="3021383" y="3752952"/>
+            <a:ext cx="5903596" cy="0"/>
+          </a:xfrm>
+          <a:prstGeom prst="line">
+            <a:avLst/>
+          </a:prstGeom>
+          <a:ln w="76200" cmpd="sng">
+            <a:solidFill>
+              <a:srgbClr val="76C5EF"/>
+            </a:solidFill>
+          </a:ln>
+        </p:spPr>
+        <p:style>
+          <a:lnRef idx="2">
+            <a:schemeClr val="accent1"/>
+          </a:lnRef>
+          <a:fillRef idx="0">
+            <a:schemeClr val="accent1"/>
+          </a:fillRef>
+          <a:effectRef idx="1">
+            <a:schemeClr val="accent1"/>
+          </a:effectRef>
+          <a:fontRef idx="minor">
+            <a:schemeClr val="tx1"/>
+          </a:fontRef>
+        </p:style>
+      </p:cxnSp>
+      <p:sp>
+        <p:nvSpPr>
+          <p:cNvPr id="3" name="Cloud 2">
+            <a:extLst>
+              <a:ext uri="{FF2B5EF4-FFF2-40B4-BE49-F238E27FC236}">
+                <a16:creationId xmlns:a16="http://schemas.microsoft.com/office/drawing/2014/main" id="{3B067AE2-1E7E-0602-ABC9-7B6F19D00559}"/>
+              </a:ext>
+            </a:extLst>
+          </p:cNvPr>
+          <p:cNvSpPr/>
+          <p:nvPr/>
+        </p:nvSpPr>
+        <p:spPr>
+          <a:xfrm>
+            <a:off x="3689784" y="756490"/>
+            <a:ext cx="4973053" cy="2672510"/>
+          </a:xfrm>
+          <a:prstGeom prst="cloud">
+            <a:avLst/>
+          </a:prstGeom>
+        </p:spPr>
+        <p:style>
+          <a:lnRef idx="1">
+            <a:schemeClr val="accent1"/>
+          </a:lnRef>
+          <a:fillRef idx="2">
+            <a:schemeClr val="accent1"/>
+          </a:fillRef>
+          <a:effectRef idx="1">
+            <a:schemeClr val="accent1"/>
+          </a:effectRef>
+          <a:fontRef idx="minor">
+            <a:schemeClr val="dk1"/>
+          </a:fontRef>
+        </p:style>
+        <p:txBody>
+          <a:bodyPr rtlCol="0" anchor="ctr"/>
+          <a:lstStyle/>
+          <a:p>
+            <a:pPr algn="ctr"/>
+            <a:endParaRPr lang="en-US" sz="4800" dirty="0"/>
+          </a:p>
+        </p:txBody>
+      </p:sp>
+      <p:sp>
+        <p:nvSpPr>
+          <p:cNvPr id="4" name="Can 3">
+            <a:extLst>
+              <a:ext uri="{FF2B5EF4-FFF2-40B4-BE49-F238E27FC236}">
+                <a16:creationId xmlns:a16="http://schemas.microsoft.com/office/drawing/2014/main" id="{A753D108-B2A3-16F1-891C-519AC95E00DC}"/>
+              </a:ext>
+            </a:extLst>
+          </p:cNvPr>
+          <p:cNvSpPr/>
+          <p:nvPr/>
+        </p:nvSpPr>
+        <p:spPr>
+          <a:xfrm>
+            <a:off x="6910454" y="1181836"/>
+            <a:ext cx="1426477" cy="1463980"/>
+          </a:xfrm>
+          <a:prstGeom prst="can">
+            <a:avLst/>
+          </a:prstGeom>
+        </p:spPr>
+        <p:style>
+          <a:lnRef idx="2">
+            <a:schemeClr val="accent1">
+              <a:shade val="50000"/>
+            </a:schemeClr>
+          </a:lnRef>
+          <a:fillRef idx="1">
+            <a:schemeClr val="accent1"/>
+          </a:fillRef>
+          <a:effectRef idx="0">
+            <a:schemeClr val="accent1"/>
+          </a:effectRef>
+          <a:fontRef idx="minor">
+            <a:schemeClr val="lt1"/>
+          </a:fontRef>
+        </p:style>
+        <p:txBody>
+          <a:bodyPr rtlCol="0" anchor="ctr"/>
+          <a:lstStyle/>
+          <a:p>
+            <a:pPr algn="ctr"/>
+            <a:endParaRPr lang="en-US" sz="2000" i="1" dirty="0"/>
+          </a:p>
+          <a:p>
+            <a:pPr algn="ctr"/>
+            <a:endParaRPr lang="en-US" sz="2000" i="1" dirty="0"/>
+          </a:p>
+        </p:txBody>
+      </p:sp>
+      <p:sp>
+        <p:nvSpPr>
+          <p:cNvPr id="5" name="TextBox 4">
+            <a:extLst>
+              <a:ext uri="{FF2B5EF4-FFF2-40B4-BE49-F238E27FC236}">
+                <a16:creationId xmlns:a16="http://schemas.microsoft.com/office/drawing/2014/main" id="{57AEA246-C48D-007F-5268-61811A10D441}"/>
+              </a:ext>
+            </a:extLst>
+          </p:cNvPr>
+          <p:cNvSpPr txBox="1"/>
+          <p:nvPr/>
+        </p:nvSpPr>
+        <p:spPr>
+          <a:xfrm>
+            <a:off x="2926716" y="3283821"/>
+            <a:ext cx="1013419" cy="369332"/>
+          </a:xfrm>
+          <a:prstGeom prst="rect">
+            <a:avLst/>
+          </a:prstGeom>
+          <a:noFill/>
+        </p:spPr>
+        <p:txBody>
+          <a:bodyPr wrap="none" rtlCol="0">
+            <a:spAutoFit/>
+          </a:bodyPr>
+          <a:lstStyle/>
+          <a:p>
+            <a:r>
+              <a:rPr lang="en-US" dirty="0"/>
+              <a:t>Remote</a:t>
+            </a:r>
+          </a:p>
+        </p:txBody>
+      </p:sp>
+      <p:sp>
+        <p:nvSpPr>
+          <p:cNvPr id="6" name="TextBox 5">
+            <a:extLst>
+              <a:ext uri="{FF2B5EF4-FFF2-40B4-BE49-F238E27FC236}">
+                <a16:creationId xmlns:a16="http://schemas.microsoft.com/office/drawing/2014/main" id="{90E89A52-F0AC-8544-8638-28FD81BEC04E}"/>
+              </a:ext>
+            </a:extLst>
+          </p:cNvPr>
+          <p:cNvSpPr txBox="1"/>
+          <p:nvPr/>
+        </p:nvSpPr>
+        <p:spPr>
+          <a:xfrm>
+            <a:off x="3069591" y="3825547"/>
+            <a:ext cx="748923" cy="369332"/>
+          </a:xfrm>
+          <a:prstGeom prst="rect">
+            <a:avLst/>
+          </a:prstGeom>
+          <a:noFill/>
+        </p:spPr>
+        <p:txBody>
+          <a:bodyPr wrap="none" rtlCol="0">
+            <a:spAutoFit/>
+          </a:bodyPr>
+          <a:lstStyle/>
+          <a:p>
+            <a:r>
+              <a:rPr lang="en-US" dirty="0"/>
+              <a:t>Local</a:t>
+            </a:r>
+          </a:p>
+        </p:txBody>
+      </p:sp>
+      <p:sp>
+        <p:nvSpPr>
+          <p:cNvPr id="7" name="TextBox 6">
+            <a:extLst>
+              <a:ext uri="{FF2B5EF4-FFF2-40B4-BE49-F238E27FC236}">
+                <a16:creationId xmlns:a16="http://schemas.microsoft.com/office/drawing/2014/main" id="{C688C1BB-E276-FCC5-4BC9-44642821AEEF}"/>
+              </a:ext>
+            </a:extLst>
+          </p:cNvPr>
+          <p:cNvSpPr txBox="1"/>
+          <p:nvPr/>
+        </p:nvSpPr>
+        <p:spPr>
+          <a:xfrm>
+            <a:off x="6636174" y="3290422"/>
+            <a:ext cx="2435667" cy="369332"/>
+          </a:xfrm>
+          <a:prstGeom prst="rect">
+            <a:avLst/>
+          </a:prstGeom>
+          <a:noFill/>
+        </p:spPr>
+        <p:txBody>
+          <a:bodyPr wrap="none" rtlCol="0">
+            <a:spAutoFit/>
+          </a:bodyPr>
+          <a:lstStyle/>
+          <a:p>
+            <a:r>
+              <a:rPr lang="en-US" dirty="0"/>
+              <a:t>On GitHub (Browser)</a:t>
+            </a:r>
+          </a:p>
+        </p:txBody>
+      </p:sp>
+      <p:sp>
+        <p:nvSpPr>
+          <p:cNvPr id="8" name="TextBox 7">
+            <a:extLst>
+              <a:ext uri="{FF2B5EF4-FFF2-40B4-BE49-F238E27FC236}">
+                <a16:creationId xmlns:a16="http://schemas.microsoft.com/office/drawing/2014/main" id="{5C77A1E1-BFA3-BDDB-2D25-B90EFE46FB50}"/>
+              </a:ext>
+            </a:extLst>
+          </p:cNvPr>
+          <p:cNvSpPr txBox="1"/>
+          <p:nvPr/>
+        </p:nvSpPr>
+        <p:spPr>
+          <a:xfrm>
+            <a:off x="6094359" y="3799041"/>
+            <a:ext cx="2985497" cy="369332"/>
+          </a:xfrm>
+          <a:prstGeom prst="rect">
+            <a:avLst/>
+          </a:prstGeom>
+          <a:noFill/>
+        </p:spPr>
+        <p:txBody>
+          <a:bodyPr wrap="none" rtlCol="0">
+            <a:spAutoFit/>
+          </a:bodyPr>
+          <a:lstStyle/>
+          <a:p>
+            <a:r>
+              <a:rPr lang="en-US" dirty="0"/>
+              <a:t>On Your Machine (git/CLI)</a:t>
+            </a:r>
+          </a:p>
+        </p:txBody>
+      </p:sp>
+      <p:sp>
+        <p:nvSpPr>
+          <p:cNvPr id="9" name="TextBox 8">
+            <a:extLst>
+              <a:ext uri="{FF2B5EF4-FFF2-40B4-BE49-F238E27FC236}">
+                <a16:creationId xmlns:a16="http://schemas.microsoft.com/office/drawing/2014/main" id="{5EFF8847-7D36-2E59-56D5-92C196EF8954}"/>
+              </a:ext>
+            </a:extLst>
+          </p:cNvPr>
+          <p:cNvSpPr txBox="1"/>
+          <p:nvPr/>
+        </p:nvSpPr>
+        <p:spPr>
+          <a:xfrm>
+            <a:off x="7015074" y="1460081"/>
+            <a:ext cx="1287532" cy="1200329"/>
+          </a:xfrm>
+          <a:prstGeom prst="rect">
+            <a:avLst/>
+          </a:prstGeom>
+          <a:noFill/>
+        </p:spPr>
+        <p:txBody>
+          <a:bodyPr wrap="none" rtlCol="0">
+            <a:spAutoFit/>
+          </a:bodyPr>
+          <a:lstStyle/>
+          <a:p>
+            <a:pPr algn="ctr"/>
+            <a:r>
+              <a:rPr lang="en-US" sz="2400" dirty="0">
+                <a:solidFill>
+                  <a:schemeClr val="bg1"/>
+                </a:solidFill>
+                <a:latin typeface="Segoe Print" panose="02000800000000000000" pitchFamily="2" charset="0"/>
+              </a:rPr>
+              <a:t>Main</a:t>
+            </a:r>
+          </a:p>
+          <a:p>
+            <a:pPr algn="ctr"/>
+            <a:r>
+              <a:rPr lang="en-US" sz="2400" dirty="0">
+                <a:solidFill>
+                  <a:schemeClr val="bg1"/>
+                </a:solidFill>
+                <a:latin typeface="Segoe Print" panose="02000800000000000000" pitchFamily="2" charset="0"/>
+              </a:rPr>
+              <a:t>Project</a:t>
+            </a:r>
+          </a:p>
+          <a:p>
+            <a:pPr algn="ctr"/>
+            <a:r>
+              <a:rPr lang="en-US" sz="2400" dirty="0">
+                <a:solidFill>
+                  <a:schemeClr val="bg1"/>
+                </a:solidFill>
+                <a:latin typeface="Segoe Print" panose="02000800000000000000" pitchFamily="2" charset="0"/>
+              </a:rPr>
+              <a:t>Repo</a:t>
+            </a:r>
+          </a:p>
+        </p:txBody>
+      </p:sp>
+      <p:sp>
+        <p:nvSpPr>
+          <p:cNvPr id="10" name="Can 9">
+            <a:extLst>
+              <a:ext uri="{FF2B5EF4-FFF2-40B4-BE49-F238E27FC236}">
+                <a16:creationId xmlns:a16="http://schemas.microsoft.com/office/drawing/2014/main" id="{2FBA5496-5C4E-9D4F-48A1-4F1A245AFDFE}"/>
+              </a:ext>
+            </a:extLst>
+          </p:cNvPr>
+          <p:cNvSpPr/>
+          <p:nvPr/>
+        </p:nvSpPr>
+        <p:spPr>
+          <a:xfrm>
+            <a:off x="4224612" y="1181836"/>
+            <a:ext cx="1426477" cy="1463980"/>
+          </a:xfrm>
+          <a:prstGeom prst="can">
+            <a:avLst/>
+          </a:prstGeom>
+        </p:spPr>
+        <p:style>
+          <a:lnRef idx="2">
+            <a:schemeClr val="accent1">
+              <a:shade val="50000"/>
+            </a:schemeClr>
+          </a:lnRef>
+          <a:fillRef idx="1">
+            <a:schemeClr val="accent1"/>
+          </a:fillRef>
+          <a:effectRef idx="0">
+            <a:schemeClr val="accent1"/>
+          </a:effectRef>
+          <a:fontRef idx="minor">
+            <a:schemeClr val="lt1"/>
+          </a:fontRef>
+        </p:style>
+        <p:txBody>
+          <a:bodyPr rtlCol="0" anchor="ctr"/>
+          <a:lstStyle/>
+          <a:p>
+            <a:pPr algn="ctr"/>
+            <a:endParaRPr lang="en-US" sz="2000" i="1" dirty="0"/>
+          </a:p>
+          <a:p>
+            <a:pPr algn="ctr"/>
+            <a:endParaRPr lang="en-US" sz="2000" i="1" dirty="0"/>
+          </a:p>
+        </p:txBody>
+      </p:sp>
+      <p:sp>
+        <p:nvSpPr>
+          <p:cNvPr id="11" name="Can 10">
+            <a:extLst>
+              <a:ext uri="{FF2B5EF4-FFF2-40B4-BE49-F238E27FC236}">
+                <a16:creationId xmlns:a16="http://schemas.microsoft.com/office/drawing/2014/main" id="{F3621BDC-2969-FD51-F83E-CAEF6AA0FBCE}"/>
+              </a:ext>
+            </a:extLst>
+          </p:cNvPr>
+          <p:cNvSpPr/>
+          <p:nvPr/>
+        </p:nvSpPr>
+        <p:spPr>
+          <a:xfrm>
+            <a:off x="4224612" y="4172625"/>
+            <a:ext cx="1426477" cy="1679170"/>
+          </a:xfrm>
+          <a:prstGeom prst="can">
+            <a:avLst/>
+          </a:prstGeom>
+          <a:solidFill>
+            <a:schemeClr val="accent1">
+              <a:alpha val="0"/>
+            </a:schemeClr>
+          </a:solidFill>
+          <a:ln>
+            <a:solidFill>
+              <a:schemeClr val="accent1">
+                <a:shade val="50000"/>
+                <a:alpha val="0"/>
+              </a:schemeClr>
+            </a:solidFill>
+          </a:ln>
+        </p:spPr>
+        <p:style>
+          <a:lnRef idx="2">
+            <a:schemeClr val="accent1">
+              <a:shade val="50000"/>
+            </a:schemeClr>
+          </a:lnRef>
+          <a:fillRef idx="1">
+            <a:schemeClr val="accent1"/>
+          </a:fillRef>
+          <a:effectRef idx="0">
+            <a:schemeClr val="accent1"/>
+          </a:effectRef>
+          <a:fontRef idx="minor">
+            <a:schemeClr val="lt1"/>
+          </a:fontRef>
+        </p:style>
+        <p:txBody>
+          <a:bodyPr rtlCol="0" anchor="ctr"/>
+          <a:lstStyle/>
+          <a:p>
+            <a:pPr algn="ctr"/>
+            <a:br>
+              <a:rPr lang="en-US" sz="2000" dirty="0"/>
+            </a:br>
+            <a:endParaRPr lang="en-US" sz="2000" dirty="0"/>
+          </a:p>
+        </p:txBody>
+      </p:sp>
+      <p:sp>
+        <p:nvSpPr>
+          <p:cNvPr id="12" name="TextBox 11">
+            <a:extLst>
+              <a:ext uri="{FF2B5EF4-FFF2-40B4-BE49-F238E27FC236}">
+                <a16:creationId xmlns:a16="http://schemas.microsoft.com/office/drawing/2014/main" id="{3D208841-E66A-FBF9-1039-24928DFF10EE}"/>
+              </a:ext>
+            </a:extLst>
+          </p:cNvPr>
+          <p:cNvSpPr txBox="1"/>
+          <p:nvPr/>
+        </p:nvSpPr>
+        <p:spPr>
+          <a:xfrm>
+            <a:off x="4246261" y="1479741"/>
+            <a:ext cx="1351652" cy="1200329"/>
+          </a:xfrm>
+          <a:prstGeom prst="rect">
+            <a:avLst/>
+          </a:prstGeom>
+          <a:noFill/>
+        </p:spPr>
+        <p:txBody>
+          <a:bodyPr wrap="none" rtlCol="0">
+            <a:spAutoFit/>
+          </a:bodyPr>
+          <a:lstStyle/>
+          <a:p>
+            <a:pPr algn="ctr"/>
+            <a:r>
+              <a:rPr lang="en-US" sz="2400" dirty="0">
+                <a:solidFill>
+                  <a:schemeClr val="bg1"/>
+                </a:solidFill>
+                <a:latin typeface="Segoe Print" panose="02000800000000000000" pitchFamily="2" charset="0"/>
+              </a:rPr>
+              <a:t>Your</a:t>
+            </a:r>
+          </a:p>
+          <a:p>
+            <a:pPr algn="ctr"/>
+            <a:r>
+              <a:rPr lang="en-US" sz="2400" dirty="0">
+                <a:solidFill>
+                  <a:schemeClr val="bg1"/>
+                </a:solidFill>
+                <a:latin typeface="Segoe Print" panose="02000800000000000000" pitchFamily="2" charset="0"/>
+              </a:rPr>
+              <a:t>Remote</a:t>
+            </a:r>
+          </a:p>
+          <a:p>
+            <a:pPr algn="ctr"/>
+            <a:r>
+              <a:rPr lang="en-US" sz="2400" dirty="0">
+                <a:solidFill>
+                  <a:schemeClr val="bg1"/>
+                </a:solidFill>
+                <a:latin typeface="Segoe Print" panose="02000800000000000000" pitchFamily="2" charset="0"/>
+              </a:rPr>
+              <a:t>Copy</a:t>
+            </a:r>
+          </a:p>
+        </p:txBody>
+      </p:sp>
+      <p:sp>
+        <p:nvSpPr>
+          <p:cNvPr id="13" name="Can 12">
+            <a:extLst>
+              <a:ext uri="{FF2B5EF4-FFF2-40B4-BE49-F238E27FC236}">
+                <a16:creationId xmlns:a16="http://schemas.microsoft.com/office/drawing/2014/main" id="{EDD855E2-1DA5-326B-C9CA-D179C5F26FC4}"/>
+              </a:ext>
+            </a:extLst>
+          </p:cNvPr>
+          <p:cNvSpPr/>
+          <p:nvPr/>
+        </p:nvSpPr>
+        <p:spPr>
+          <a:xfrm>
+            <a:off x="4224612" y="4172625"/>
+            <a:ext cx="1426477" cy="1679170"/>
+          </a:xfrm>
+          <a:prstGeom prst="can">
+            <a:avLst/>
+          </a:prstGeom>
+        </p:spPr>
+        <p:style>
+          <a:lnRef idx="2">
+            <a:schemeClr val="accent1">
+              <a:shade val="50000"/>
+            </a:schemeClr>
+          </a:lnRef>
+          <a:fillRef idx="1">
+            <a:schemeClr val="accent1"/>
+          </a:fillRef>
+          <a:effectRef idx="0">
+            <a:schemeClr val="accent1"/>
+          </a:effectRef>
+          <a:fontRef idx="minor">
+            <a:schemeClr val="lt1"/>
+          </a:fontRef>
+        </p:style>
+        <p:txBody>
+          <a:bodyPr rtlCol="0" anchor="ctr"/>
+          <a:lstStyle/>
+          <a:p>
+            <a:pPr algn="ctr"/>
+            <a:br>
+              <a:rPr lang="en-US" sz="2000" dirty="0"/>
+            </a:br>
+            <a:endParaRPr lang="en-US" sz="2000" dirty="0"/>
+          </a:p>
+        </p:txBody>
+      </p:sp>
+      <p:sp>
+        <p:nvSpPr>
+          <p:cNvPr id="14" name="Left Arrow 13">
+            <a:extLst>
+              <a:ext uri="{FF2B5EF4-FFF2-40B4-BE49-F238E27FC236}">
+                <a16:creationId xmlns:a16="http://schemas.microsoft.com/office/drawing/2014/main" id="{A7E3AA56-EA46-3656-53A3-916E6D8D741D}"/>
+              </a:ext>
+            </a:extLst>
+          </p:cNvPr>
+          <p:cNvSpPr/>
+          <p:nvPr/>
+        </p:nvSpPr>
+        <p:spPr>
+          <a:xfrm rot="16200000">
+            <a:off x="3658905" y="2983694"/>
+            <a:ext cx="1731819" cy="1019070"/>
+          </a:xfrm>
+          <a:prstGeom prst="leftArrow">
+            <a:avLst/>
+          </a:prstGeom>
+          <a:ln>
+            <a:solidFill>
+              <a:schemeClr val="bg1">
+                <a:lumMod val="95000"/>
+              </a:schemeClr>
+            </a:solidFill>
+          </a:ln>
+        </p:spPr>
+        <p:style>
+          <a:lnRef idx="2">
+            <a:schemeClr val="accent1">
+              <a:shade val="50000"/>
+            </a:schemeClr>
+          </a:lnRef>
+          <a:fillRef idx="1">
+            <a:schemeClr val="accent1"/>
+          </a:fillRef>
+          <a:effectRef idx="0">
+            <a:schemeClr val="accent1"/>
+          </a:effectRef>
+          <a:fontRef idx="minor">
+            <a:schemeClr val="lt1"/>
+          </a:fontRef>
+        </p:style>
+        <p:txBody>
+          <a:bodyPr rtlCol="0" anchor="ctr"/>
+          <a:lstStyle/>
+          <a:p>
+            <a:pPr algn="ctr"/>
+            <a:r>
+              <a:rPr lang="en-US" sz="3200" b="1" dirty="0"/>
+              <a:t> </a:t>
+            </a:r>
+            <a:r>
+              <a:rPr lang="en-US" sz="3200" b="1" dirty="0">
+                <a:solidFill>
+                  <a:srgbClr val="FFFF00"/>
+                </a:solidFill>
+              </a:rPr>
+              <a:t>clone</a:t>
+            </a:r>
+          </a:p>
+        </p:txBody>
+      </p:sp>
+      <p:sp>
+        <p:nvSpPr>
+          <p:cNvPr id="15" name="TextBox 14">
+            <a:extLst>
+              <a:ext uri="{FF2B5EF4-FFF2-40B4-BE49-F238E27FC236}">
+                <a16:creationId xmlns:a16="http://schemas.microsoft.com/office/drawing/2014/main" id="{AD0F72B6-D682-A715-9F22-B78F06EB6FB3}"/>
+              </a:ext>
+            </a:extLst>
+          </p:cNvPr>
+          <p:cNvSpPr txBox="1"/>
+          <p:nvPr/>
+        </p:nvSpPr>
+        <p:spPr>
+          <a:xfrm>
+            <a:off x="4133976" y="4626175"/>
+            <a:ext cx="1584087" cy="1015663"/>
+          </a:xfrm>
+          <a:prstGeom prst="rect">
+            <a:avLst/>
+          </a:prstGeom>
+          <a:noFill/>
+        </p:spPr>
+        <p:txBody>
+          <a:bodyPr wrap="none" rtlCol="0">
+            <a:spAutoFit/>
+          </a:bodyPr>
+          <a:lstStyle/>
+          <a:p>
+            <a:pPr algn="ctr"/>
+            <a:r>
+              <a:rPr lang="en-US" sz="2000" dirty="0">
+                <a:solidFill>
+                  <a:schemeClr val="bg1"/>
+                </a:solidFill>
+                <a:latin typeface="Segoe Print" panose="02000800000000000000" pitchFamily="2" charset="0"/>
+              </a:rPr>
+              <a:t>Local Copy</a:t>
+            </a:r>
+          </a:p>
+          <a:p>
+            <a:pPr algn="ctr"/>
+            <a:r>
+              <a:rPr lang="en-US" sz="2000" dirty="0">
+                <a:solidFill>
+                  <a:schemeClr val="bg1"/>
+                </a:solidFill>
+                <a:latin typeface="Segoe Print" panose="02000800000000000000" pitchFamily="2" charset="0"/>
+              </a:rPr>
+              <a:t>Of Your</a:t>
+            </a:r>
+          </a:p>
+          <a:p>
+            <a:pPr algn="ctr"/>
+            <a:r>
+              <a:rPr lang="en-US" sz="2000" dirty="0">
+                <a:solidFill>
+                  <a:schemeClr val="bg1"/>
+                </a:solidFill>
+                <a:latin typeface="Segoe Print" panose="02000800000000000000" pitchFamily="2" charset="0"/>
+              </a:rPr>
+              <a:t>Copy</a:t>
+            </a:r>
+          </a:p>
+        </p:txBody>
+      </p:sp>
+      <p:cxnSp>
+        <p:nvCxnSpPr>
+          <p:cNvPr id="16" name="Curved Connector 15">
+            <a:extLst>
+              <a:ext uri="{FF2B5EF4-FFF2-40B4-BE49-F238E27FC236}">
+                <a16:creationId xmlns:a16="http://schemas.microsoft.com/office/drawing/2014/main" id="{B0E2347A-39E6-6062-318C-450814F1C44A}"/>
+              </a:ext>
+            </a:extLst>
+          </p:cNvPr>
+          <p:cNvCxnSpPr>
+            <a:cxnSpLocks/>
+          </p:cNvCxnSpPr>
+          <p:nvPr/>
+        </p:nvCxnSpPr>
+        <p:spPr>
+          <a:xfrm rot="5400000" flipH="1" flipV="1">
+            <a:off x="6281981" y="102883"/>
+            <a:ext cx="19660" cy="2734056"/>
+          </a:xfrm>
+          <a:prstGeom prst="curvedConnector3">
+            <a:avLst>
+              <a:gd name="adj1" fmla="val 1838622"/>
+            </a:avLst>
+          </a:prstGeom>
+          <a:ln w="63500">
+            <a:solidFill>
+              <a:schemeClr val="accent4"/>
+            </a:solidFill>
+            <a:prstDash val="sysDot"/>
+            <a:tailEnd type="triangle"/>
+          </a:ln>
+        </p:spPr>
+        <p:style>
+          <a:lnRef idx="2">
+            <a:schemeClr val="accent1"/>
+          </a:lnRef>
+          <a:fillRef idx="0">
+            <a:schemeClr val="accent1"/>
+          </a:fillRef>
+          <a:effectRef idx="1">
+            <a:schemeClr val="accent1"/>
+          </a:effectRef>
+          <a:fontRef idx="minor">
+            <a:schemeClr val="tx1"/>
+          </a:fontRef>
+        </p:style>
+      </p:cxnSp>
+      <p:cxnSp>
+        <p:nvCxnSpPr>
+          <p:cNvPr id="17" name="Curved Connector 16">
+            <a:extLst>
+              <a:ext uri="{FF2B5EF4-FFF2-40B4-BE49-F238E27FC236}">
+                <a16:creationId xmlns:a16="http://schemas.microsoft.com/office/drawing/2014/main" id="{D788DFE4-28FC-3737-390C-D84BB5D29FA3}"/>
+              </a:ext>
+            </a:extLst>
+          </p:cNvPr>
+          <p:cNvCxnSpPr>
+            <a:cxnSpLocks/>
+            <a:stCxn id="13" idx="2"/>
+            <a:endCxn id="12" idx="1"/>
+          </p:cNvCxnSpPr>
+          <p:nvPr/>
+        </p:nvCxnSpPr>
+        <p:spPr>
+          <a:xfrm rot="10800000" flipH="1">
+            <a:off x="4224611" y="2079906"/>
+            <a:ext cx="21649" cy="2932304"/>
+          </a:xfrm>
+          <a:prstGeom prst="curvedConnector3">
+            <a:avLst>
+              <a:gd name="adj1" fmla="val -1055938"/>
+            </a:avLst>
+          </a:prstGeom>
+          <a:ln w="63500">
+            <a:solidFill>
+              <a:schemeClr val="accent4"/>
+            </a:solidFill>
+            <a:prstDash val="sysDot"/>
+            <a:tailEnd type="triangle"/>
+          </a:ln>
+        </p:spPr>
+        <p:style>
+          <a:lnRef idx="2">
+            <a:schemeClr val="accent1"/>
+          </a:lnRef>
+          <a:fillRef idx="0">
+            <a:schemeClr val="accent1"/>
+          </a:fillRef>
+          <a:effectRef idx="1">
+            <a:schemeClr val="accent1"/>
+          </a:effectRef>
+          <a:fontRef idx="minor">
+            <a:schemeClr val="tx1"/>
+          </a:fontRef>
+        </p:style>
+      </p:cxnSp>
+      <p:sp>
+        <p:nvSpPr>
+          <p:cNvPr id="18" name="Left Arrow 17">
+            <a:extLst>
+              <a:ext uri="{FF2B5EF4-FFF2-40B4-BE49-F238E27FC236}">
+                <a16:creationId xmlns:a16="http://schemas.microsoft.com/office/drawing/2014/main" id="{1B6A2998-1957-2A13-A501-FCE312F3308B}"/>
+              </a:ext>
+            </a:extLst>
+          </p:cNvPr>
+          <p:cNvSpPr/>
+          <p:nvPr/>
+        </p:nvSpPr>
+        <p:spPr>
+          <a:xfrm>
+            <a:off x="5523725" y="1172099"/>
+            <a:ext cx="1386729" cy="732701"/>
+          </a:xfrm>
+          <a:prstGeom prst="leftArrow">
+            <a:avLst/>
+          </a:prstGeom>
+          <a:ln>
+            <a:solidFill>
+              <a:schemeClr val="bg1">
+                <a:lumMod val="95000"/>
+              </a:schemeClr>
+            </a:solidFill>
+          </a:ln>
+        </p:spPr>
+        <p:style>
+          <a:lnRef idx="2">
+            <a:schemeClr val="accent1">
+              <a:shade val="50000"/>
+            </a:schemeClr>
+          </a:lnRef>
+          <a:fillRef idx="1">
+            <a:schemeClr val="accent1"/>
+          </a:fillRef>
+          <a:effectRef idx="0">
+            <a:schemeClr val="accent1"/>
+          </a:effectRef>
+          <a:fontRef idx="minor">
+            <a:schemeClr val="lt1"/>
+          </a:fontRef>
+        </p:style>
+        <p:txBody>
+          <a:bodyPr rtlCol="0" anchor="ctr"/>
+          <a:lstStyle/>
+          <a:p>
+            <a:pPr algn="ctr"/>
+            <a:r>
+              <a:rPr lang="en-US" sz="3200" b="1" dirty="0">
+                <a:solidFill>
+                  <a:srgbClr val="FFFF00"/>
+                </a:solidFill>
+              </a:rPr>
+              <a:t>fork</a:t>
+            </a:r>
+            <a:endParaRPr lang="en-US" sz="2000" b="1" dirty="0">
+              <a:solidFill>
+                <a:srgbClr val="FFFF00"/>
+              </a:solidFill>
+            </a:endParaRPr>
+          </a:p>
+        </p:txBody>
+      </p:sp>
+      <p:sp>
+        <p:nvSpPr>
+          <p:cNvPr id="19" name="Up Arrow 18">
+            <a:extLst>
+              <a:ext uri="{FF2B5EF4-FFF2-40B4-BE49-F238E27FC236}">
+                <a16:creationId xmlns:a16="http://schemas.microsoft.com/office/drawing/2014/main" id="{53222C8D-21E9-BE14-6361-F83DCE90F964}"/>
+              </a:ext>
+            </a:extLst>
+          </p:cNvPr>
+          <p:cNvSpPr/>
+          <p:nvPr/>
+        </p:nvSpPr>
+        <p:spPr>
+          <a:xfrm>
+            <a:off x="4878922" y="2597699"/>
+            <a:ext cx="1016592" cy="1689752"/>
+          </a:xfrm>
+          <a:prstGeom prst="upArrow">
+            <a:avLst>
+              <a:gd name="adj1" fmla="val 50000"/>
+              <a:gd name="adj2" fmla="val 51082"/>
+            </a:avLst>
+          </a:prstGeom>
+          <a:ln>
+            <a:solidFill>
+              <a:schemeClr val="bg1">
+                <a:lumMod val="95000"/>
+              </a:schemeClr>
+            </a:solidFill>
+          </a:ln>
+        </p:spPr>
+        <p:style>
+          <a:lnRef idx="3">
+            <a:schemeClr val="lt1"/>
+          </a:lnRef>
+          <a:fillRef idx="1">
+            <a:schemeClr val="accent1"/>
+          </a:fillRef>
+          <a:effectRef idx="1">
+            <a:schemeClr val="accent1"/>
+          </a:effectRef>
+          <a:fontRef idx="minor">
+            <a:schemeClr val="lt1"/>
+          </a:fontRef>
+        </p:style>
+        <p:txBody>
+          <a:bodyPr vert="vert270" rtlCol="0" anchor="ctr"/>
+          <a:lstStyle/>
+          <a:p>
+            <a:pPr algn="ctr"/>
+            <a:r>
+              <a:rPr lang="en-US" sz="3200" b="1" dirty="0">
+                <a:solidFill>
+                  <a:srgbClr val="FFFF00"/>
+                </a:solidFill>
+              </a:rPr>
+              <a:t>push</a:t>
+            </a:r>
+          </a:p>
+        </p:txBody>
+      </p:sp>
+      <p:sp>
+        <p:nvSpPr>
+          <p:cNvPr id="20" name="Right Arrow 19">
+            <a:extLst>
+              <a:ext uri="{FF2B5EF4-FFF2-40B4-BE49-F238E27FC236}">
+                <a16:creationId xmlns:a16="http://schemas.microsoft.com/office/drawing/2014/main" id="{A50E1B59-B374-EF56-BD56-EBF348DBEAE8}"/>
+              </a:ext>
+            </a:extLst>
+          </p:cNvPr>
+          <p:cNvSpPr/>
+          <p:nvPr/>
+        </p:nvSpPr>
+        <p:spPr>
+          <a:xfrm>
+            <a:off x="5651089" y="1849948"/>
+            <a:ext cx="1394208" cy="1135980"/>
+          </a:xfrm>
+          <a:prstGeom prst="rightArrow">
+            <a:avLst/>
+          </a:prstGeom>
+          <a:ln>
+            <a:solidFill>
+              <a:schemeClr val="bg1">
+                <a:lumMod val="95000"/>
+              </a:schemeClr>
+            </a:solidFill>
+          </a:ln>
+        </p:spPr>
+        <p:style>
+          <a:lnRef idx="3">
+            <a:schemeClr val="lt1"/>
+          </a:lnRef>
+          <a:fillRef idx="1">
+            <a:schemeClr val="accent1"/>
+          </a:fillRef>
+          <a:effectRef idx="1">
+            <a:schemeClr val="accent1"/>
+          </a:effectRef>
+          <a:fontRef idx="minor">
+            <a:schemeClr val="lt1"/>
+          </a:fontRef>
+        </p:style>
+        <p:txBody>
+          <a:bodyPr rtlCol="0" anchor="ctr"/>
+          <a:lstStyle/>
+          <a:p>
+            <a:pPr algn="ctr"/>
+            <a:r>
+              <a:rPr lang="en-US" sz="1600" b="1" dirty="0">
+                <a:solidFill>
+                  <a:srgbClr val="FFFF00"/>
+                </a:solidFill>
+              </a:rPr>
+              <a:t>Pull Request</a:t>
+            </a:r>
+          </a:p>
+        </p:txBody>
+      </p:sp>
+    </p:spTree>
+    <p:extLst>
+      <p:ext uri="{BB962C8B-B14F-4D97-AF65-F5344CB8AC3E}">
+        <p14:creationId xmlns:p14="http://schemas.microsoft.com/office/powerpoint/2010/main" val="529549300"/>
+      </p:ext>
+    </p:extLst>
+  </p:cSld>
+  <p:clrMapOvr>
+    <a:masterClrMapping/>
+  </p:clrMapOvr>
+</p:sld>
+</file>
+
+<file path=ppt/slides/slide20.xml><?xml version="1.0" encoding="utf-8"?>
 <p:sld xmlns:a="http://schemas.openxmlformats.org/drawingml/2006/main" xmlns:r="http://schemas.openxmlformats.org/officeDocument/2006/relationships" xmlns:p="http://schemas.openxmlformats.org/presentationml/2006/main">
   <p:cSld>
     <p:spTree>
@@ -23807,1012 +27590,7 @@
 </p:sld>
 </file>
 
-<file path=ppt/slides/slide2.xml><?xml version="1.0" encoding="utf-8"?>
-<p:sld xmlns:a="http://schemas.openxmlformats.org/drawingml/2006/main" xmlns:r="http://schemas.openxmlformats.org/officeDocument/2006/relationships" xmlns:p="http://schemas.openxmlformats.org/presentationml/2006/main">
-  <p:cSld>
-    <p:spTree>
-      <p:nvGrpSpPr>
-        <p:cNvPr id="1" name=""/>
-        <p:cNvGrpSpPr/>
-        <p:nvPr/>
-      </p:nvGrpSpPr>
-      <p:grpSpPr>
-        <a:xfrm>
-          <a:off x="0" y="0"/>
-          <a:ext cx="0" cy="0"/>
-          <a:chOff x="0" y="0"/>
-          <a:chExt cx="0" cy="0"/>
-        </a:xfrm>
-      </p:grpSpPr>
-      <p:cxnSp>
-        <p:nvCxnSpPr>
-          <p:cNvPr id="2" name="Straight Connector 1">
-            <a:extLst>
-              <a:ext uri="{FF2B5EF4-FFF2-40B4-BE49-F238E27FC236}">
-                <a16:creationId xmlns:a16="http://schemas.microsoft.com/office/drawing/2014/main" id="{A542FD0C-BB34-EB15-DD80-19B02199C2EB}"/>
-              </a:ext>
-            </a:extLst>
-          </p:cNvPr>
-          <p:cNvCxnSpPr/>
-          <p:nvPr/>
-        </p:nvCxnSpPr>
-        <p:spPr>
-          <a:xfrm>
-            <a:off x="3021383" y="3752952"/>
-            <a:ext cx="5903596" cy="0"/>
-          </a:xfrm>
-          <a:prstGeom prst="line">
-            <a:avLst/>
-          </a:prstGeom>
-          <a:ln w="76200" cmpd="sng">
-            <a:solidFill>
-              <a:srgbClr val="76C5EF"/>
-            </a:solidFill>
-          </a:ln>
-        </p:spPr>
-        <p:style>
-          <a:lnRef idx="2">
-            <a:schemeClr val="accent1"/>
-          </a:lnRef>
-          <a:fillRef idx="0">
-            <a:schemeClr val="accent1"/>
-          </a:fillRef>
-          <a:effectRef idx="1">
-            <a:schemeClr val="accent1"/>
-          </a:effectRef>
-          <a:fontRef idx="minor">
-            <a:schemeClr val="tx1"/>
-          </a:fontRef>
-        </p:style>
-      </p:cxnSp>
-      <p:sp>
-        <p:nvSpPr>
-          <p:cNvPr id="3" name="Cloud 2">
-            <a:extLst>
-              <a:ext uri="{FF2B5EF4-FFF2-40B4-BE49-F238E27FC236}">
-                <a16:creationId xmlns:a16="http://schemas.microsoft.com/office/drawing/2014/main" id="{3B067AE2-1E7E-0602-ABC9-7B6F19D00559}"/>
-              </a:ext>
-            </a:extLst>
-          </p:cNvPr>
-          <p:cNvSpPr/>
-          <p:nvPr/>
-        </p:nvSpPr>
-        <p:spPr>
-          <a:xfrm>
-            <a:off x="3689784" y="756490"/>
-            <a:ext cx="4973053" cy="2672510"/>
-          </a:xfrm>
-          <a:prstGeom prst="cloud">
-            <a:avLst/>
-          </a:prstGeom>
-        </p:spPr>
-        <p:style>
-          <a:lnRef idx="1">
-            <a:schemeClr val="accent1"/>
-          </a:lnRef>
-          <a:fillRef idx="2">
-            <a:schemeClr val="accent1"/>
-          </a:fillRef>
-          <a:effectRef idx="1">
-            <a:schemeClr val="accent1"/>
-          </a:effectRef>
-          <a:fontRef idx="minor">
-            <a:schemeClr val="dk1"/>
-          </a:fontRef>
-        </p:style>
-        <p:txBody>
-          <a:bodyPr rtlCol="0" anchor="ctr"/>
-          <a:lstStyle/>
-          <a:p>
-            <a:pPr algn="ctr"/>
-            <a:endParaRPr lang="en-US" sz="4800" dirty="0"/>
-          </a:p>
-        </p:txBody>
-      </p:sp>
-      <p:sp>
-        <p:nvSpPr>
-          <p:cNvPr id="4" name="Can 3">
-            <a:extLst>
-              <a:ext uri="{FF2B5EF4-FFF2-40B4-BE49-F238E27FC236}">
-                <a16:creationId xmlns:a16="http://schemas.microsoft.com/office/drawing/2014/main" id="{A753D108-B2A3-16F1-891C-519AC95E00DC}"/>
-              </a:ext>
-            </a:extLst>
-          </p:cNvPr>
-          <p:cNvSpPr/>
-          <p:nvPr/>
-        </p:nvSpPr>
-        <p:spPr>
-          <a:xfrm>
-            <a:off x="6910454" y="1181836"/>
-            <a:ext cx="1426477" cy="1463980"/>
-          </a:xfrm>
-          <a:prstGeom prst="can">
-            <a:avLst/>
-          </a:prstGeom>
-        </p:spPr>
-        <p:style>
-          <a:lnRef idx="2">
-            <a:schemeClr val="accent1">
-              <a:shade val="50000"/>
-            </a:schemeClr>
-          </a:lnRef>
-          <a:fillRef idx="1">
-            <a:schemeClr val="accent1"/>
-          </a:fillRef>
-          <a:effectRef idx="0">
-            <a:schemeClr val="accent1"/>
-          </a:effectRef>
-          <a:fontRef idx="minor">
-            <a:schemeClr val="lt1"/>
-          </a:fontRef>
-        </p:style>
-        <p:txBody>
-          <a:bodyPr rtlCol="0" anchor="ctr"/>
-          <a:lstStyle/>
-          <a:p>
-            <a:pPr algn="ctr"/>
-            <a:endParaRPr lang="en-US" sz="2000" i="1" dirty="0"/>
-          </a:p>
-          <a:p>
-            <a:pPr algn="ctr"/>
-            <a:endParaRPr lang="en-US" sz="2000" i="1" dirty="0"/>
-          </a:p>
-        </p:txBody>
-      </p:sp>
-      <p:sp>
-        <p:nvSpPr>
-          <p:cNvPr id="5" name="TextBox 4">
-            <a:extLst>
-              <a:ext uri="{FF2B5EF4-FFF2-40B4-BE49-F238E27FC236}">
-                <a16:creationId xmlns:a16="http://schemas.microsoft.com/office/drawing/2014/main" id="{57AEA246-C48D-007F-5268-61811A10D441}"/>
-              </a:ext>
-            </a:extLst>
-          </p:cNvPr>
-          <p:cNvSpPr txBox="1"/>
-          <p:nvPr/>
-        </p:nvSpPr>
-        <p:spPr>
-          <a:xfrm>
-            <a:off x="2926716" y="3283821"/>
-            <a:ext cx="1013419" cy="369332"/>
-          </a:xfrm>
-          <a:prstGeom prst="rect">
-            <a:avLst/>
-          </a:prstGeom>
-          <a:noFill/>
-        </p:spPr>
-        <p:txBody>
-          <a:bodyPr wrap="none" rtlCol="0">
-            <a:spAutoFit/>
-          </a:bodyPr>
-          <a:lstStyle/>
-          <a:p>
-            <a:r>
-              <a:rPr lang="en-US" dirty="0"/>
-              <a:t>Remote</a:t>
-            </a:r>
-          </a:p>
-        </p:txBody>
-      </p:sp>
-      <p:sp>
-        <p:nvSpPr>
-          <p:cNvPr id="6" name="TextBox 5">
-            <a:extLst>
-              <a:ext uri="{FF2B5EF4-FFF2-40B4-BE49-F238E27FC236}">
-                <a16:creationId xmlns:a16="http://schemas.microsoft.com/office/drawing/2014/main" id="{90E89A52-F0AC-8544-8638-28FD81BEC04E}"/>
-              </a:ext>
-            </a:extLst>
-          </p:cNvPr>
-          <p:cNvSpPr txBox="1"/>
-          <p:nvPr/>
-        </p:nvSpPr>
-        <p:spPr>
-          <a:xfrm>
-            <a:off x="3069591" y="3825547"/>
-            <a:ext cx="748923" cy="369332"/>
-          </a:xfrm>
-          <a:prstGeom prst="rect">
-            <a:avLst/>
-          </a:prstGeom>
-          <a:noFill/>
-        </p:spPr>
-        <p:txBody>
-          <a:bodyPr wrap="none" rtlCol="0">
-            <a:spAutoFit/>
-          </a:bodyPr>
-          <a:lstStyle/>
-          <a:p>
-            <a:r>
-              <a:rPr lang="en-US" dirty="0"/>
-              <a:t>Local</a:t>
-            </a:r>
-          </a:p>
-        </p:txBody>
-      </p:sp>
-      <p:sp>
-        <p:nvSpPr>
-          <p:cNvPr id="7" name="TextBox 6">
-            <a:extLst>
-              <a:ext uri="{FF2B5EF4-FFF2-40B4-BE49-F238E27FC236}">
-                <a16:creationId xmlns:a16="http://schemas.microsoft.com/office/drawing/2014/main" id="{C688C1BB-E276-FCC5-4BC9-44642821AEEF}"/>
-              </a:ext>
-            </a:extLst>
-          </p:cNvPr>
-          <p:cNvSpPr txBox="1"/>
-          <p:nvPr/>
-        </p:nvSpPr>
-        <p:spPr>
-          <a:xfrm>
-            <a:off x="6636174" y="3290422"/>
-            <a:ext cx="2435667" cy="369332"/>
-          </a:xfrm>
-          <a:prstGeom prst="rect">
-            <a:avLst/>
-          </a:prstGeom>
-          <a:noFill/>
-        </p:spPr>
-        <p:txBody>
-          <a:bodyPr wrap="none" rtlCol="0">
-            <a:spAutoFit/>
-          </a:bodyPr>
-          <a:lstStyle/>
-          <a:p>
-            <a:r>
-              <a:rPr lang="en-US" dirty="0"/>
-              <a:t>On GitHub (Browser)</a:t>
-            </a:r>
-          </a:p>
-        </p:txBody>
-      </p:sp>
-      <p:sp>
-        <p:nvSpPr>
-          <p:cNvPr id="8" name="TextBox 7">
-            <a:extLst>
-              <a:ext uri="{FF2B5EF4-FFF2-40B4-BE49-F238E27FC236}">
-                <a16:creationId xmlns:a16="http://schemas.microsoft.com/office/drawing/2014/main" id="{5C77A1E1-BFA3-BDDB-2D25-B90EFE46FB50}"/>
-              </a:ext>
-            </a:extLst>
-          </p:cNvPr>
-          <p:cNvSpPr txBox="1"/>
-          <p:nvPr/>
-        </p:nvSpPr>
-        <p:spPr>
-          <a:xfrm>
-            <a:off x="6094359" y="3799041"/>
-            <a:ext cx="2985497" cy="369332"/>
-          </a:xfrm>
-          <a:prstGeom prst="rect">
-            <a:avLst/>
-          </a:prstGeom>
-          <a:noFill/>
-        </p:spPr>
-        <p:txBody>
-          <a:bodyPr wrap="none" rtlCol="0">
-            <a:spAutoFit/>
-          </a:bodyPr>
-          <a:lstStyle/>
-          <a:p>
-            <a:r>
-              <a:rPr lang="en-US" dirty="0"/>
-              <a:t>On Your Machine (git/CLI)</a:t>
-            </a:r>
-          </a:p>
-        </p:txBody>
-      </p:sp>
-      <p:sp>
-        <p:nvSpPr>
-          <p:cNvPr id="9" name="TextBox 8">
-            <a:extLst>
-              <a:ext uri="{FF2B5EF4-FFF2-40B4-BE49-F238E27FC236}">
-                <a16:creationId xmlns:a16="http://schemas.microsoft.com/office/drawing/2014/main" id="{5EFF8847-7D36-2E59-56D5-92C196EF8954}"/>
-              </a:ext>
-            </a:extLst>
-          </p:cNvPr>
-          <p:cNvSpPr txBox="1"/>
-          <p:nvPr/>
-        </p:nvSpPr>
-        <p:spPr>
-          <a:xfrm>
-            <a:off x="7015074" y="1460081"/>
-            <a:ext cx="1287532" cy="1200329"/>
-          </a:xfrm>
-          <a:prstGeom prst="rect">
-            <a:avLst/>
-          </a:prstGeom>
-          <a:noFill/>
-        </p:spPr>
-        <p:txBody>
-          <a:bodyPr wrap="none" rtlCol="0">
-            <a:spAutoFit/>
-          </a:bodyPr>
-          <a:lstStyle/>
-          <a:p>
-            <a:pPr algn="ctr"/>
-            <a:r>
-              <a:rPr lang="en-US" sz="2400" dirty="0">
-                <a:solidFill>
-                  <a:schemeClr val="bg1"/>
-                </a:solidFill>
-                <a:latin typeface="Segoe Print" panose="02000800000000000000" pitchFamily="2" charset="0"/>
-              </a:rPr>
-              <a:t>Main</a:t>
-            </a:r>
-          </a:p>
-          <a:p>
-            <a:pPr algn="ctr"/>
-            <a:r>
-              <a:rPr lang="en-US" sz="2400" dirty="0">
-                <a:solidFill>
-                  <a:schemeClr val="bg1"/>
-                </a:solidFill>
-                <a:latin typeface="Segoe Print" panose="02000800000000000000" pitchFamily="2" charset="0"/>
-              </a:rPr>
-              <a:t>Project</a:t>
-            </a:r>
-          </a:p>
-          <a:p>
-            <a:pPr algn="ctr"/>
-            <a:r>
-              <a:rPr lang="en-US" sz="2400" dirty="0">
-                <a:solidFill>
-                  <a:schemeClr val="bg1"/>
-                </a:solidFill>
-                <a:latin typeface="Segoe Print" panose="02000800000000000000" pitchFamily="2" charset="0"/>
-              </a:rPr>
-              <a:t>Repo</a:t>
-            </a:r>
-          </a:p>
-        </p:txBody>
-      </p:sp>
-      <p:sp>
-        <p:nvSpPr>
-          <p:cNvPr id="10" name="Can 9">
-            <a:extLst>
-              <a:ext uri="{FF2B5EF4-FFF2-40B4-BE49-F238E27FC236}">
-                <a16:creationId xmlns:a16="http://schemas.microsoft.com/office/drawing/2014/main" id="{2FBA5496-5C4E-9D4F-48A1-4F1A245AFDFE}"/>
-              </a:ext>
-            </a:extLst>
-          </p:cNvPr>
-          <p:cNvSpPr/>
-          <p:nvPr/>
-        </p:nvSpPr>
-        <p:spPr>
-          <a:xfrm>
-            <a:off x="4224612" y="1181836"/>
-            <a:ext cx="1426477" cy="1463980"/>
-          </a:xfrm>
-          <a:prstGeom prst="can">
-            <a:avLst/>
-          </a:prstGeom>
-        </p:spPr>
-        <p:style>
-          <a:lnRef idx="2">
-            <a:schemeClr val="accent1">
-              <a:shade val="50000"/>
-            </a:schemeClr>
-          </a:lnRef>
-          <a:fillRef idx="1">
-            <a:schemeClr val="accent1"/>
-          </a:fillRef>
-          <a:effectRef idx="0">
-            <a:schemeClr val="accent1"/>
-          </a:effectRef>
-          <a:fontRef idx="minor">
-            <a:schemeClr val="lt1"/>
-          </a:fontRef>
-        </p:style>
-        <p:txBody>
-          <a:bodyPr rtlCol="0" anchor="ctr"/>
-          <a:lstStyle/>
-          <a:p>
-            <a:pPr algn="ctr"/>
-            <a:endParaRPr lang="en-US" sz="2000" i="1" dirty="0"/>
-          </a:p>
-          <a:p>
-            <a:pPr algn="ctr"/>
-            <a:endParaRPr lang="en-US" sz="2000" i="1" dirty="0"/>
-          </a:p>
-        </p:txBody>
-      </p:sp>
-      <p:sp>
-        <p:nvSpPr>
-          <p:cNvPr id="11" name="Can 10">
-            <a:extLst>
-              <a:ext uri="{FF2B5EF4-FFF2-40B4-BE49-F238E27FC236}">
-                <a16:creationId xmlns:a16="http://schemas.microsoft.com/office/drawing/2014/main" id="{F3621BDC-2969-FD51-F83E-CAEF6AA0FBCE}"/>
-              </a:ext>
-            </a:extLst>
-          </p:cNvPr>
-          <p:cNvSpPr/>
-          <p:nvPr/>
-        </p:nvSpPr>
-        <p:spPr>
-          <a:xfrm>
-            <a:off x="4224612" y="4172625"/>
-            <a:ext cx="1426477" cy="1679170"/>
-          </a:xfrm>
-          <a:prstGeom prst="can">
-            <a:avLst/>
-          </a:prstGeom>
-          <a:solidFill>
-            <a:schemeClr val="accent1">
-              <a:alpha val="0"/>
-            </a:schemeClr>
-          </a:solidFill>
-          <a:ln>
-            <a:solidFill>
-              <a:schemeClr val="accent1">
-                <a:shade val="50000"/>
-                <a:alpha val="0"/>
-              </a:schemeClr>
-            </a:solidFill>
-          </a:ln>
-        </p:spPr>
-        <p:style>
-          <a:lnRef idx="2">
-            <a:schemeClr val="accent1">
-              <a:shade val="50000"/>
-            </a:schemeClr>
-          </a:lnRef>
-          <a:fillRef idx="1">
-            <a:schemeClr val="accent1"/>
-          </a:fillRef>
-          <a:effectRef idx="0">
-            <a:schemeClr val="accent1"/>
-          </a:effectRef>
-          <a:fontRef idx="minor">
-            <a:schemeClr val="lt1"/>
-          </a:fontRef>
-        </p:style>
-        <p:txBody>
-          <a:bodyPr rtlCol="0" anchor="ctr"/>
-          <a:lstStyle/>
-          <a:p>
-            <a:pPr algn="ctr"/>
-            <a:br>
-              <a:rPr lang="en-US" sz="2000" dirty="0"/>
-            </a:br>
-            <a:endParaRPr lang="en-US" sz="2000" dirty="0"/>
-          </a:p>
-        </p:txBody>
-      </p:sp>
-      <p:sp>
-        <p:nvSpPr>
-          <p:cNvPr id="12" name="TextBox 11">
-            <a:extLst>
-              <a:ext uri="{FF2B5EF4-FFF2-40B4-BE49-F238E27FC236}">
-                <a16:creationId xmlns:a16="http://schemas.microsoft.com/office/drawing/2014/main" id="{3D208841-E66A-FBF9-1039-24928DFF10EE}"/>
-              </a:ext>
-            </a:extLst>
-          </p:cNvPr>
-          <p:cNvSpPr txBox="1"/>
-          <p:nvPr/>
-        </p:nvSpPr>
-        <p:spPr>
-          <a:xfrm>
-            <a:off x="4246261" y="1479741"/>
-            <a:ext cx="1351652" cy="1200329"/>
-          </a:xfrm>
-          <a:prstGeom prst="rect">
-            <a:avLst/>
-          </a:prstGeom>
-          <a:noFill/>
-        </p:spPr>
-        <p:txBody>
-          <a:bodyPr wrap="none" rtlCol="0">
-            <a:spAutoFit/>
-          </a:bodyPr>
-          <a:lstStyle/>
-          <a:p>
-            <a:pPr algn="ctr"/>
-            <a:r>
-              <a:rPr lang="en-US" sz="2400" dirty="0">
-                <a:solidFill>
-                  <a:schemeClr val="bg1"/>
-                </a:solidFill>
-                <a:latin typeface="Segoe Print" panose="02000800000000000000" pitchFamily="2" charset="0"/>
-              </a:rPr>
-              <a:t>Your</a:t>
-            </a:r>
-          </a:p>
-          <a:p>
-            <a:pPr algn="ctr"/>
-            <a:r>
-              <a:rPr lang="en-US" sz="2400" dirty="0">
-                <a:solidFill>
-                  <a:schemeClr val="bg1"/>
-                </a:solidFill>
-                <a:latin typeface="Segoe Print" panose="02000800000000000000" pitchFamily="2" charset="0"/>
-              </a:rPr>
-              <a:t>Remote</a:t>
-            </a:r>
-          </a:p>
-          <a:p>
-            <a:pPr algn="ctr"/>
-            <a:r>
-              <a:rPr lang="en-US" sz="2400" dirty="0">
-                <a:solidFill>
-                  <a:schemeClr val="bg1"/>
-                </a:solidFill>
-                <a:latin typeface="Segoe Print" panose="02000800000000000000" pitchFamily="2" charset="0"/>
-              </a:rPr>
-              <a:t>Copy</a:t>
-            </a:r>
-          </a:p>
-        </p:txBody>
-      </p:sp>
-      <p:sp>
-        <p:nvSpPr>
-          <p:cNvPr id="13" name="Can 12">
-            <a:extLst>
-              <a:ext uri="{FF2B5EF4-FFF2-40B4-BE49-F238E27FC236}">
-                <a16:creationId xmlns:a16="http://schemas.microsoft.com/office/drawing/2014/main" id="{EDD855E2-1DA5-326B-C9CA-D179C5F26FC4}"/>
-              </a:ext>
-            </a:extLst>
-          </p:cNvPr>
-          <p:cNvSpPr/>
-          <p:nvPr/>
-        </p:nvSpPr>
-        <p:spPr>
-          <a:xfrm>
-            <a:off x="4224612" y="4172625"/>
-            <a:ext cx="1426477" cy="1679170"/>
-          </a:xfrm>
-          <a:prstGeom prst="can">
-            <a:avLst/>
-          </a:prstGeom>
-        </p:spPr>
-        <p:style>
-          <a:lnRef idx="2">
-            <a:schemeClr val="accent1">
-              <a:shade val="50000"/>
-            </a:schemeClr>
-          </a:lnRef>
-          <a:fillRef idx="1">
-            <a:schemeClr val="accent1"/>
-          </a:fillRef>
-          <a:effectRef idx="0">
-            <a:schemeClr val="accent1"/>
-          </a:effectRef>
-          <a:fontRef idx="minor">
-            <a:schemeClr val="lt1"/>
-          </a:fontRef>
-        </p:style>
-        <p:txBody>
-          <a:bodyPr rtlCol="0" anchor="ctr"/>
-          <a:lstStyle/>
-          <a:p>
-            <a:pPr algn="ctr"/>
-            <a:br>
-              <a:rPr lang="en-US" sz="2000" dirty="0"/>
-            </a:br>
-            <a:endParaRPr lang="en-US" sz="2000" dirty="0"/>
-          </a:p>
-        </p:txBody>
-      </p:sp>
-      <p:sp>
-        <p:nvSpPr>
-          <p:cNvPr id="14" name="Left Arrow 13">
-            <a:extLst>
-              <a:ext uri="{FF2B5EF4-FFF2-40B4-BE49-F238E27FC236}">
-                <a16:creationId xmlns:a16="http://schemas.microsoft.com/office/drawing/2014/main" id="{A7E3AA56-EA46-3656-53A3-916E6D8D741D}"/>
-              </a:ext>
-            </a:extLst>
-          </p:cNvPr>
-          <p:cNvSpPr/>
-          <p:nvPr/>
-        </p:nvSpPr>
-        <p:spPr>
-          <a:xfrm rot="16200000">
-            <a:off x="3658905" y="2983694"/>
-            <a:ext cx="1731819" cy="1019070"/>
-          </a:xfrm>
-          <a:prstGeom prst="leftArrow">
-            <a:avLst/>
-          </a:prstGeom>
-          <a:ln>
-            <a:solidFill>
-              <a:schemeClr val="bg1">
-                <a:lumMod val="95000"/>
-              </a:schemeClr>
-            </a:solidFill>
-          </a:ln>
-        </p:spPr>
-        <p:style>
-          <a:lnRef idx="2">
-            <a:schemeClr val="accent1">
-              <a:shade val="50000"/>
-            </a:schemeClr>
-          </a:lnRef>
-          <a:fillRef idx="1">
-            <a:schemeClr val="accent1"/>
-          </a:fillRef>
-          <a:effectRef idx="0">
-            <a:schemeClr val="accent1"/>
-          </a:effectRef>
-          <a:fontRef idx="minor">
-            <a:schemeClr val="lt1"/>
-          </a:fontRef>
-        </p:style>
-        <p:txBody>
-          <a:bodyPr rtlCol="0" anchor="ctr"/>
-          <a:lstStyle/>
-          <a:p>
-            <a:pPr algn="ctr"/>
-            <a:r>
-              <a:rPr lang="en-US" sz="3200" b="1" dirty="0"/>
-              <a:t> </a:t>
-            </a:r>
-            <a:r>
-              <a:rPr lang="en-US" sz="3200" b="1" dirty="0">
-                <a:solidFill>
-                  <a:srgbClr val="FFFF00"/>
-                </a:solidFill>
-              </a:rPr>
-              <a:t>clone</a:t>
-            </a:r>
-          </a:p>
-        </p:txBody>
-      </p:sp>
-      <p:sp>
-        <p:nvSpPr>
-          <p:cNvPr id="15" name="TextBox 14">
-            <a:extLst>
-              <a:ext uri="{FF2B5EF4-FFF2-40B4-BE49-F238E27FC236}">
-                <a16:creationId xmlns:a16="http://schemas.microsoft.com/office/drawing/2014/main" id="{AD0F72B6-D682-A715-9F22-B78F06EB6FB3}"/>
-              </a:ext>
-            </a:extLst>
-          </p:cNvPr>
-          <p:cNvSpPr txBox="1"/>
-          <p:nvPr/>
-        </p:nvSpPr>
-        <p:spPr>
-          <a:xfrm>
-            <a:off x="4133976" y="4626175"/>
-            <a:ext cx="1584087" cy="1015663"/>
-          </a:xfrm>
-          <a:prstGeom prst="rect">
-            <a:avLst/>
-          </a:prstGeom>
-          <a:noFill/>
-        </p:spPr>
-        <p:txBody>
-          <a:bodyPr wrap="none" rtlCol="0">
-            <a:spAutoFit/>
-          </a:bodyPr>
-          <a:lstStyle/>
-          <a:p>
-            <a:pPr algn="ctr"/>
-            <a:r>
-              <a:rPr lang="en-US" sz="2000" dirty="0">
-                <a:solidFill>
-                  <a:schemeClr val="bg1"/>
-                </a:solidFill>
-                <a:latin typeface="Segoe Print" panose="02000800000000000000" pitchFamily="2" charset="0"/>
-              </a:rPr>
-              <a:t>Local Copy</a:t>
-            </a:r>
-          </a:p>
-          <a:p>
-            <a:pPr algn="ctr"/>
-            <a:r>
-              <a:rPr lang="en-US" sz="2000" dirty="0">
-                <a:solidFill>
-                  <a:schemeClr val="bg1"/>
-                </a:solidFill>
-                <a:latin typeface="Segoe Print" panose="02000800000000000000" pitchFamily="2" charset="0"/>
-              </a:rPr>
-              <a:t>Of Your</a:t>
-            </a:r>
-          </a:p>
-          <a:p>
-            <a:pPr algn="ctr"/>
-            <a:r>
-              <a:rPr lang="en-US" sz="2000" dirty="0">
-                <a:solidFill>
-                  <a:schemeClr val="bg1"/>
-                </a:solidFill>
-                <a:latin typeface="Segoe Print" panose="02000800000000000000" pitchFamily="2" charset="0"/>
-              </a:rPr>
-              <a:t>Copy</a:t>
-            </a:r>
-          </a:p>
-        </p:txBody>
-      </p:sp>
-      <p:cxnSp>
-        <p:nvCxnSpPr>
-          <p:cNvPr id="16" name="Curved Connector 15">
-            <a:extLst>
-              <a:ext uri="{FF2B5EF4-FFF2-40B4-BE49-F238E27FC236}">
-                <a16:creationId xmlns:a16="http://schemas.microsoft.com/office/drawing/2014/main" id="{B0E2347A-39E6-6062-318C-450814F1C44A}"/>
-              </a:ext>
-            </a:extLst>
-          </p:cNvPr>
-          <p:cNvCxnSpPr>
-            <a:cxnSpLocks/>
-          </p:cNvCxnSpPr>
-          <p:nvPr/>
-        </p:nvCxnSpPr>
-        <p:spPr>
-          <a:xfrm rot="5400000" flipH="1" flipV="1">
-            <a:off x="6281981" y="102883"/>
-            <a:ext cx="19660" cy="2734056"/>
-          </a:xfrm>
-          <a:prstGeom prst="curvedConnector3">
-            <a:avLst>
-              <a:gd name="adj1" fmla="val 1838622"/>
-            </a:avLst>
-          </a:prstGeom>
-          <a:ln w="63500">
-            <a:solidFill>
-              <a:schemeClr val="accent4"/>
-            </a:solidFill>
-            <a:prstDash val="sysDot"/>
-            <a:tailEnd type="triangle"/>
-          </a:ln>
-        </p:spPr>
-        <p:style>
-          <a:lnRef idx="2">
-            <a:schemeClr val="accent1"/>
-          </a:lnRef>
-          <a:fillRef idx="0">
-            <a:schemeClr val="accent1"/>
-          </a:fillRef>
-          <a:effectRef idx="1">
-            <a:schemeClr val="accent1"/>
-          </a:effectRef>
-          <a:fontRef idx="minor">
-            <a:schemeClr val="tx1"/>
-          </a:fontRef>
-        </p:style>
-      </p:cxnSp>
-      <p:cxnSp>
-        <p:nvCxnSpPr>
-          <p:cNvPr id="17" name="Curved Connector 16">
-            <a:extLst>
-              <a:ext uri="{FF2B5EF4-FFF2-40B4-BE49-F238E27FC236}">
-                <a16:creationId xmlns:a16="http://schemas.microsoft.com/office/drawing/2014/main" id="{D788DFE4-28FC-3737-390C-D84BB5D29FA3}"/>
-              </a:ext>
-            </a:extLst>
-          </p:cNvPr>
-          <p:cNvCxnSpPr>
-            <a:cxnSpLocks/>
-            <a:stCxn id="13" idx="2"/>
-            <a:endCxn id="12" idx="1"/>
-          </p:cNvCxnSpPr>
-          <p:nvPr/>
-        </p:nvCxnSpPr>
-        <p:spPr>
-          <a:xfrm rot="10800000" flipH="1">
-            <a:off x="4224611" y="2079906"/>
-            <a:ext cx="21649" cy="2932304"/>
-          </a:xfrm>
-          <a:prstGeom prst="curvedConnector3">
-            <a:avLst>
-              <a:gd name="adj1" fmla="val -1055938"/>
-            </a:avLst>
-          </a:prstGeom>
-          <a:ln w="63500">
-            <a:solidFill>
-              <a:schemeClr val="accent4"/>
-            </a:solidFill>
-            <a:prstDash val="sysDot"/>
-            <a:tailEnd type="triangle"/>
-          </a:ln>
-        </p:spPr>
-        <p:style>
-          <a:lnRef idx="2">
-            <a:schemeClr val="accent1"/>
-          </a:lnRef>
-          <a:fillRef idx="0">
-            <a:schemeClr val="accent1"/>
-          </a:fillRef>
-          <a:effectRef idx="1">
-            <a:schemeClr val="accent1"/>
-          </a:effectRef>
-          <a:fontRef idx="minor">
-            <a:schemeClr val="tx1"/>
-          </a:fontRef>
-        </p:style>
-      </p:cxnSp>
-      <p:sp>
-        <p:nvSpPr>
-          <p:cNvPr id="18" name="Left Arrow 17">
-            <a:extLst>
-              <a:ext uri="{FF2B5EF4-FFF2-40B4-BE49-F238E27FC236}">
-                <a16:creationId xmlns:a16="http://schemas.microsoft.com/office/drawing/2014/main" id="{1B6A2998-1957-2A13-A501-FCE312F3308B}"/>
-              </a:ext>
-            </a:extLst>
-          </p:cNvPr>
-          <p:cNvSpPr/>
-          <p:nvPr/>
-        </p:nvSpPr>
-        <p:spPr>
-          <a:xfrm>
-            <a:off x="5523725" y="1172099"/>
-            <a:ext cx="1386729" cy="732701"/>
-          </a:xfrm>
-          <a:prstGeom prst="leftArrow">
-            <a:avLst/>
-          </a:prstGeom>
-          <a:ln>
-            <a:solidFill>
-              <a:schemeClr val="bg1">
-                <a:lumMod val="95000"/>
-              </a:schemeClr>
-            </a:solidFill>
-          </a:ln>
-        </p:spPr>
-        <p:style>
-          <a:lnRef idx="2">
-            <a:schemeClr val="accent1">
-              <a:shade val="50000"/>
-            </a:schemeClr>
-          </a:lnRef>
-          <a:fillRef idx="1">
-            <a:schemeClr val="accent1"/>
-          </a:fillRef>
-          <a:effectRef idx="0">
-            <a:schemeClr val="accent1"/>
-          </a:effectRef>
-          <a:fontRef idx="minor">
-            <a:schemeClr val="lt1"/>
-          </a:fontRef>
-        </p:style>
-        <p:txBody>
-          <a:bodyPr rtlCol="0" anchor="ctr"/>
-          <a:lstStyle/>
-          <a:p>
-            <a:pPr algn="ctr"/>
-            <a:r>
-              <a:rPr lang="en-US" sz="3200" b="1" dirty="0">
-                <a:solidFill>
-                  <a:srgbClr val="FFFF00"/>
-                </a:solidFill>
-              </a:rPr>
-              <a:t>fork</a:t>
-            </a:r>
-            <a:endParaRPr lang="en-US" sz="2000" b="1" dirty="0">
-              <a:solidFill>
-                <a:srgbClr val="FFFF00"/>
-              </a:solidFill>
-            </a:endParaRPr>
-          </a:p>
-        </p:txBody>
-      </p:sp>
-      <p:sp>
-        <p:nvSpPr>
-          <p:cNvPr id="19" name="Up Arrow 18">
-            <a:extLst>
-              <a:ext uri="{FF2B5EF4-FFF2-40B4-BE49-F238E27FC236}">
-                <a16:creationId xmlns:a16="http://schemas.microsoft.com/office/drawing/2014/main" id="{53222C8D-21E9-BE14-6361-F83DCE90F964}"/>
-              </a:ext>
-            </a:extLst>
-          </p:cNvPr>
-          <p:cNvSpPr/>
-          <p:nvPr/>
-        </p:nvSpPr>
-        <p:spPr>
-          <a:xfrm>
-            <a:off x="4878922" y="2597699"/>
-            <a:ext cx="1016592" cy="1689752"/>
-          </a:xfrm>
-          <a:prstGeom prst="upArrow">
-            <a:avLst>
-              <a:gd name="adj1" fmla="val 50000"/>
-              <a:gd name="adj2" fmla="val 51082"/>
-            </a:avLst>
-          </a:prstGeom>
-          <a:ln>
-            <a:solidFill>
-              <a:schemeClr val="bg1">
-                <a:lumMod val="95000"/>
-              </a:schemeClr>
-            </a:solidFill>
-          </a:ln>
-        </p:spPr>
-        <p:style>
-          <a:lnRef idx="3">
-            <a:schemeClr val="lt1"/>
-          </a:lnRef>
-          <a:fillRef idx="1">
-            <a:schemeClr val="accent1"/>
-          </a:fillRef>
-          <a:effectRef idx="1">
-            <a:schemeClr val="accent1"/>
-          </a:effectRef>
-          <a:fontRef idx="minor">
-            <a:schemeClr val="lt1"/>
-          </a:fontRef>
-        </p:style>
-        <p:txBody>
-          <a:bodyPr vert="vert270" rtlCol="0" anchor="ctr"/>
-          <a:lstStyle/>
-          <a:p>
-            <a:pPr algn="ctr"/>
-            <a:r>
-              <a:rPr lang="en-US" sz="3200" b="1" dirty="0">
-                <a:solidFill>
-                  <a:srgbClr val="FFFF00"/>
-                </a:solidFill>
-              </a:rPr>
-              <a:t>push</a:t>
-            </a:r>
-          </a:p>
-        </p:txBody>
-      </p:sp>
-      <p:sp>
-        <p:nvSpPr>
-          <p:cNvPr id="20" name="Right Arrow 19">
-            <a:extLst>
-              <a:ext uri="{FF2B5EF4-FFF2-40B4-BE49-F238E27FC236}">
-                <a16:creationId xmlns:a16="http://schemas.microsoft.com/office/drawing/2014/main" id="{A50E1B59-B374-EF56-BD56-EBF348DBEAE8}"/>
-              </a:ext>
-            </a:extLst>
-          </p:cNvPr>
-          <p:cNvSpPr/>
-          <p:nvPr/>
-        </p:nvSpPr>
-        <p:spPr>
-          <a:xfrm>
-            <a:off x="5651089" y="1849948"/>
-            <a:ext cx="1394208" cy="1135980"/>
-          </a:xfrm>
-          <a:prstGeom prst="rightArrow">
-            <a:avLst/>
-          </a:prstGeom>
-          <a:ln>
-            <a:solidFill>
-              <a:schemeClr val="bg1">
-                <a:lumMod val="95000"/>
-              </a:schemeClr>
-            </a:solidFill>
-          </a:ln>
-        </p:spPr>
-        <p:style>
-          <a:lnRef idx="3">
-            <a:schemeClr val="lt1"/>
-          </a:lnRef>
-          <a:fillRef idx="1">
-            <a:schemeClr val="accent1"/>
-          </a:fillRef>
-          <a:effectRef idx="1">
-            <a:schemeClr val="accent1"/>
-          </a:effectRef>
-          <a:fontRef idx="minor">
-            <a:schemeClr val="lt1"/>
-          </a:fontRef>
-        </p:style>
-        <p:txBody>
-          <a:bodyPr rtlCol="0" anchor="ctr"/>
-          <a:lstStyle/>
-          <a:p>
-            <a:pPr algn="ctr"/>
-            <a:r>
-              <a:rPr lang="en-US" sz="1600" b="1" dirty="0">
-                <a:solidFill>
-                  <a:srgbClr val="FFFF00"/>
-                </a:solidFill>
-              </a:rPr>
-              <a:t>Pull Request</a:t>
-            </a:r>
-          </a:p>
-        </p:txBody>
-      </p:sp>
-    </p:spTree>
-    <p:extLst>
-      <p:ext uri="{BB962C8B-B14F-4D97-AF65-F5344CB8AC3E}">
-        <p14:creationId xmlns:p14="http://schemas.microsoft.com/office/powerpoint/2010/main" val="529549300"/>
-      </p:ext>
-    </p:extLst>
-  </p:cSld>
-  <p:clrMapOvr>
-    <a:masterClrMapping/>
-  </p:clrMapOvr>
-</p:sld>
-</file>
-
-<file path=ppt/slides/slide20.xml><?xml version="1.0" encoding="utf-8"?>
+<file path=ppt/slides/slide21.xml><?xml version="1.0" encoding="utf-8"?>
 <p:sld xmlns:a="http://schemas.openxmlformats.org/drawingml/2006/main" xmlns:r="http://schemas.openxmlformats.org/officeDocument/2006/relationships" xmlns:p="http://schemas.openxmlformats.org/presentationml/2006/main">
   <p:cSld>
     <p:spTree>
@@ -25749,7 +28527,7 @@
 </p:sld>
 </file>
 
-<file path=ppt/slides/slide21.xml><?xml version="1.0" encoding="utf-8"?>
+<file path=ppt/slides/slide22.xml><?xml version="1.0" encoding="utf-8"?>
 <p:sld xmlns:a="http://schemas.openxmlformats.org/drawingml/2006/main" xmlns:r="http://schemas.openxmlformats.org/officeDocument/2006/relationships" xmlns:p="http://schemas.openxmlformats.org/presentationml/2006/main">
   <p:cSld>
     <p:spTree>

</xml_diff>